<commit_message>
* change % effort and total hours from box with radio buttons to tabBox layout in order to have height match other boxes * also had to create separate objects on the server side to feed into the tabBox layout * changed total hours bar chart from plotly to ggplot + ggplotly * wrapped text for total hours by client - still issues wrapping text for total hours by project * playing around with layout of timeline - currently incomplete
</commit_message>
<xml_diff>
--- a/Strategy and Innovation timetrackR Presentation.pptx
+++ b/Strategy and Innovation timetrackR Presentation.pptx
@@ -5,10 +5,10 @@
     <p:sldMasterId id="2147483648" r:id="rId4"/>
   </p:sldMasterIdLst>
   <p:notesMasterIdLst>
-    <p:notesMasterId r:id="rId43"/>
+    <p:notesMasterId r:id="rId44"/>
   </p:notesMasterIdLst>
   <p:handoutMasterIdLst>
-    <p:handoutMasterId r:id="rId44"/>
+    <p:handoutMasterId r:id="rId45"/>
   </p:handoutMasterIdLst>
   <p:sldIdLst>
     <p:sldId id="256" r:id="rId5"/>
@@ -33,22 +33,23 @@
     <p:sldId id="326" r:id="rId24"/>
     <p:sldId id="327" r:id="rId25"/>
     <p:sldId id="328" r:id="rId26"/>
-    <p:sldId id="266" r:id="rId27"/>
-    <p:sldId id="325" r:id="rId28"/>
-    <p:sldId id="316" r:id="rId29"/>
-    <p:sldId id="302" r:id="rId30"/>
-    <p:sldId id="315" r:id="rId31"/>
-    <p:sldId id="289" r:id="rId32"/>
-    <p:sldId id="294" r:id="rId33"/>
-    <p:sldId id="288" r:id="rId34"/>
-    <p:sldId id="295" r:id="rId35"/>
-    <p:sldId id="301" r:id="rId36"/>
-    <p:sldId id="307" r:id="rId37"/>
-    <p:sldId id="313" r:id="rId38"/>
-    <p:sldId id="262" r:id="rId39"/>
-    <p:sldId id="280" r:id="rId40"/>
-    <p:sldId id="263" r:id="rId41"/>
-    <p:sldId id="273" r:id="rId42"/>
+    <p:sldId id="329" r:id="rId27"/>
+    <p:sldId id="266" r:id="rId28"/>
+    <p:sldId id="325" r:id="rId29"/>
+    <p:sldId id="316" r:id="rId30"/>
+    <p:sldId id="302" r:id="rId31"/>
+    <p:sldId id="315" r:id="rId32"/>
+    <p:sldId id="289" r:id="rId33"/>
+    <p:sldId id="294" r:id="rId34"/>
+    <p:sldId id="288" r:id="rId35"/>
+    <p:sldId id="295" r:id="rId36"/>
+    <p:sldId id="301" r:id="rId37"/>
+    <p:sldId id="307" r:id="rId38"/>
+    <p:sldId id="313" r:id="rId39"/>
+    <p:sldId id="262" r:id="rId40"/>
+    <p:sldId id="280" r:id="rId41"/>
+    <p:sldId id="263" r:id="rId42"/>
+    <p:sldId id="273" r:id="rId43"/>
   </p:sldIdLst>
   <p:sldSz cx="9144000" cy="6858000" type="screen4x3"/>
   <p:notesSz cx="6858000" cy="9144000"/>
@@ -290,7 +291,7 @@
           <a:p>
             <a:fld id="{DA61AB23-0316-4A6A-B29B-19F469FB1971}" type="datetimeFigureOut">
               <a:rPr lang="en-US" smtClean="0"/>
-              <a:t>4/18/20</a:t>
+              <a:t>4/20/20</a:t>
             </a:fld>
             <a:endParaRPr lang="en-US"/>
           </a:p>
@@ -468,7 +469,7 @@
           <a:p>
             <a:fld id="{7F6DE0E8-87C7-4A14-9F3C-CD4E49706B18}" type="datetimeFigureOut">
               <a:rPr lang="en-US" smtClean="0"/>
-              <a:t>4/18/20</a:t>
+              <a:t>4/20/20</a:t>
             </a:fld>
             <a:endParaRPr lang="en-US"/>
           </a:p>
@@ -888,7 +889,7 @@
           <a:p>
             <a:fld id="{9C5C8B17-D1C9-48DD-A1B1-EDA1E362804A}" type="slidenum">
               <a:rPr lang="en-US" smtClean="0"/>
-              <a:t>37</a:t>
+              <a:t>38</a:t>
             </a:fld>
             <a:endParaRPr lang="en-US"/>
           </a:p>
@@ -1572,7 +1573,7 @@
           <a:p>
             <a:fld id="{9C5C8B17-D1C9-48DD-A1B1-EDA1E362804A}" type="slidenum">
               <a:rPr lang="en-US" smtClean="0"/>
-              <a:t>23</a:t>
+              <a:t>24</a:t>
             </a:fld>
             <a:endParaRPr lang="en-US"/>
           </a:p>
@@ -1662,7 +1663,7 @@
           <a:p>
             <a:fld id="{9C5C8B17-D1C9-48DD-A1B1-EDA1E362804A}" type="slidenum">
               <a:rPr lang="en-US" smtClean="0"/>
-              <a:t>33</a:t>
+              <a:t>34</a:t>
             </a:fld>
             <a:endParaRPr lang="en-US"/>
           </a:p>
@@ -3997,17 +3998,17 @@
           </a:ln>
           <a:extLst>
             <a:ext uri="{FAA26D3D-D897-4be2-8F04-BA451C77F1D7}">
-              <ma14:placeholderFlag xmlns="" xmlns:ma14="http://schemas.microsoft.com/office/mac/drawingml/2011/main" val="1"/>
+              <ma14:placeholderFlag xmlns:ma14="http://schemas.microsoft.com/office/mac/drawingml/2011/main" xmlns="" val="1"/>
             </a:ext>
             <a:ext uri="{909E8E84-426E-40dd-AFC4-6F175D3DCCD1}">
-              <a14:hiddenFill xmlns="" xmlns:a14="http://schemas.microsoft.com/office/drawing/2010/main">
+              <a14:hiddenFill xmlns:a14="http://schemas.microsoft.com/office/drawing/2010/main" xmlns="">
                 <a:solidFill>
                   <a:srgbClr val="FFFFFF"/>
                 </a:solidFill>
               </a14:hiddenFill>
             </a:ext>
             <a:ext uri="{91240B29-F687-4f45-9708-019B960494DF}">
-              <a14:hiddenLine xmlns="" xmlns:a14="http://schemas.microsoft.com/office/drawing/2010/main" w="9525">
+              <a14:hiddenLine xmlns:a14="http://schemas.microsoft.com/office/drawing/2010/main" xmlns="" w="9525">
                 <a:solidFill>
                   <a:srgbClr val="000000"/>
                 </a:solidFill>
@@ -4059,17 +4060,17 @@
           </a:ln>
           <a:extLst>
             <a:ext uri="{FAA26D3D-D897-4be2-8F04-BA451C77F1D7}">
-              <ma14:placeholderFlag xmlns="" xmlns:ma14="http://schemas.microsoft.com/office/mac/drawingml/2011/main" val="1"/>
+              <ma14:placeholderFlag xmlns:ma14="http://schemas.microsoft.com/office/mac/drawingml/2011/main" xmlns="" val="1"/>
             </a:ext>
             <a:ext uri="{909E8E84-426E-40dd-AFC4-6F175D3DCCD1}">
-              <a14:hiddenFill xmlns="" xmlns:a14="http://schemas.microsoft.com/office/drawing/2010/main">
+              <a14:hiddenFill xmlns:a14="http://schemas.microsoft.com/office/drawing/2010/main" xmlns="">
                 <a:solidFill>
                   <a:srgbClr val="FFFFFF"/>
                 </a:solidFill>
               </a14:hiddenFill>
             </a:ext>
             <a:ext uri="{91240B29-F687-4f45-9708-019B960494DF}">
-              <a14:hiddenLine xmlns="" xmlns:a14="http://schemas.microsoft.com/office/drawing/2010/main" w="9525">
+              <a14:hiddenLine xmlns:a14="http://schemas.microsoft.com/office/drawing/2010/main" xmlns="" w="9525">
                 <a:solidFill>
                   <a:srgbClr val="000000"/>
                 </a:solidFill>
@@ -8383,140 +8384,10 @@
           <a:chExt cx="0" cy="0"/>
         </a:xfrm>
       </p:grpSpPr>
-      <p:sp>
-        <p:nvSpPr>
-          <p:cNvPr id="2" name="Title 1">
-            <a:extLst>
-              <a:ext uri="{FF2B5EF4-FFF2-40B4-BE49-F238E27FC236}">
-                <a16:creationId xmlns:a16="http://schemas.microsoft.com/office/drawing/2014/main" id="{7C0AAF0C-A9BA-41A6-A856-1A1CB3117341}"/>
-              </a:ext>
-            </a:extLst>
-          </p:cNvPr>
-          <p:cNvSpPr>
-            <a:spLocks noGrp="1"/>
-          </p:cNvSpPr>
-          <p:nvPr>
-            <p:ph type="title"/>
-          </p:nvPr>
-        </p:nvSpPr>
-        <p:spPr/>
-        <p:txBody>
-          <a:bodyPr/>
-          <a:lstStyle/>
-          <a:p>
-            <a:r>
-              <a:rPr lang="en-US" dirty="0"/>
-              <a:t>Information learned from </a:t>
-            </a:r>
-            <a:r>
-              <a:rPr lang="en-US" i="1" dirty="0" err="1"/>
-              <a:t>timetrackR</a:t>
-            </a:r>
-            <a:endParaRPr lang="en-US" i="1" dirty="0"/>
-          </a:p>
-        </p:txBody>
-      </p:sp>
-      <p:sp>
-        <p:nvSpPr>
-          <p:cNvPr id="3" name="Content Placeholder 2">
-            <a:extLst>
-              <a:ext uri="{FF2B5EF4-FFF2-40B4-BE49-F238E27FC236}">
-                <a16:creationId xmlns:a16="http://schemas.microsoft.com/office/drawing/2014/main" id="{9DC865FE-2769-467A-9247-2E19D7FFD882}"/>
-              </a:ext>
-            </a:extLst>
-          </p:cNvPr>
-          <p:cNvSpPr>
-            <a:spLocks noGrp="1"/>
-          </p:cNvSpPr>
-          <p:nvPr>
-            <p:ph idx="1"/>
-          </p:nvPr>
-        </p:nvSpPr>
-        <p:spPr/>
-        <p:txBody>
-          <a:bodyPr/>
-          <a:lstStyle/>
-          <a:p>
-            <a:r>
-              <a:rPr lang="en-US" sz="2400" dirty="0"/>
-              <a:t>In the last 3 months, &gt;75% of my time has been devoted to a single project. Can we can bring someone else on to that project? </a:t>
-            </a:r>
-            <a:r>
-              <a:rPr lang="en-US" sz="2400" dirty="0">
-                <a:solidFill>
-                  <a:schemeClr val="accent2"/>
-                </a:solidFill>
-              </a:rPr>
-              <a:t>(percent effort)</a:t>
-            </a:r>
-          </a:p>
-          <a:p>
-            <a:r>
-              <a:rPr lang="en-US" sz="2400" dirty="0"/>
-              <a:t>I spent more hours on a presentation for a conference than I thought I did. Maybe I should turn that into a manuscript? </a:t>
-            </a:r>
-            <a:r>
-              <a:rPr lang="en-US" sz="2400" dirty="0">
-                <a:solidFill>
-                  <a:schemeClr val="accent2"/>
-                </a:solidFill>
-              </a:rPr>
-              <a:t>(total hours)</a:t>
-            </a:r>
-          </a:p>
-          <a:p>
-            <a:r>
-              <a:rPr lang="en-US" sz="2400" dirty="0"/>
-              <a:t>A particular project transitioned between analysis and re-analysis several times throughout the project’s life cycle. Is it time for a regroup with the investigator? </a:t>
-            </a:r>
-            <a:r>
-              <a:rPr lang="en-US" sz="2400" dirty="0">
-                <a:solidFill>
-                  <a:schemeClr val="accent2"/>
-                </a:solidFill>
-              </a:rPr>
-              <a:t>(project timeline)</a:t>
-            </a:r>
-          </a:p>
-          <a:p>
-            <a:endParaRPr lang="en-US" sz="2400" dirty="0"/>
-          </a:p>
-        </p:txBody>
-      </p:sp>
-      <p:sp>
-        <p:nvSpPr>
-          <p:cNvPr id="5" name="Slide Number Placeholder 4">
-            <a:extLst>
-              <a:ext uri="{FF2B5EF4-FFF2-40B4-BE49-F238E27FC236}">
-                <a16:creationId xmlns:a16="http://schemas.microsoft.com/office/drawing/2014/main" id="{F8057A78-D164-4689-9741-70F3F86F495E}"/>
-              </a:ext>
-            </a:extLst>
-          </p:cNvPr>
-          <p:cNvSpPr>
-            <a:spLocks noGrp="1"/>
-          </p:cNvSpPr>
-          <p:nvPr>
-            <p:ph type="sldNum" sz="quarter" idx="4"/>
-          </p:nvPr>
-        </p:nvSpPr>
-        <p:spPr/>
-        <p:txBody>
-          <a:bodyPr/>
-          <a:lstStyle/>
-          <a:p>
-            <a:fld id="{1C3486A8-E8FB-4965-B61C-9B9FA7DC7BEE}" type="slidenum">
-              <a:rPr lang="en-US" smtClean="0"/>
-              <a:pPr/>
-              <a:t>23</a:t>
-            </a:fld>
-            <a:endParaRPr lang="en-US"/>
-          </a:p>
-        </p:txBody>
-      </p:sp>
     </p:spTree>
     <p:extLst>
       <p:ext uri="{BB962C8B-B14F-4D97-AF65-F5344CB8AC3E}">
-        <p14:creationId xmlns:p14="http://schemas.microsoft.com/office/powerpoint/2010/main" val="2022793432"/>
+        <p14:creationId xmlns:p14="http://schemas.microsoft.com/office/powerpoint/2010/main" val="1288935205"/>
       </p:ext>
     </p:extLst>
   </p:cSld>
@@ -8548,7 +8419,7 @@
           <p:cNvPr id="2" name="Title 1">
             <a:extLst>
               <a:ext uri="{FF2B5EF4-FFF2-40B4-BE49-F238E27FC236}">
-                <a16:creationId xmlns:a16="http://schemas.microsoft.com/office/drawing/2014/main" id="{B1A140FF-A80A-524E-82A8-A3A4EC9A8310}"/>
+                <a16:creationId xmlns:a16="http://schemas.microsoft.com/office/drawing/2014/main" id="{7C0AAF0C-A9BA-41A6-A856-1A1CB3117341}"/>
               </a:ext>
             </a:extLst>
           </p:cNvPr>
@@ -8565,22 +8436,90 @@
           <a:lstStyle/>
           <a:p>
             <a:r>
-              <a:rPr lang="en-US" dirty="0">
+              <a:rPr lang="en-US" dirty="0"/>
+              <a:t>Information learned from </a:t>
+            </a:r>
+            <a:r>
+              <a:rPr lang="en-US" i="1" dirty="0" err="1"/>
+              <a:t>timetrackR</a:t>
+            </a:r>
+            <a:endParaRPr lang="en-US" i="1" dirty="0"/>
+          </a:p>
+        </p:txBody>
+      </p:sp>
+      <p:sp>
+        <p:nvSpPr>
+          <p:cNvPr id="3" name="Content Placeholder 2">
+            <a:extLst>
+              <a:ext uri="{FF2B5EF4-FFF2-40B4-BE49-F238E27FC236}">
+                <a16:creationId xmlns:a16="http://schemas.microsoft.com/office/drawing/2014/main" id="{9DC865FE-2769-467A-9247-2E19D7FFD882}"/>
+              </a:ext>
+            </a:extLst>
+          </p:cNvPr>
+          <p:cNvSpPr>
+            <a:spLocks noGrp="1"/>
+          </p:cNvSpPr>
+          <p:nvPr>
+            <p:ph idx="1"/>
+          </p:nvPr>
+        </p:nvSpPr>
+        <p:spPr/>
+        <p:txBody>
+          <a:bodyPr/>
+          <a:lstStyle/>
+          <a:p>
+            <a:r>
+              <a:rPr lang="en-US" sz="2400" dirty="0"/>
+              <a:t>In the last 3 months, &gt;75% of my time has been devoted to a single project. Can we can bring someone else on to that project? </a:t>
+            </a:r>
+            <a:r>
+              <a:rPr lang="en-US" sz="2400" dirty="0">
                 <a:solidFill>
                   <a:schemeClr val="accent2"/>
                 </a:solidFill>
               </a:rPr>
-              <a:t>Workflow Integration</a:t>
-            </a:r>
-          </a:p>
-        </p:txBody>
-      </p:sp>
-      <p:sp>
-        <p:nvSpPr>
-          <p:cNvPr id="3" name="Slide Number Placeholder 2">
+              <a:t>(percent effort)</a:t>
+            </a:r>
+          </a:p>
+          <a:p>
+            <a:r>
+              <a:rPr lang="en-US" sz="2400" dirty="0"/>
+              <a:t>I spent more hours on a presentation for a conference than I thought I did. Maybe I should turn that into a manuscript? </a:t>
+            </a:r>
+            <a:r>
+              <a:rPr lang="en-US" sz="2400" dirty="0">
+                <a:solidFill>
+                  <a:schemeClr val="accent2"/>
+                </a:solidFill>
+              </a:rPr>
+              <a:t>(total hours)</a:t>
+            </a:r>
+          </a:p>
+          <a:p>
+            <a:r>
+              <a:rPr lang="en-US" sz="2400" dirty="0"/>
+              <a:t>A particular project transitioned between analysis and re-analysis several times throughout the project’s life cycle. Is it time for a regroup with the investigator? </a:t>
+            </a:r>
+            <a:r>
+              <a:rPr lang="en-US" sz="2400" dirty="0">
+                <a:solidFill>
+                  <a:schemeClr val="accent2"/>
+                </a:solidFill>
+              </a:rPr>
+              <a:t>(project timeline)</a:t>
+            </a:r>
+          </a:p>
+          <a:p>
+            <a:endParaRPr lang="en-US" sz="2400" dirty="0"/>
+          </a:p>
+        </p:txBody>
+      </p:sp>
+      <p:sp>
+        <p:nvSpPr>
+          <p:cNvPr id="5" name="Slide Number Placeholder 4">
             <a:extLst>
               <a:ext uri="{FF2B5EF4-FFF2-40B4-BE49-F238E27FC236}">
-                <a16:creationId xmlns:a16="http://schemas.microsoft.com/office/drawing/2014/main" id="{4F0454F6-C6F3-4843-8301-D13FC23C268F}"/>
+                <a16:creationId xmlns:a16="http://schemas.microsoft.com/office/drawing/2014/main" id="{F8057A78-D164-4689-9741-70F3F86F495E}"/>
               </a:ext>
             </a:extLst>
           </p:cNvPr>
@@ -8588,7 +8527,7 @@
             <a:spLocks noGrp="1"/>
           </p:cNvSpPr>
           <p:nvPr>
-            <p:ph type="sldNum" sz="quarter" idx="11"/>
+            <p:ph type="sldNum" sz="quarter" idx="4"/>
           </p:nvPr>
         </p:nvSpPr>
         <p:spPr/>
@@ -8608,7 +8547,7 @@
     </p:spTree>
     <p:extLst>
       <p:ext uri="{BB962C8B-B14F-4D97-AF65-F5344CB8AC3E}">
-        <p14:creationId xmlns:p14="http://schemas.microsoft.com/office/powerpoint/2010/main" val="2433942188"/>
+        <p14:creationId xmlns:p14="http://schemas.microsoft.com/office/powerpoint/2010/main" val="2022793432"/>
       </p:ext>
     </p:extLst>
   </p:cSld>
@@ -8640,7 +8579,7 @@
           <p:cNvPr id="2" name="Title 1">
             <a:extLst>
               <a:ext uri="{FF2B5EF4-FFF2-40B4-BE49-F238E27FC236}">
-                <a16:creationId xmlns:a16="http://schemas.microsoft.com/office/drawing/2014/main" id="{155AD063-E272-0F4A-A013-C8F6CE117E93}"/>
+                <a16:creationId xmlns:a16="http://schemas.microsoft.com/office/drawing/2014/main" id="{B1A140FF-A80A-524E-82A8-A3A4EC9A8310}"/>
               </a:ext>
             </a:extLst>
           </p:cNvPr>
@@ -8657,18 +8596,22 @@
           <a:lstStyle/>
           <a:p>
             <a:r>
-              <a:rPr lang="en-US" dirty="0"/>
-              <a:t>Workflow integration</a:t>
-            </a:r>
-          </a:p>
-        </p:txBody>
-      </p:sp>
-      <p:sp>
-        <p:nvSpPr>
-          <p:cNvPr id="3" name="Content Placeholder 2">
+              <a:rPr lang="en-US" dirty="0">
+                <a:solidFill>
+                  <a:schemeClr val="accent2"/>
+                </a:solidFill>
+              </a:rPr>
+              <a:t>Workflow Integration</a:t>
+            </a:r>
+          </a:p>
+        </p:txBody>
+      </p:sp>
+      <p:sp>
+        <p:nvSpPr>
+          <p:cNvPr id="3" name="Slide Number Placeholder 2">
             <a:extLst>
               <a:ext uri="{FF2B5EF4-FFF2-40B4-BE49-F238E27FC236}">
-                <a16:creationId xmlns:a16="http://schemas.microsoft.com/office/drawing/2014/main" id="{D26AFD08-B620-EB4E-B0D1-990BD2DFA065}"/>
+                <a16:creationId xmlns:a16="http://schemas.microsoft.com/office/drawing/2014/main" id="{4F0454F6-C6F3-4843-8301-D13FC23C268F}"/>
               </a:ext>
             </a:extLst>
           </p:cNvPr>
@@ -8676,79 +8619,7 @@
             <a:spLocks noGrp="1"/>
           </p:cNvSpPr>
           <p:nvPr>
-            <p:ph idx="1"/>
-          </p:nvPr>
-        </p:nvSpPr>
-        <p:spPr/>
-        <p:txBody>
-          <a:bodyPr/>
-          <a:lstStyle/>
-          <a:p>
-            <a:r>
-              <a:rPr lang="en-US" dirty="0">
-                <a:solidFill>
-                  <a:schemeClr val="accent1"/>
-                </a:solidFill>
-              </a:rPr>
-              <a:t>Daily basis: </a:t>
-            </a:r>
-            <a:r>
-              <a:rPr lang="en-US" dirty="0"/>
-              <a:t>Use Toggl to record how you’re spending your time</a:t>
-            </a:r>
-          </a:p>
-          <a:p>
-            <a:pPr lvl="1"/>
-            <a:r>
-              <a:rPr lang="en-US" dirty="0"/>
-              <a:t>Requires minimal setup for project/clients</a:t>
-            </a:r>
-          </a:p>
-          <a:p>
-            <a:pPr lvl="1"/>
-            <a:r>
-              <a:rPr lang="en-US" dirty="0"/>
-              <a:t>Spend &lt;5 minutes a day recording my time</a:t>
-            </a:r>
-          </a:p>
-          <a:p>
-            <a:r>
-              <a:rPr lang="en-US" dirty="0">
-                <a:solidFill>
-                  <a:schemeClr val="accent1"/>
-                </a:solidFill>
-              </a:rPr>
-              <a:t>Weekly? Monthly? Quarterly?:</a:t>
-            </a:r>
-            <a:r>
-              <a:rPr lang="en-US" dirty="0"/>
-              <a:t> Export data from Toggl into </a:t>
-            </a:r>
-            <a:r>
-              <a:rPr lang="en-US" dirty="0" err="1"/>
-              <a:t>timetrackR</a:t>
-            </a:r>
-            <a:r>
-              <a:rPr lang="en-US" dirty="0"/>
-              <a:t> to look at how you’ve been spending your time</a:t>
-            </a:r>
-          </a:p>
-        </p:txBody>
-      </p:sp>
-      <p:sp>
-        <p:nvSpPr>
-          <p:cNvPr id="4" name="Slide Number Placeholder 3">
-            <a:extLst>
-              <a:ext uri="{FF2B5EF4-FFF2-40B4-BE49-F238E27FC236}">
-                <a16:creationId xmlns:a16="http://schemas.microsoft.com/office/drawing/2014/main" id="{61A1BF09-FFF6-2144-BBCD-C9B47890FF7A}"/>
-              </a:ext>
-            </a:extLst>
-          </p:cNvPr>
-          <p:cNvSpPr>
-            <a:spLocks noGrp="1"/>
-          </p:cNvSpPr>
-          <p:nvPr>
-            <p:ph type="sldNum" sz="quarter" idx="4"/>
+            <p:ph type="sldNum" sz="quarter" idx="11"/>
           </p:nvPr>
         </p:nvSpPr>
         <p:spPr/>
@@ -8768,7 +8639,7 @@
     </p:spTree>
     <p:extLst>
       <p:ext uri="{BB962C8B-B14F-4D97-AF65-F5344CB8AC3E}">
-        <p14:creationId xmlns:p14="http://schemas.microsoft.com/office/powerpoint/2010/main" val="2595252815"/>
+        <p14:creationId xmlns:p14="http://schemas.microsoft.com/office/powerpoint/2010/main" val="2433942188"/>
       </p:ext>
     </p:extLst>
   </p:cSld>
@@ -8800,7 +8671,7 @@
           <p:cNvPr id="2" name="Title 1">
             <a:extLst>
               <a:ext uri="{FF2B5EF4-FFF2-40B4-BE49-F238E27FC236}">
-                <a16:creationId xmlns:a16="http://schemas.microsoft.com/office/drawing/2014/main" id="{EB72F780-0A20-420E-BDE8-1E2357373C89}"/>
+                <a16:creationId xmlns:a16="http://schemas.microsoft.com/office/drawing/2014/main" id="{155AD063-E272-0F4A-A013-C8F6CE117E93}"/>
               </a:ext>
             </a:extLst>
           </p:cNvPr>
@@ -8811,125 +8682,96 @@
             <p:ph type="title"/>
           </p:nvPr>
         </p:nvSpPr>
-        <p:spPr>
-          <a:xfrm>
-            <a:off x="762000" y="1209214"/>
-            <a:ext cx="7647214" cy="4130229"/>
-          </a:xfrm>
-        </p:spPr>
+        <p:spPr/>
         <p:txBody>
           <a:bodyPr/>
           <a:lstStyle/>
           <a:p>
             <a:r>
-              <a:rPr lang="en-US" b="0" dirty="0">
-                <a:solidFill>
-                  <a:schemeClr val="accent2"/>
-                </a:solidFill>
-              </a:rPr>
-              <a:t>R Code Highlights:</a:t>
-            </a:r>
-            <a:br>
-              <a:rPr lang="en-US" b="0" dirty="0">
+              <a:rPr lang="en-US" dirty="0"/>
+              <a:t>Workflow integration</a:t>
+            </a:r>
+          </a:p>
+        </p:txBody>
+      </p:sp>
+      <p:sp>
+        <p:nvSpPr>
+          <p:cNvPr id="3" name="Content Placeholder 2">
+            <a:extLst>
+              <a:ext uri="{FF2B5EF4-FFF2-40B4-BE49-F238E27FC236}">
+                <a16:creationId xmlns:a16="http://schemas.microsoft.com/office/drawing/2014/main" id="{D26AFD08-B620-EB4E-B0D1-990BD2DFA065}"/>
+              </a:ext>
+            </a:extLst>
+          </p:cNvPr>
+          <p:cNvSpPr>
+            <a:spLocks noGrp="1"/>
+          </p:cNvSpPr>
+          <p:nvPr>
+            <p:ph idx="1"/>
+          </p:nvPr>
+        </p:nvSpPr>
+        <p:spPr/>
+        <p:txBody>
+          <a:bodyPr/>
+          <a:lstStyle/>
+          <a:p>
+            <a:r>
+              <a:rPr lang="en-US" dirty="0">
                 <a:solidFill>
                   <a:schemeClr val="accent1"/>
                 </a:solidFill>
               </a:rPr>
-            </a:br>
-            <a:r>
-              <a:rPr lang="en-US" b="0" dirty="0">
+              <a:t>Daily basis: </a:t>
+            </a:r>
+            <a:r>
+              <a:rPr lang="en-US" dirty="0"/>
+              <a:t>Use Toggl to record how you’re spending your time</a:t>
+            </a:r>
+          </a:p>
+          <a:p>
+            <a:pPr lvl="1"/>
+            <a:r>
+              <a:rPr lang="en-US" dirty="0"/>
+              <a:t>Requires minimal setup for project/clients</a:t>
+            </a:r>
+          </a:p>
+          <a:p>
+            <a:pPr lvl="1"/>
+            <a:r>
+              <a:rPr lang="en-US" dirty="0"/>
+              <a:t>Spend &lt;5 minutes a day recording my time</a:t>
+            </a:r>
+          </a:p>
+          <a:p>
+            <a:r>
+              <a:rPr lang="en-US" dirty="0">
                 <a:solidFill>
                   <a:schemeClr val="accent1"/>
                 </a:solidFill>
               </a:rPr>
-              <a:t>     - </a:t>
-            </a:r>
-            <a:r>
-              <a:rPr lang="en-US" dirty="0">
-                <a:solidFill>
-                  <a:schemeClr val="accent1"/>
-                </a:solidFill>
-              </a:rPr>
-              <a:t>switch</a:t>
-            </a:r>
-            <a:r>
-              <a:rPr lang="en-US" b="0" dirty="0">
-                <a:solidFill>
-                  <a:schemeClr val="accent1"/>
-                </a:solidFill>
-              </a:rPr>
-              <a:t> function</a:t>
-            </a:r>
-            <a:br>
-              <a:rPr lang="en-US" b="0" dirty="0">
-                <a:solidFill>
-                  <a:schemeClr val="accent1"/>
-                </a:solidFill>
-              </a:rPr>
-            </a:br>
-            <a:r>
-              <a:rPr lang="en-US" b="0" dirty="0">
-                <a:solidFill>
-                  <a:schemeClr val="accent1"/>
-                </a:solidFill>
-              </a:rPr>
-              <a:t>     - </a:t>
-            </a:r>
-            <a:r>
-              <a:rPr lang="en-US" dirty="0" err="1">
-                <a:solidFill>
-                  <a:schemeClr val="accent1"/>
-                </a:solidFill>
-              </a:rPr>
-              <a:t>geom_segment</a:t>
-            </a:r>
-            <a:r>
-              <a:rPr lang="en-US" b="0" dirty="0">
-                <a:solidFill>
-                  <a:schemeClr val="accent1"/>
-                </a:solidFill>
-              </a:rPr>
-              <a:t>()</a:t>
-            </a:r>
-            <a:br>
-              <a:rPr lang="en-US" b="0" dirty="0">
-                <a:solidFill>
-                  <a:schemeClr val="accent1"/>
-                </a:solidFill>
-              </a:rPr>
-            </a:br>
-            <a:r>
-              <a:rPr lang="en-US" b="0" dirty="0">
-                <a:solidFill>
-                  <a:schemeClr val="accent1"/>
-                </a:solidFill>
-              </a:rPr>
-              <a:t>     - hex sticker</a:t>
-            </a:r>
-            <a:br>
-              <a:rPr lang="en-US" b="0" dirty="0">
-                <a:solidFill>
-                  <a:schemeClr val="accent1"/>
-                </a:solidFill>
-              </a:rPr>
-            </a:br>
-            <a:r>
-              <a:rPr lang="en-US" b="0" dirty="0">
-                <a:solidFill>
-                  <a:schemeClr val="accent1"/>
-                </a:solidFill>
-              </a:rPr>
-              <a:t>     - Hosting a shiny app</a:t>
-            </a:r>
-          </a:p>
-        </p:txBody>
-      </p:sp>
-      <p:sp>
-        <p:nvSpPr>
-          <p:cNvPr id="3" name="Slide Number Placeholder 2">
+              <a:t>Weekly? Monthly? Quarterly?:</a:t>
+            </a:r>
+            <a:r>
+              <a:rPr lang="en-US" dirty="0"/>
+              <a:t> Export data from Toggl into </a:t>
+            </a:r>
+            <a:r>
+              <a:rPr lang="en-US" dirty="0" err="1"/>
+              <a:t>timetrackR</a:t>
+            </a:r>
+            <a:r>
+              <a:rPr lang="en-US" dirty="0"/>
+              <a:t> to look at how you’ve been spending your time</a:t>
+            </a:r>
+          </a:p>
+        </p:txBody>
+      </p:sp>
+      <p:sp>
+        <p:nvSpPr>
+          <p:cNvPr id="4" name="Slide Number Placeholder 3">
             <a:extLst>
               <a:ext uri="{FF2B5EF4-FFF2-40B4-BE49-F238E27FC236}">
-                <a16:creationId xmlns:a16="http://schemas.microsoft.com/office/drawing/2014/main" id="{D3905B7C-8E7D-4914-A81F-D023D3B49551}"/>
+                <a16:creationId xmlns:a16="http://schemas.microsoft.com/office/drawing/2014/main" id="{61A1BF09-FFF6-2144-BBCD-C9B47890FF7A}"/>
               </a:ext>
             </a:extLst>
           </p:cNvPr>
@@ -8937,7 +8779,7 @@
             <a:spLocks noGrp="1"/>
           </p:cNvSpPr>
           <p:nvPr>
-            <p:ph type="sldNum" sz="quarter" idx="11"/>
+            <p:ph type="sldNum" sz="quarter" idx="4"/>
           </p:nvPr>
         </p:nvSpPr>
         <p:spPr/>
@@ -8957,7 +8799,7 @@
     </p:spTree>
     <p:extLst>
       <p:ext uri="{BB962C8B-B14F-4D97-AF65-F5344CB8AC3E}">
-        <p14:creationId xmlns:p14="http://schemas.microsoft.com/office/powerpoint/2010/main" val="3104528174"/>
+        <p14:creationId xmlns:p14="http://schemas.microsoft.com/office/powerpoint/2010/main" val="2595252815"/>
       </p:ext>
     </p:extLst>
   </p:cSld>
@@ -8989,7 +8831,7 @@
           <p:cNvPr id="2" name="Title 1">
             <a:extLst>
               <a:ext uri="{FF2B5EF4-FFF2-40B4-BE49-F238E27FC236}">
-                <a16:creationId xmlns:a16="http://schemas.microsoft.com/office/drawing/2014/main" id="{4BA35181-2264-4945-B7E3-8EB3E27DD03F}"/>
+                <a16:creationId xmlns:a16="http://schemas.microsoft.com/office/drawing/2014/main" id="{EB72F780-0A20-420E-BDE8-1E2357373C89}"/>
               </a:ext>
             </a:extLst>
           </p:cNvPr>
@@ -9000,24 +8842,125 @@
             <p:ph type="title"/>
           </p:nvPr>
         </p:nvSpPr>
-        <p:spPr/>
+        <p:spPr>
+          <a:xfrm>
+            <a:off x="762000" y="1209214"/>
+            <a:ext cx="7647214" cy="4130229"/>
+          </a:xfrm>
+        </p:spPr>
         <p:txBody>
           <a:bodyPr/>
           <a:lstStyle/>
           <a:p>
             <a:r>
-              <a:rPr lang="en-US" dirty="0"/>
-              <a:t>Behind the scenes</a:t>
-            </a:r>
-          </a:p>
-        </p:txBody>
-      </p:sp>
-      <p:sp>
-        <p:nvSpPr>
-          <p:cNvPr id="3" name="Content Placeholder 2">
+              <a:rPr lang="en-US" b="0" dirty="0">
+                <a:solidFill>
+                  <a:schemeClr val="accent2"/>
+                </a:solidFill>
+              </a:rPr>
+              <a:t>R Code Highlights:</a:t>
+            </a:r>
+            <a:br>
+              <a:rPr lang="en-US" b="0" dirty="0">
+                <a:solidFill>
+                  <a:schemeClr val="accent1"/>
+                </a:solidFill>
+              </a:rPr>
+            </a:br>
+            <a:r>
+              <a:rPr lang="en-US" b="0" dirty="0">
+                <a:solidFill>
+                  <a:schemeClr val="accent1"/>
+                </a:solidFill>
+              </a:rPr>
+              <a:t>     - </a:t>
+            </a:r>
+            <a:r>
+              <a:rPr lang="en-US" dirty="0">
+                <a:solidFill>
+                  <a:schemeClr val="accent1"/>
+                </a:solidFill>
+              </a:rPr>
+              <a:t>switch</a:t>
+            </a:r>
+            <a:r>
+              <a:rPr lang="en-US" b="0" dirty="0">
+                <a:solidFill>
+                  <a:schemeClr val="accent1"/>
+                </a:solidFill>
+              </a:rPr>
+              <a:t> function</a:t>
+            </a:r>
+            <a:br>
+              <a:rPr lang="en-US" b="0" dirty="0">
+                <a:solidFill>
+                  <a:schemeClr val="accent1"/>
+                </a:solidFill>
+              </a:rPr>
+            </a:br>
+            <a:r>
+              <a:rPr lang="en-US" b="0" dirty="0">
+                <a:solidFill>
+                  <a:schemeClr val="accent1"/>
+                </a:solidFill>
+              </a:rPr>
+              <a:t>     - </a:t>
+            </a:r>
+            <a:r>
+              <a:rPr lang="en-US" dirty="0" err="1">
+                <a:solidFill>
+                  <a:schemeClr val="accent1"/>
+                </a:solidFill>
+              </a:rPr>
+              <a:t>geom_segment</a:t>
+            </a:r>
+            <a:r>
+              <a:rPr lang="en-US" b="0" dirty="0">
+                <a:solidFill>
+                  <a:schemeClr val="accent1"/>
+                </a:solidFill>
+              </a:rPr>
+              <a:t>()</a:t>
+            </a:r>
+            <a:br>
+              <a:rPr lang="en-US" b="0" dirty="0">
+                <a:solidFill>
+                  <a:schemeClr val="accent1"/>
+                </a:solidFill>
+              </a:rPr>
+            </a:br>
+            <a:r>
+              <a:rPr lang="en-US" b="0" dirty="0">
+                <a:solidFill>
+                  <a:schemeClr val="accent1"/>
+                </a:solidFill>
+              </a:rPr>
+              <a:t>     - hex sticker</a:t>
+            </a:r>
+            <a:br>
+              <a:rPr lang="en-US" b="0" dirty="0">
+                <a:solidFill>
+                  <a:schemeClr val="accent1"/>
+                </a:solidFill>
+              </a:rPr>
+            </a:br>
+            <a:r>
+              <a:rPr lang="en-US" b="0" dirty="0">
+                <a:solidFill>
+                  <a:schemeClr val="accent1"/>
+                </a:solidFill>
+              </a:rPr>
+              <a:t>     - Hosting a shiny app</a:t>
+            </a:r>
+          </a:p>
+        </p:txBody>
+      </p:sp>
+      <p:sp>
+        <p:nvSpPr>
+          <p:cNvPr id="3" name="Slide Number Placeholder 2">
             <a:extLst>
               <a:ext uri="{FF2B5EF4-FFF2-40B4-BE49-F238E27FC236}">
-                <a16:creationId xmlns:a16="http://schemas.microsoft.com/office/drawing/2014/main" id="{37D822AF-540B-214E-B542-6AE753E53894}"/>
+                <a16:creationId xmlns:a16="http://schemas.microsoft.com/office/drawing/2014/main" id="{D3905B7C-8E7D-4914-A81F-D023D3B49551}"/>
               </a:ext>
             </a:extLst>
           </p:cNvPr>
@@ -9025,59 +8968,7 @@
             <a:spLocks noGrp="1"/>
           </p:cNvSpPr>
           <p:nvPr>
-            <p:ph idx="1"/>
-          </p:nvPr>
-        </p:nvSpPr>
-        <p:spPr/>
-        <p:txBody>
-          <a:bodyPr/>
-          <a:lstStyle/>
-          <a:p>
-            <a:r>
-              <a:rPr lang="en-US" sz="2400" dirty="0" err="1"/>
-              <a:t>timetrackR</a:t>
-            </a:r>
-            <a:r>
-              <a:rPr lang="en-US" sz="2400" dirty="0"/>
-              <a:t> originated as a traditional shiny app</a:t>
-            </a:r>
-          </a:p>
-          <a:p>
-            <a:pPr lvl="1"/>
-            <a:r>
-              <a:rPr lang="en-US" sz="2000" dirty="0"/>
-              <a:t>Previously relied on manual time tracking via Excel spreadsheet</a:t>
-            </a:r>
-          </a:p>
-          <a:p>
-            <a:r>
-              <a:rPr lang="en-US" sz="2400" dirty="0"/>
-              <a:t>Its current form is a </a:t>
-            </a:r>
-            <a:r>
-              <a:rPr lang="en-US" sz="2400" b="1" dirty="0" err="1">
-                <a:hlinkClick r:id="rId2"/>
-              </a:rPr>
-              <a:t>shinydashboard</a:t>
-            </a:r>
-            <a:endParaRPr lang="en-US" sz="2400" b="1" dirty="0"/>
-          </a:p>
-        </p:txBody>
-      </p:sp>
-      <p:sp>
-        <p:nvSpPr>
-          <p:cNvPr id="4" name="Slide Number Placeholder 3">
-            <a:extLst>
-              <a:ext uri="{FF2B5EF4-FFF2-40B4-BE49-F238E27FC236}">
-                <a16:creationId xmlns:a16="http://schemas.microsoft.com/office/drawing/2014/main" id="{5CB1DA3E-FDCF-744F-9507-ED683C5ED69C}"/>
-              </a:ext>
-            </a:extLst>
-          </p:cNvPr>
-          <p:cNvSpPr>
-            <a:spLocks noGrp="1"/>
-          </p:cNvSpPr>
-          <p:nvPr>
-            <p:ph type="sldNum" sz="quarter" idx="4"/>
+            <p:ph type="sldNum" sz="quarter" idx="11"/>
           </p:nvPr>
         </p:nvSpPr>
         <p:spPr/>
@@ -9089,6 +8980,146 @@
               <a:rPr lang="en-US" smtClean="0"/>
               <a:pPr/>
               <a:t>27</a:t>
+            </a:fld>
+            <a:endParaRPr lang="en-US"/>
+          </a:p>
+        </p:txBody>
+      </p:sp>
+    </p:spTree>
+    <p:extLst>
+      <p:ext uri="{BB962C8B-B14F-4D97-AF65-F5344CB8AC3E}">
+        <p14:creationId xmlns:p14="http://schemas.microsoft.com/office/powerpoint/2010/main" val="3104528174"/>
+      </p:ext>
+    </p:extLst>
+  </p:cSld>
+  <p:clrMapOvr>
+    <a:masterClrMapping/>
+  </p:clrMapOvr>
+</p:sld>
+</file>
+
+<file path=ppt/slides/slide28.xml><?xml version="1.0" encoding="utf-8"?>
+<p:sld xmlns:a="http://schemas.openxmlformats.org/drawingml/2006/main" xmlns:r="http://schemas.openxmlformats.org/officeDocument/2006/relationships" xmlns:p="http://schemas.openxmlformats.org/presentationml/2006/main">
+  <p:cSld>
+    <p:spTree>
+      <p:nvGrpSpPr>
+        <p:cNvPr id="1" name=""/>
+        <p:cNvGrpSpPr/>
+        <p:nvPr/>
+      </p:nvGrpSpPr>
+      <p:grpSpPr>
+        <a:xfrm>
+          <a:off x="0" y="0"/>
+          <a:ext cx="0" cy="0"/>
+          <a:chOff x="0" y="0"/>
+          <a:chExt cx="0" cy="0"/>
+        </a:xfrm>
+      </p:grpSpPr>
+      <p:sp>
+        <p:nvSpPr>
+          <p:cNvPr id="2" name="Title 1">
+            <a:extLst>
+              <a:ext uri="{FF2B5EF4-FFF2-40B4-BE49-F238E27FC236}">
+                <a16:creationId xmlns:a16="http://schemas.microsoft.com/office/drawing/2014/main" id="{4BA35181-2264-4945-B7E3-8EB3E27DD03F}"/>
+              </a:ext>
+            </a:extLst>
+          </p:cNvPr>
+          <p:cNvSpPr>
+            <a:spLocks noGrp="1"/>
+          </p:cNvSpPr>
+          <p:nvPr>
+            <p:ph type="title"/>
+          </p:nvPr>
+        </p:nvSpPr>
+        <p:spPr/>
+        <p:txBody>
+          <a:bodyPr/>
+          <a:lstStyle/>
+          <a:p>
+            <a:r>
+              <a:rPr lang="en-US" dirty="0"/>
+              <a:t>Behind the scenes</a:t>
+            </a:r>
+          </a:p>
+        </p:txBody>
+      </p:sp>
+      <p:sp>
+        <p:nvSpPr>
+          <p:cNvPr id="3" name="Content Placeholder 2">
+            <a:extLst>
+              <a:ext uri="{FF2B5EF4-FFF2-40B4-BE49-F238E27FC236}">
+                <a16:creationId xmlns:a16="http://schemas.microsoft.com/office/drawing/2014/main" id="{37D822AF-540B-214E-B542-6AE753E53894}"/>
+              </a:ext>
+            </a:extLst>
+          </p:cNvPr>
+          <p:cNvSpPr>
+            <a:spLocks noGrp="1"/>
+          </p:cNvSpPr>
+          <p:nvPr>
+            <p:ph idx="1"/>
+          </p:nvPr>
+        </p:nvSpPr>
+        <p:spPr/>
+        <p:txBody>
+          <a:bodyPr/>
+          <a:lstStyle/>
+          <a:p>
+            <a:r>
+              <a:rPr lang="en-US" sz="2400" dirty="0" err="1"/>
+              <a:t>timetrackR</a:t>
+            </a:r>
+            <a:r>
+              <a:rPr lang="en-US" sz="2400" dirty="0"/>
+              <a:t> originated as a traditional shiny app</a:t>
+            </a:r>
+          </a:p>
+          <a:p>
+            <a:pPr lvl="1"/>
+            <a:r>
+              <a:rPr lang="en-US" sz="2000" dirty="0"/>
+              <a:t>Previously relied on manual time tracking via Excel spreadsheet</a:t>
+            </a:r>
+          </a:p>
+          <a:p>
+            <a:r>
+              <a:rPr lang="en-US" sz="2400" dirty="0"/>
+              <a:t>Its current form is a </a:t>
+            </a:r>
+            <a:r>
+              <a:rPr lang="en-US" sz="2400" b="1" dirty="0" err="1">
+                <a:hlinkClick r:id="rId2"/>
+              </a:rPr>
+              <a:t>shinydashboard</a:t>
+            </a:r>
+            <a:endParaRPr lang="en-US" sz="2400" b="1" dirty="0"/>
+          </a:p>
+        </p:txBody>
+      </p:sp>
+      <p:sp>
+        <p:nvSpPr>
+          <p:cNvPr id="4" name="Slide Number Placeholder 3">
+            <a:extLst>
+              <a:ext uri="{FF2B5EF4-FFF2-40B4-BE49-F238E27FC236}">
+                <a16:creationId xmlns:a16="http://schemas.microsoft.com/office/drawing/2014/main" id="{5CB1DA3E-FDCF-744F-9507-ED683C5ED69C}"/>
+              </a:ext>
+            </a:extLst>
+          </p:cNvPr>
+          <p:cNvSpPr>
+            <a:spLocks noGrp="1"/>
+          </p:cNvSpPr>
+          <p:nvPr>
+            <p:ph type="sldNum" sz="quarter" idx="4"/>
+          </p:nvPr>
+        </p:nvSpPr>
+        <p:spPr/>
+        <p:txBody>
+          <a:bodyPr/>
+          <a:lstStyle/>
+          <a:p>
+            <a:fld id="{1C3486A8-E8FB-4965-B61C-9B9FA7DC7BEE}" type="slidenum">
+              <a:rPr lang="en-US" smtClean="0"/>
+              <a:pPr/>
+              <a:t>28</a:t>
             </a:fld>
             <a:endParaRPr lang="en-US"/>
           </a:p>
@@ -9137,157 +9168,6 @@
 </p:sld>
 </file>
 
-<file path=ppt/slides/slide28.xml><?xml version="1.0" encoding="utf-8"?>
-<p:sld xmlns:a="http://schemas.openxmlformats.org/drawingml/2006/main" xmlns:r="http://schemas.openxmlformats.org/officeDocument/2006/relationships" xmlns:p="http://schemas.openxmlformats.org/presentationml/2006/main">
-  <p:cSld>
-    <p:spTree>
-      <p:nvGrpSpPr>
-        <p:cNvPr id="1" name=""/>
-        <p:cNvGrpSpPr/>
-        <p:nvPr/>
-      </p:nvGrpSpPr>
-      <p:grpSpPr>
-        <a:xfrm>
-          <a:off x="0" y="0"/>
-          <a:ext cx="0" cy="0"/>
-          <a:chOff x="0" y="0"/>
-          <a:chExt cx="0" cy="0"/>
-        </a:xfrm>
-      </p:grpSpPr>
-      <p:sp>
-        <p:nvSpPr>
-          <p:cNvPr id="2" name="Title 1">
-            <a:extLst>
-              <a:ext uri="{FF2B5EF4-FFF2-40B4-BE49-F238E27FC236}">
-                <a16:creationId xmlns:a16="http://schemas.microsoft.com/office/drawing/2014/main" id="{240F9A70-6D57-4D90-A9B1-9D51FC41F5F9}"/>
-              </a:ext>
-            </a:extLst>
-          </p:cNvPr>
-          <p:cNvSpPr>
-            <a:spLocks noGrp="1"/>
-          </p:cNvSpPr>
-          <p:nvPr>
-            <p:ph type="title"/>
-          </p:nvPr>
-        </p:nvSpPr>
-        <p:spPr/>
-        <p:txBody>
-          <a:bodyPr/>
-          <a:lstStyle/>
-          <a:p>
-            <a:r>
-              <a:rPr lang="en-US" dirty="0"/>
-              <a:t>The </a:t>
-            </a:r>
-            <a:r>
-              <a:rPr lang="en-US" dirty="0">
-                <a:solidFill>
-                  <a:schemeClr val="accent2"/>
-                </a:solidFill>
-              </a:rPr>
-              <a:t>switch</a:t>
-            </a:r>
-            <a:r>
-              <a:rPr lang="en-US" dirty="0"/>
-              <a:t> function</a:t>
-            </a:r>
-          </a:p>
-        </p:txBody>
-      </p:sp>
-      <p:sp>
-        <p:nvSpPr>
-          <p:cNvPr id="3" name="Content Placeholder 2">
-            <a:extLst>
-              <a:ext uri="{FF2B5EF4-FFF2-40B4-BE49-F238E27FC236}">
-                <a16:creationId xmlns:a16="http://schemas.microsoft.com/office/drawing/2014/main" id="{7B7B1E04-3197-475B-9A06-7AC8072CFE05}"/>
-              </a:ext>
-            </a:extLst>
-          </p:cNvPr>
-          <p:cNvSpPr>
-            <a:spLocks noGrp="1"/>
-          </p:cNvSpPr>
-          <p:nvPr>
-            <p:ph idx="1"/>
-          </p:nvPr>
-        </p:nvSpPr>
-        <p:spPr/>
-        <p:txBody>
-          <a:bodyPr/>
-          <a:lstStyle/>
-          <a:p>
-            <a:r>
-              <a:rPr lang="en-US" sz="2400" dirty="0"/>
-              <a:t>Used to update the figure depending on which input (statistician, date range, project status) is selected</a:t>
-            </a:r>
-          </a:p>
-          <a:p>
-            <a:r>
-              <a:rPr lang="en-US" sz="2400" dirty="0"/>
-              <a:t>To display the bar chart for active projects or for all projects:</a:t>
-            </a:r>
-          </a:p>
-          <a:p>
-            <a:pPr lvl="1"/>
-            <a:r>
-              <a:rPr lang="en-US" sz="2000" dirty="0"/>
-              <a:t>Utilize radio button so that user can select active or all projects</a:t>
-            </a:r>
-          </a:p>
-          <a:p>
-            <a:pPr lvl="1"/>
-            <a:r>
-              <a:rPr lang="en-US" sz="2000" dirty="0"/>
-              <a:t>Use the switch function to update the data frame depending on which is selected</a:t>
-            </a:r>
-          </a:p>
-          <a:p>
-            <a:endParaRPr lang="en-US" sz="2400" dirty="0"/>
-          </a:p>
-        </p:txBody>
-      </p:sp>
-      <p:sp>
-        <p:nvSpPr>
-          <p:cNvPr id="5" name="Slide Number Placeholder 4">
-            <a:extLst>
-              <a:ext uri="{FF2B5EF4-FFF2-40B4-BE49-F238E27FC236}">
-                <a16:creationId xmlns:a16="http://schemas.microsoft.com/office/drawing/2014/main" id="{AF018047-E10A-49DD-B1CA-6203BEAF485B}"/>
-              </a:ext>
-            </a:extLst>
-          </p:cNvPr>
-          <p:cNvSpPr>
-            <a:spLocks noGrp="1"/>
-          </p:cNvSpPr>
-          <p:nvPr>
-            <p:ph type="sldNum" sz="quarter" idx="4"/>
-          </p:nvPr>
-        </p:nvSpPr>
-        <p:spPr/>
-        <p:txBody>
-          <a:bodyPr/>
-          <a:lstStyle/>
-          <a:p>
-            <a:fld id="{1C3486A8-E8FB-4965-B61C-9B9FA7DC7BEE}" type="slidenum">
-              <a:rPr lang="en-US" smtClean="0"/>
-              <a:pPr/>
-              <a:t>28</a:t>
-            </a:fld>
-            <a:endParaRPr lang="en-US"/>
-          </a:p>
-        </p:txBody>
-      </p:sp>
-    </p:spTree>
-    <p:extLst>
-      <p:ext uri="{BB962C8B-B14F-4D97-AF65-F5344CB8AC3E}">
-        <p14:creationId xmlns:p14="http://schemas.microsoft.com/office/powerpoint/2010/main" val="3858287000"/>
-      </p:ext>
-    </p:extLst>
-  </p:cSld>
-  <p:clrMapOvr>
-    <a:masterClrMapping/>
-  </p:clrMapOvr>
-</p:sld>
-</file>
-
 <file path=ppt/slides/slide29.xml><?xml version="1.0" encoding="utf-8"?>
 <p:sld xmlns:a="http://schemas.openxmlformats.org/drawingml/2006/main" xmlns:r="http://schemas.openxmlformats.org/officeDocument/2006/relationships" xmlns:p="http://schemas.openxmlformats.org/presentationml/2006/main">
   <p:cSld>
@@ -9328,7 +9208,19 @@
           <a:p>
             <a:r>
               <a:rPr lang="en-US" dirty="0"/>
-              <a:t>switch function: Bar chart application</a:t>
+              <a:t>The </a:t>
+            </a:r>
+            <a:r>
+              <a:rPr lang="en-US" dirty="0">
+                <a:solidFill>
+                  <a:schemeClr val="accent2"/>
+                </a:solidFill>
+              </a:rPr>
+              <a:t>switch</a:t>
+            </a:r>
+            <a:r>
+              <a:rPr lang="en-US" dirty="0"/>
+              <a:t> function</a:t>
             </a:r>
           </a:p>
         </p:txBody>
@@ -9354,408 +9246,42 @@
           <a:bodyPr/>
           <a:lstStyle/>
           <a:p>
-            <a:pPr marL="0" indent="0">
-              <a:buNone/>
-            </a:pPr>
+            <a:r>
+              <a:rPr lang="en-US" sz="2400" dirty="0"/>
+              <a:t>Used to update the figure depending on which input (statistician, date range, project status) is selected</a:t>
+            </a:r>
+          </a:p>
+          <a:p>
+            <a:r>
+              <a:rPr lang="en-US" sz="2400" dirty="0"/>
+              <a:t>To display the bar chart for active projects or for all projects:</a:t>
+            </a:r>
+          </a:p>
+          <a:p>
+            <a:pPr lvl="1"/>
             <a:r>
               <a:rPr lang="en-US" sz="2000" dirty="0"/>
-              <a:t>App interface:</a:t>
-            </a:r>
+              <a:t>Utilize radio button so that user can select active or all projects</a:t>
+            </a:r>
+          </a:p>
+          <a:p>
+            <a:pPr lvl="1"/>
+            <a:r>
+              <a:rPr lang="en-US" sz="2000" dirty="0"/>
+              <a:t>Use the switch function to update the data frame depending on which is selected</a:t>
+            </a:r>
+          </a:p>
+          <a:p>
             <a:endParaRPr lang="en-US" sz="2400" dirty="0"/>
           </a:p>
-          <a:p>
-            <a:endParaRPr lang="en-US" sz="2400" dirty="0"/>
-          </a:p>
-          <a:p>
-            <a:endParaRPr lang="en-US" sz="2400" dirty="0"/>
-          </a:p>
-          <a:p>
-            <a:endParaRPr lang="en-US" sz="2400" dirty="0"/>
-          </a:p>
-          <a:p>
-            <a:endParaRPr lang="en-US" sz="2400" dirty="0"/>
-          </a:p>
-          <a:p>
-            <a:r>
-              <a:rPr lang="en-US" sz="1800" dirty="0" err="1">
-                <a:latin typeface="Courier"/>
-              </a:rPr>
-              <a:t>input$status_filter_bar</a:t>
-            </a:r>
-            <a:r>
-              <a:rPr lang="en-US" sz="1800" dirty="0">
-                <a:latin typeface="Courier"/>
-              </a:rPr>
-              <a:t> </a:t>
-            </a:r>
-            <a:r>
-              <a:rPr lang="en-US" sz="2000" dirty="0"/>
-              <a:t>returns either “Active projects” or “All projects” depending on which radio button is selected </a:t>
-            </a:r>
-          </a:p>
-          <a:p>
-            <a:r>
-              <a:rPr lang="en-US" sz="2000" dirty="0"/>
-              <a:t>Code (</a:t>
-            </a:r>
-            <a:r>
-              <a:rPr lang="en-US" sz="2000" dirty="0" err="1"/>
-              <a:t>server.R</a:t>
-            </a:r>
-            <a:r>
-              <a:rPr lang="en-US" sz="2000" dirty="0"/>
-              <a:t>):</a:t>
-            </a:r>
-            <a:endParaRPr lang="en-US" sz="2400" dirty="0"/>
-          </a:p>
-          <a:p>
-            <a:endParaRPr lang="en-US" sz="2400" dirty="0"/>
-          </a:p>
-          <a:p>
-            <a:endParaRPr lang="en-US" sz="1600" dirty="0">
-              <a:latin typeface="Courier"/>
-            </a:endParaRPr>
-          </a:p>
-          <a:p>
-            <a:endParaRPr lang="en-US" sz="1600" dirty="0">
-              <a:latin typeface="Courier"/>
-            </a:endParaRPr>
-          </a:p>
-          <a:p>
-            <a:endParaRPr lang="en-US" sz="1800" dirty="0"/>
-          </a:p>
-          <a:p>
-            <a:r>
-              <a:rPr lang="en-US" sz="1800" dirty="0"/>
-              <a:t>Using switch function to subset the data on active projects if needed, otherwise proceeding with all projects</a:t>
-            </a:r>
-            <a:endParaRPr lang="en-US" sz="2400" dirty="0"/>
-          </a:p>
-          <a:p>
-            <a:endParaRPr lang="en-US" sz="2400" dirty="0"/>
-          </a:p>
-          <a:p>
-            <a:endParaRPr lang="en-US" sz="2400" dirty="0"/>
-          </a:p>
-        </p:txBody>
-      </p:sp>
-      <p:sp>
-        <p:nvSpPr>
-          <p:cNvPr id="6" name="Rectangle 5">
+        </p:txBody>
+      </p:sp>
+      <p:sp>
+        <p:nvSpPr>
+          <p:cNvPr id="5" name="Slide Number Placeholder 4">
             <a:extLst>
               <a:ext uri="{FF2B5EF4-FFF2-40B4-BE49-F238E27FC236}">
-                <a16:creationId xmlns:a16="http://schemas.microsoft.com/office/drawing/2014/main" id="{9A8554B4-C3D3-4D86-8F01-5351C0BDE7A5}"/>
-              </a:ext>
-            </a:extLst>
-          </p:cNvPr>
-          <p:cNvSpPr/>
-          <p:nvPr/>
-        </p:nvSpPr>
-        <p:spPr>
-          <a:xfrm>
-            <a:off x="1100363" y="4508818"/>
-            <a:ext cx="6741459" cy="954107"/>
-          </a:xfrm>
-          <a:prstGeom prst="rect">
-            <a:avLst/>
-          </a:prstGeom>
-        </p:spPr>
-        <p:style>
-          <a:lnRef idx="2">
-            <a:schemeClr val="accent2"/>
-          </a:lnRef>
-          <a:fillRef idx="1">
-            <a:schemeClr val="lt1"/>
-          </a:fillRef>
-          <a:effectRef idx="0">
-            <a:schemeClr val="accent2"/>
-          </a:effectRef>
-          <a:fontRef idx="minor">
-            <a:schemeClr val="dk1"/>
-          </a:fontRef>
-        </p:style>
-        <p:txBody>
-          <a:bodyPr wrap="square">
-            <a:spAutoFit/>
-          </a:bodyPr>
-          <a:lstStyle/>
-          <a:p>
-            <a:r>
-              <a:rPr lang="en-US" sz="1400" b="1" dirty="0">
-                <a:solidFill>
-                  <a:srgbClr val="007020"/>
-                </a:solidFill>
-                <a:latin typeface="Courier"/>
-              </a:rPr>
-              <a:t>switch</a:t>
-            </a:r>
-            <a:r>
-              <a:rPr lang="en-US" sz="1400" dirty="0">
-                <a:latin typeface="Courier"/>
-              </a:rPr>
-              <a:t>(</a:t>
-            </a:r>
-            <a:r>
-              <a:rPr lang="en-US" sz="1400" dirty="0" err="1">
-                <a:latin typeface="Courier"/>
-              </a:rPr>
-              <a:t>input</a:t>
-            </a:r>
-            <a:r>
-              <a:rPr lang="en-US" sz="1400" dirty="0" err="1">
-                <a:solidFill>
-                  <a:srgbClr val="666666"/>
-                </a:solidFill>
-                <a:latin typeface="Courier"/>
-              </a:rPr>
-              <a:t>$</a:t>
-            </a:r>
-            <a:r>
-              <a:rPr lang="en-US" sz="1400" dirty="0" err="1">
-                <a:latin typeface="Courier"/>
-              </a:rPr>
-              <a:t>status_filter_bar</a:t>
-            </a:r>
-            <a:r>
-              <a:rPr lang="en-US" sz="1400" dirty="0">
-                <a:latin typeface="Courier"/>
-              </a:rPr>
-              <a:t>,</a:t>
-            </a:r>
-            <a:br>
-              <a:rPr lang="en-US" sz="2400" dirty="0"/>
-            </a:br>
-            <a:r>
-              <a:rPr lang="en-US" sz="1400" dirty="0">
-                <a:latin typeface="Courier"/>
-              </a:rPr>
-              <a:t>           </a:t>
-            </a:r>
-            <a:r>
-              <a:rPr lang="en-US" sz="1400" dirty="0">
-                <a:solidFill>
-                  <a:srgbClr val="4070A0"/>
-                </a:solidFill>
-                <a:latin typeface="Courier"/>
-              </a:rPr>
-              <a:t>"Active projects"</a:t>
-            </a:r>
-            <a:r>
-              <a:rPr lang="en-US" sz="1400" dirty="0">
-                <a:latin typeface="Courier"/>
-              </a:rPr>
-              <a:t> =</a:t>
-            </a:r>
-            <a:r>
-              <a:rPr lang="en-US" sz="1400" dirty="0">
-                <a:solidFill>
-                  <a:srgbClr val="4070A0"/>
-                </a:solidFill>
-                <a:latin typeface="Courier"/>
-              </a:rPr>
-              <a:t> </a:t>
-            </a:r>
-            <a:r>
-              <a:rPr lang="en-US" sz="1400" dirty="0" err="1">
-                <a:latin typeface="Courier"/>
-              </a:rPr>
-              <a:t>bar_filtered</a:t>
-            </a:r>
-            <a:r>
-              <a:rPr lang="en-US" sz="1400" dirty="0">
-                <a:latin typeface="Courier"/>
-              </a:rPr>
-              <a:t> &lt;-</a:t>
-            </a:r>
-            <a:r>
-              <a:rPr lang="en-US" sz="1400" dirty="0">
-                <a:solidFill>
-                  <a:srgbClr val="4070A0"/>
-                </a:solidFill>
-                <a:latin typeface="Courier"/>
-              </a:rPr>
-              <a:t> </a:t>
-            </a:r>
-            <a:r>
-              <a:rPr lang="en-US" sz="1400" dirty="0">
-                <a:latin typeface="Courier"/>
-              </a:rPr>
-              <a:t>tracker </a:t>
-            </a:r>
-            <a:r>
-              <a:rPr lang="en-US" sz="1400" dirty="0">
-                <a:solidFill>
-                  <a:srgbClr val="666666"/>
-                </a:solidFill>
-                <a:latin typeface="Courier"/>
-              </a:rPr>
-              <a:t>%&gt;%</a:t>
-            </a:r>
-            <a:r>
-              <a:rPr lang="en-US" sz="1400" dirty="0">
-                <a:solidFill>
-                  <a:srgbClr val="4070A0"/>
-                </a:solidFill>
-                <a:latin typeface="Courier"/>
-              </a:rPr>
-              <a:t> </a:t>
-            </a:r>
-            <a:br>
-              <a:rPr lang="en-US" sz="2400" dirty="0"/>
-            </a:br>
-            <a:r>
-              <a:rPr lang="en-US" sz="1400" dirty="0">
-                <a:solidFill>
-                  <a:srgbClr val="4070A0"/>
-                </a:solidFill>
-                <a:latin typeface="Courier"/>
-              </a:rPr>
-              <a:t>             </a:t>
-            </a:r>
-            <a:r>
-              <a:rPr lang="en-US" sz="1400" b="1" dirty="0">
-                <a:solidFill>
-                  <a:srgbClr val="007020"/>
-                </a:solidFill>
-                <a:latin typeface="Courier"/>
-              </a:rPr>
-              <a:t>filter</a:t>
-            </a:r>
-            <a:r>
-              <a:rPr lang="en-US" sz="1400" dirty="0">
-                <a:latin typeface="Courier"/>
-              </a:rPr>
-              <a:t>(status </a:t>
-            </a:r>
-            <a:r>
-              <a:rPr lang="en-US" sz="1400" dirty="0">
-                <a:solidFill>
-                  <a:srgbClr val="666666"/>
-                </a:solidFill>
-                <a:latin typeface="Courier"/>
-              </a:rPr>
-              <a:t>==</a:t>
-            </a:r>
-            <a:r>
-              <a:rPr lang="en-US" sz="1400" dirty="0">
-                <a:solidFill>
-                  <a:srgbClr val="4070A0"/>
-                </a:solidFill>
-                <a:latin typeface="Courier"/>
-              </a:rPr>
-              <a:t> "Active"</a:t>
-            </a:r>
-            <a:r>
-              <a:rPr lang="en-US" sz="1400" dirty="0">
-                <a:latin typeface="Courier"/>
-              </a:rPr>
-              <a:t>),</a:t>
-            </a:r>
-            <a:br>
-              <a:rPr lang="en-US" sz="2400" dirty="0"/>
-            </a:br>
-            <a:r>
-              <a:rPr lang="en-US" sz="1400" dirty="0">
-                <a:latin typeface="Courier"/>
-              </a:rPr>
-              <a:t>           </a:t>
-            </a:r>
-            <a:r>
-              <a:rPr lang="en-US" sz="1400" dirty="0">
-                <a:solidFill>
-                  <a:srgbClr val="4070A0"/>
-                </a:solidFill>
-                <a:latin typeface="Courier"/>
-              </a:rPr>
-              <a:t>"All projects"</a:t>
-            </a:r>
-            <a:r>
-              <a:rPr lang="en-US" sz="1400" dirty="0">
-                <a:latin typeface="Courier"/>
-              </a:rPr>
-              <a:t> =</a:t>
-            </a:r>
-            <a:r>
-              <a:rPr lang="en-US" sz="1400" dirty="0">
-                <a:solidFill>
-                  <a:srgbClr val="4070A0"/>
-                </a:solidFill>
-                <a:latin typeface="Courier"/>
-              </a:rPr>
-              <a:t> </a:t>
-            </a:r>
-            <a:r>
-              <a:rPr lang="en-US" sz="1400" dirty="0" err="1">
-                <a:latin typeface="Courier"/>
-              </a:rPr>
-              <a:t>bar_filtered</a:t>
-            </a:r>
-            <a:r>
-              <a:rPr lang="en-US" sz="1400" dirty="0">
-                <a:latin typeface="Courier"/>
-              </a:rPr>
-              <a:t> &lt;-</a:t>
-            </a:r>
-            <a:r>
-              <a:rPr lang="en-US" sz="1400" dirty="0">
-                <a:solidFill>
-                  <a:srgbClr val="4070A0"/>
-                </a:solidFill>
-                <a:latin typeface="Courier"/>
-              </a:rPr>
-              <a:t> </a:t>
-            </a:r>
-            <a:r>
-              <a:rPr lang="en-US" sz="1400" dirty="0">
-                <a:latin typeface="Courier"/>
-              </a:rPr>
-              <a:t>tracker)</a:t>
-            </a:r>
-            <a:endParaRPr lang="en-US" sz="1400" dirty="0"/>
-          </a:p>
-        </p:txBody>
-      </p:sp>
-      <p:pic>
-        <p:nvPicPr>
-          <p:cNvPr id="7" name="Picture 6">
-            <a:extLst>
-              <a:ext uri="{FF2B5EF4-FFF2-40B4-BE49-F238E27FC236}">
-                <a16:creationId xmlns:a16="http://schemas.microsoft.com/office/drawing/2014/main" id="{ACF31CA0-F4F7-46F7-9DBC-96F4F9115B72}"/>
-              </a:ext>
-            </a:extLst>
-          </p:cNvPr>
-          <p:cNvPicPr>
-            <a:picLocks noChangeAspect="1"/>
-          </p:cNvPicPr>
-          <p:nvPr/>
-        </p:nvPicPr>
-        <p:blipFill>
-          <a:blip r:embed="rId2"/>
-          <a:stretch>
-            <a:fillRect/>
-          </a:stretch>
-        </p:blipFill>
-        <p:spPr>
-          <a:xfrm>
-            <a:off x="1234834" y="1632821"/>
-            <a:ext cx="4843237" cy="1594724"/>
-          </a:xfrm>
-          <a:prstGeom prst="rect">
-            <a:avLst/>
-          </a:prstGeom>
-          <a:ln w="28575">
-            <a:solidFill>
-              <a:schemeClr val="accent2"/>
-            </a:solidFill>
-          </a:ln>
-        </p:spPr>
-      </p:pic>
-      <p:sp>
-        <p:nvSpPr>
-          <p:cNvPr id="5" name="Slide Number Placeholder 4">
-            <a:extLst>
-              <a:ext uri="{FF2B5EF4-FFF2-40B4-BE49-F238E27FC236}">
-                <a16:creationId xmlns:a16="http://schemas.microsoft.com/office/drawing/2014/main" id="{13AAA3A0-3A7B-46E7-9865-E7A5C376ACC9}"/>
+                <a16:creationId xmlns:a16="http://schemas.microsoft.com/office/drawing/2014/main" id="{AF018047-E10A-49DD-B1CA-6203BEAF485B}"/>
               </a:ext>
             </a:extLst>
           </p:cNvPr>
@@ -9783,7 +9309,7 @@
     </p:spTree>
     <p:extLst>
       <p:ext uri="{BB962C8B-B14F-4D97-AF65-F5344CB8AC3E}">
-        <p14:creationId xmlns:p14="http://schemas.microsoft.com/office/powerpoint/2010/main" val="1947615113"/>
+        <p14:creationId xmlns:p14="http://schemas.microsoft.com/office/powerpoint/2010/main" val="3858287000"/>
       </p:ext>
     </p:extLst>
   </p:cSld>
@@ -10029,7 +9555,7 @@
           <a:p>
             <a:r>
               <a:rPr lang="en-US" dirty="0"/>
-              <a:t>Project Timeline</a:t>
+              <a:t>switch function: Bar chart application</a:t>
             </a:r>
           </a:p>
         </p:txBody>
@@ -10055,47 +9581,408 @@
           <a:bodyPr/>
           <a:lstStyle/>
           <a:p>
-            <a:r>
-              <a:rPr lang="en-US" sz="2800" dirty="0"/>
-              <a:t>Made using </a:t>
-            </a:r>
-            <a:r>
-              <a:rPr lang="en-US" sz="2800" dirty="0" err="1">
-                <a:solidFill>
-                  <a:schemeClr val="accent1"/>
-                </a:solidFill>
-              </a:rPr>
-              <a:t>ggplot</a:t>
-            </a:r>
-            <a:r>
-              <a:rPr lang="en-US" sz="2800" dirty="0"/>
-              <a:t> with </a:t>
-            </a:r>
-            <a:r>
-              <a:rPr lang="en-US" sz="2800" dirty="0" err="1">
-                <a:solidFill>
-                  <a:schemeClr val="accent1"/>
-                </a:solidFill>
-              </a:rPr>
-              <a:t>geom_segment</a:t>
-            </a:r>
-            <a:r>
-              <a:rPr lang="en-US" sz="2800" dirty="0">
-                <a:solidFill>
-                  <a:schemeClr val="accent1"/>
-                </a:solidFill>
-              </a:rPr>
-              <a:t>()</a:t>
-            </a:r>
-          </a:p>
-        </p:txBody>
-      </p:sp>
+            <a:pPr marL="0" indent="0">
+              <a:buNone/>
+            </a:pPr>
+            <a:r>
+              <a:rPr lang="en-US" sz="2000" dirty="0"/>
+              <a:t>App interface:</a:t>
+            </a:r>
+            <a:endParaRPr lang="en-US" sz="2400" dirty="0"/>
+          </a:p>
+          <a:p>
+            <a:endParaRPr lang="en-US" sz="2400" dirty="0"/>
+          </a:p>
+          <a:p>
+            <a:endParaRPr lang="en-US" sz="2400" dirty="0"/>
+          </a:p>
+          <a:p>
+            <a:endParaRPr lang="en-US" sz="2400" dirty="0"/>
+          </a:p>
+          <a:p>
+            <a:endParaRPr lang="en-US" sz="2400" dirty="0"/>
+          </a:p>
+          <a:p>
+            <a:r>
+              <a:rPr lang="en-US" sz="1800" dirty="0" err="1">
+                <a:latin typeface="Courier"/>
+              </a:rPr>
+              <a:t>input$status_filter_bar</a:t>
+            </a:r>
+            <a:r>
+              <a:rPr lang="en-US" sz="1800" dirty="0">
+                <a:latin typeface="Courier"/>
+              </a:rPr>
+              <a:t> </a:t>
+            </a:r>
+            <a:r>
+              <a:rPr lang="en-US" sz="2000" dirty="0"/>
+              <a:t>returns either “Active projects” or “All projects” depending on which radio button is selected </a:t>
+            </a:r>
+          </a:p>
+          <a:p>
+            <a:r>
+              <a:rPr lang="en-US" sz="2000" dirty="0"/>
+              <a:t>Code (</a:t>
+            </a:r>
+            <a:r>
+              <a:rPr lang="en-US" sz="2000" dirty="0" err="1"/>
+              <a:t>server.R</a:t>
+            </a:r>
+            <a:r>
+              <a:rPr lang="en-US" sz="2000" dirty="0"/>
+              <a:t>):</a:t>
+            </a:r>
+            <a:endParaRPr lang="en-US" sz="2400" dirty="0"/>
+          </a:p>
+          <a:p>
+            <a:endParaRPr lang="en-US" sz="2400" dirty="0"/>
+          </a:p>
+          <a:p>
+            <a:endParaRPr lang="en-US" sz="1600" dirty="0">
+              <a:latin typeface="Courier"/>
+            </a:endParaRPr>
+          </a:p>
+          <a:p>
+            <a:endParaRPr lang="en-US" sz="1600" dirty="0">
+              <a:latin typeface="Courier"/>
+            </a:endParaRPr>
+          </a:p>
+          <a:p>
+            <a:endParaRPr lang="en-US" sz="1800" dirty="0"/>
+          </a:p>
+          <a:p>
+            <a:r>
+              <a:rPr lang="en-US" sz="1800" dirty="0"/>
+              <a:t>Using switch function to subset the data on active projects if needed, otherwise proceeding with all projects</a:t>
+            </a:r>
+            <a:endParaRPr lang="en-US" sz="2400" dirty="0"/>
+          </a:p>
+          <a:p>
+            <a:endParaRPr lang="en-US" sz="2400" dirty="0"/>
+          </a:p>
+          <a:p>
+            <a:endParaRPr lang="en-US" sz="2400" dirty="0"/>
+          </a:p>
+        </p:txBody>
+      </p:sp>
+      <p:sp>
+        <p:nvSpPr>
+          <p:cNvPr id="6" name="Rectangle 5">
+            <a:extLst>
+              <a:ext uri="{FF2B5EF4-FFF2-40B4-BE49-F238E27FC236}">
+                <a16:creationId xmlns:a16="http://schemas.microsoft.com/office/drawing/2014/main" id="{9A8554B4-C3D3-4D86-8F01-5351C0BDE7A5}"/>
+              </a:ext>
+            </a:extLst>
+          </p:cNvPr>
+          <p:cNvSpPr/>
+          <p:nvPr/>
+        </p:nvSpPr>
+        <p:spPr>
+          <a:xfrm>
+            <a:off x="1100363" y="4508818"/>
+            <a:ext cx="6741459" cy="954107"/>
+          </a:xfrm>
+          <a:prstGeom prst="rect">
+            <a:avLst/>
+          </a:prstGeom>
+        </p:spPr>
+        <p:style>
+          <a:lnRef idx="2">
+            <a:schemeClr val="accent2"/>
+          </a:lnRef>
+          <a:fillRef idx="1">
+            <a:schemeClr val="lt1"/>
+          </a:fillRef>
+          <a:effectRef idx="0">
+            <a:schemeClr val="accent2"/>
+          </a:effectRef>
+          <a:fontRef idx="minor">
+            <a:schemeClr val="dk1"/>
+          </a:fontRef>
+        </p:style>
+        <p:txBody>
+          <a:bodyPr wrap="square">
+            <a:spAutoFit/>
+          </a:bodyPr>
+          <a:lstStyle/>
+          <a:p>
+            <a:r>
+              <a:rPr lang="en-US" sz="1400" b="1" dirty="0">
+                <a:solidFill>
+                  <a:srgbClr val="007020"/>
+                </a:solidFill>
+                <a:latin typeface="Courier"/>
+              </a:rPr>
+              <a:t>switch</a:t>
+            </a:r>
+            <a:r>
+              <a:rPr lang="en-US" sz="1400" dirty="0">
+                <a:latin typeface="Courier"/>
+              </a:rPr>
+              <a:t>(</a:t>
+            </a:r>
+            <a:r>
+              <a:rPr lang="en-US" sz="1400" dirty="0" err="1">
+                <a:latin typeface="Courier"/>
+              </a:rPr>
+              <a:t>input</a:t>
+            </a:r>
+            <a:r>
+              <a:rPr lang="en-US" sz="1400" dirty="0" err="1">
+                <a:solidFill>
+                  <a:srgbClr val="666666"/>
+                </a:solidFill>
+                <a:latin typeface="Courier"/>
+              </a:rPr>
+              <a:t>$</a:t>
+            </a:r>
+            <a:r>
+              <a:rPr lang="en-US" sz="1400" dirty="0" err="1">
+                <a:latin typeface="Courier"/>
+              </a:rPr>
+              <a:t>status_filter_bar</a:t>
+            </a:r>
+            <a:r>
+              <a:rPr lang="en-US" sz="1400" dirty="0">
+                <a:latin typeface="Courier"/>
+              </a:rPr>
+              <a:t>,</a:t>
+            </a:r>
+            <a:br>
+              <a:rPr lang="en-US" sz="2400" dirty="0"/>
+            </a:br>
+            <a:r>
+              <a:rPr lang="en-US" sz="1400" dirty="0">
+                <a:latin typeface="Courier"/>
+              </a:rPr>
+              <a:t>           </a:t>
+            </a:r>
+            <a:r>
+              <a:rPr lang="en-US" sz="1400" dirty="0">
+                <a:solidFill>
+                  <a:srgbClr val="4070A0"/>
+                </a:solidFill>
+                <a:latin typeface="Courier"/>
+              </a:rPr>
+              <a:t>"Active projects"</a:t>
+            </a:r>
+            <a:r>
+              <a:rPr lang="en-US" sz="1400" dirty="0">
+                <a:latin typeface="Courier"/>
+              </a:rPr>
+              <a:t> =</a:t>
+            </a:r>
+            <a:r>
+              <a:rPr lang="en-US" sz="1400" dirty="0">
+                <a:solidFill>
+                  <a:srgbClr val="4070A0"/>
+                </a:solidFill>
+                <a:latin typeface="Courier"/>
+              </a:rPr>
+              <a:t> </a:t>
+            </a:r>
+            <a:r>
+              <a:rPr lang="en-US" sz="1400" dirty="0" err="1">
+                <a:latin typeface="Courier"/>
+              </a:rPr>
+              <a:t>bar_filtered</a:t>
+            </a:r>
+            <a:r>
+              <a:rPr lang="en-US" sz="1400" dirty="0">
+                <a:latin typeface="Courier"/>
+              </a:rPr>
+              <a:t> &lt;-</a:t>
+            </a:r>
+            <a:r>
+              <a:rPr lang="en-US" sz="1400" dirty="0">
+                <a:solidFill>
+                  <a:srgbClr val="4070A0"/>
+                </a:solidFill>
+                <a:latin typeface="Courier"/>
+              </a:rPr>
+              <a:t> </a:t>
+            </a:r>
+            <a:r>
+              <a:rPr lang="en-US" sz="1400" dirty="0">
+                <a:latin typeface="Courier"/>
+              </a:rPr>
+              <a:t>tracker </a:t>
+            </a:r>
+            <a:r>
+              <a:rPr lang="en-US" sz="1400" dirty="0">
+                <a:solidFill>
+                  <a:srgbClr val="666666"/>
+                </a:solidFill>
+                <a:latin typeface="Courier"/>
+              </a:rPr>
+              <a:t>%&gt;%</a:t>
+            </a:r>
+            <a:r>
+              <a:rPr lang="en-US" sz="1400" dirty="0">
+                <a:solidFill>
+                  <a:srgbClr val="4070A0"/>
+                </a:solidFill>
+                <a:latin typeface="Courier"/>
+              </a:rPr>
+              <a:t> </a:t>
+            </a:r>
+            <a:br>
+              <a:rPr lang="en-US" sz="2400" dirty="0"/>
+            </a:br>
+            <a:r>
+              <a:rPr lang="en-US" sz="1400" dirty="0">
+                <a:solidFill>
+                  <a:srgbClr val="4070A0"/>
+                </a:solidFill>
+                <a:latin typeface="Courier"/>
+              </a:rPr>
+              <a:t>             </a:t>
+            </a:r>
+            <a:r>
+              <a:rPr lang="en-US" sz="1400" b="1" dirty="0">
+                <a:solidFill>
+                  <a:srgbClr val="007020"/>
+                </a:solidFill>
+                <a:latin typeface="Courier"/>
+              </a:rPr>
+              <a:t>filter</a:t>
+            </a:r>
+            <a:r>
+              <a:rPr lang="en-US" sz="1400" dirty="0">
+                <a:latin typeface="Courier"/>
+              </a:rPr>
+              <a:t>(status </a:t>
+            </a:r>
+            <a:r>
+              <a:rPr lang="en-US" sz="1400" dirty="0">
+                <a:solidFill>
+                  <a:srgbClr val="666666"/>
+                </a:solidFill>
+                <a:latin typeface="Courier"/>
+              </a:rPr>
+              <a:t>==</a:t>
+            </a:r>
+            <a:r>
+              <a:rPr lang="en-US" sz="1400" dirty="0">
+                <a:solidFill>
+                  <a:srgbClr val="4070A0"/>
+                </a:solidFill>
+                <a:latin typeface="Courier"/>
+              </a:rPr>
+              <a:t> "Active"</a:t>
+            </a:r>
+            <a:r>
+              <a:rPr lang="en-US" sz="1400" dirty="0">
+                <a:latin typeface="Courier"/>
+              </a:rPr>
+              <a:t>),</a:t>
+            </a:r>
+            <a:br>
+              <a:rPr lang="en-US" sz="2400" dirty="0"/>
+            </a:br>
+            <a:r>
+              <a:rPr lang="en-US" sz="1400" dirty="0">
+                <a:latin typeface="Courier"/>
+              </a:rPr>
+              <a:t>           </a:t>
+            </a:r>
+            <a:r>
+              <a:rPr lang="en-US" sz="1400" dirty="0">
+                <a:solidFill>
+                  <a:srgbClr val="4070A0"/>
+                </a:solidFill>
+                <a:latin typeface="Courier"/>
+              </a:rPr>
+              <a:t>"All projects"</a:t>
+            </a:r>
+            <a:r>
+              <a:rPr lang="en-US" sz="1400" dirty="0">
+                <a:latin typeface="Courier"/>
+              </a:rPr>
+              <a:t> =</a:t>
+            </a:r>
+            <a:r>
+              <a:rPr lang="en-US" sz="1400" dirty="0">
+                <a:solidFill>
+                  <a:srgbClr val="4070A0"/>
+                </a:solidFill>
+                <a:latin typeface="Courier"/>
+              </a:rPr>
+              <a:t> </a:t>
+            </a:r>
+            <a:r>
+              <a:rPr lang="en-US" sz="1400" dirty="0" err="1">
+                <a:latin typeface="Courier"/>
+              </a:rPr>
+              <a:t>bar_filtered</a:t>
+            </a:r>
+            <a:r>
+              <a:rPr lang="en-US" sz="1400" dirty="0">
+                <a:latin typeface="Courier"/>
+              </a:rPr>
+              <a:t> &lt;-</a:t>
+            </a:r>
+            <a:r>
+              <a:rPr lang="en-US" sz="1400" dirty="0">
+                <a:solidFill>
+                  <a:srgbClr val="4070A0"/>
+                </a:solidFill>
+                <a:latin typeface="Courier"/>
+              </a:rPr>
+              <a:t> </a:t>
+            </a:r>
+            <a:r>
+              <a:rPr lang="en-US" sz="1400" dirty="0">
+                <a:latin typeface="Courier"/>
+              </a:rPr>
+              <a:t>tracker)</a:t>
+            </a:r>
+            <a:endParaRPr lang="en-US" sz="1400" dirty="0"/>
+          </a:p>
+        </p:txBody>
+      </p:sp>
+      <p:pic>
+        <p:nvPicPr>
+          <p:cNvPr id="7" name="Picture 6">
+            <a:extLst>
+              <a:ext uri="{FF2B5EF4-FFF2-40B4-BE49-F238E27FC236}">
+                <a16:creationId xmlns:a16="http://schemas.microsoft.com/office/drawing/2014/main" id="{ACF31CA0-F4F7-46F7-9DBC-96F4F9115B72}"/>
+              </a:ext>
+            </a:extLst>
+          </p:cNvPr>
+          <p:cNvPicPr>
+            <a:picLocks noChangeAspect="1"/>
+          </p:cNvPicPr>
+          <p:nvPr/>
+        </p:nvPicPr>
+        <p:blipFill>
+          <a:blip r:embed="rId2"/>
+          <a:stretch>
+            <a:fillRect/>
+          </a:stretch>
+        </p:blipFill>
+        <p:spPr>
+          <a:xfrm>
+            <a:off x="1234834" y="1632821"/>
+            <a:ext cx="4843237" cy="1594724"/>
+          </a:xfrm>
+          <a:prstGeom prst="rect">
+            <a:avLst/>
+          </a:prstGeom>
+          <a:ln w="28575">
+            <a:solidFill>
+              <a:schemeClr val="accent2"/>
+            </a:solidFill>
+          </a:ln>
+        </p:spPr>
+      </p:pic>
       <p:sp>
         <p:nvSpPr>
           <p:cNvPr id="5" name="Slide Number Placeholder 4">
             <a:extLst>
               <a:ext uri="{FF2B5EF4-FFF2-40B4-BE49-F238E27FC236}">
-                <a16:creationId xmlns:a16="http://schemas.microsoft.com/office/drawing/2014/main" id="{7C261B0C-6D5F-42BD-AB20-05FBAACEA086}"/>
+                <a16:creationId xmlns:a16="http://schemas.microsoft.com/office/drawing/2014/main" id="{13AAA3A0-3A7B-46E7-9865-E7A5C376ACC9}"/>
               </a:ext>
             </a:extLst>
           </p:cNvPr>
@@ -10115,6 +10002,150 @@
               <a:rPr lang="en-US" smtClean="0"/>
               <a:pPr/>
               <a:t>30</a:t>
+            </a:fld>
+            <a:endParaRPr lang="en-US"/>
+          </a:p>
+        </p:txBody>
+      </p:sp>
+    </p:spTree>
+    <p:extLst>
+      <p:ext uri="{BB962C8B-B14F-4D97-AF65-F5344CB8AC3E}">
+        <p14:creationId xmlns:p14="http://schemas.microsoft.com/office/powerpoint/2010/main" val="1947615113"/>
+      </p:ext>
+    </p:extLst>
+  </p:cSld>
+  <p:clrMapOvr>
+    <a:masterClrMapping/>
+  </p:clrMapOvr>
+</p:sld>
+</file>
+
+<file path=ppt/slides/slide31.xml><?xml version="1.0" encoding="utf-8"?>
+<p:sld xmlns:a="http://schemas.openxmlformats.org/drawingml/2006/main" xmlns:r="http://schemas.openxmlformats.org/officeDocument/2006/relationships" xmlns:p="http://schemas.openxmlformats.org/presentationml/2006/main">
+  <p:cSld>
+    <p:spTree>
+      <p:nvGrpSpPr>
+        <p:cNvPr id="1" name=""/>
+        <p:cNvGrpSpPr/>
+        <p:nvPr/>
+      </p:nvGrpSpPr>
+      <p:grpSpPr>
+        <a:xfrm>
+          <a:off x="0" y="0"/>
+          <a:ext cx="0" cy="0"/>
+          <a:chOff x="0" y="0"/>
+          <a:chExt cx="0" cy="0"/>
+        </a:xfrm>
+      </p:grpSpPr>
+      <p:sp>
+        <p:nvSpPr>
+          <p:cNvPr id="2" name="Title 1">
+            <a:extLst>
+              <a:ext uri="{FF2B5EF4-FFF2-40B4-BE49-F238E27FC236}">
+                <a16:creationId xmlns:a16="http://schemas.microsoft.com/office/drawing/2014/main" id="{240F9A70-6D57-4D90-A9B1-9D51FC41F5F9}"/>
+              </a:ext>
+            </a:extLst>
+          </p:cNvPr>
+          <p:cNvSpPr>
+            <a:spLocks noGrp="1"/>
+          </p:cNvSpPr>
+          <p:nvPr>
+            <p:ph type="title"/>
+          </p:nvPr>
+        </p:nvSpPr>
+        <p:spPr/>
+        <p:txBody>
+          <a:bodyPr/>
+          <a:lstStyle/>
+          <a:p>
+            <a:r>
+              <a:rPr lang="en-US" dirty="0"/>
+              <a:t>Project Timeline</a:t>
+            </a:r>
+          </a:p>
+        </p:txBody>
+      </p:sp>
+      <p:sp>
+        <p:nvSpPr>
+          <p:cNvPr id="3" name="Content Placeholder 2">
+            <a:extLst>
+              <a:ext uri="{FF2B5EF4-FFF2-40B4-BE49-F238E27FC236}">
+                <a16:creationId xmlns:a16="http://schemas.microsoft.com/office/drawing/2014/main" id="{7B7B1E04-3197-475B-9A06-7AC8072CFE05}"/>
+              </a:ext>
+            </a:extLst>
+          </p:cNvPr>
+          <p:cNvSpPr>
+            <a:spLocks noGrp="1"/>
+          </p:cNvSpPr>
+          <p:nvPr>
+            <p:ph idx="1"/>
+          </p:nvPr>
+        </p:nvSpPr>
+        <p:spPr/>
+        <p:txBody>
+          <a:bodyPr/>
+          <a:lstStyle/>
+          <a:p>
+            <a:r>
+              <a:rPr lang="en-US" sz="2800" dirty="0"/>
+              <a:t>Made using </a:t>
+            </a:r>
+            <a:r>
+              <a:rPr lang="en-US" sz="2800" dirty="0" err="1">
+                <a:solidFill>
+                  <a:schemeClr val="accent1"/>
+                </a:solidFill>
+              </a:rPr>
+              <a:t>ggplot</a:t>
+            </a:r>
+            <a:r>
+              <a:rPr lang="en-US" sz="2800" dirty="0"/>
+              <a:t> with </a:t>
+            </a:r>
+            <a:r>
+              <a:rPr lang="en-US" sz="2800" dirty="0" err="1">
+                <a:solidFill>
+                  <a:schemeClr val="accent1"/>
+                </a:solidFill>
+              </a:rPr>
+              <a:t>geom_segment</a:t>
+            </a:r>
+            <a:r>
+              <a:rPr lang="en-US" sz="2800" dirty="0">
+                <a:solidFill>
+                  <a:schemeClr val="accent1"/>
+                </a:solidFill>
+              </a:rPr>
+              <a:t>()</a:t>
+            </a:r>
+          </a:p>
+        </p:txBody>
+      </p:sp>
+      <p:sp>
+        <p:nvSpPr>
+          <p:cNvPr id="5" name="Slide Number Placeholder 4">
+            <a:extLst>
+              <a:ext uri="{FF2B5EF4-FFF2-40B4-BE49-F238E27FC236}">
+                <a16:creationId xmlns:a16="http://schemas.microsoft.com/office/drawing/2014/main" id="{7C261B0C-6D5F-42BD-AB20-05FBAACEA086}"/>
+              </a:ext>
+            </a:extLst>
+          </p:cNvPr>
+          <p:cNvSpPr>
+            <a:spLocks noGrp="1"/>
+          </p:cNvSpPr>
+          <p:nvPr>
+            <p:ph type="sldNum" sz="quarter" idx="4"/>
+          </p:nvPr>
+        </p:nvSpPr>
+        <p:spPr/>
+        <p:txBody>
+          <a:bodyPr/>
+          <a:lstStyle/>
+          <a:p>
+            <a:fld id="{1C3486A8-E8FB-4965-B61C-9B9FA7DC7BEE}" type="slidenum">
+              <a:rPr lang="en-US" smtClean="0"/>
+              <a:pPr/>
+              <a:t>31</a:t>
             </a:fld>
             <a:endParaRPr lang="en-US"/>
           </a:p>
@@ -10163,7 +10194,7 @@
 </p:sld>
 </file>
 
-<file path=ppt/slides/slide31.xml><?xml version="1.0" encoding="utf-8"?>
+<file path=ppt/slides/slide32.xml><?xml version="1.0" encoding="utf-8"?>
 <p:sld xmlns:a="http://schemas.openxmlformats.org/drawingml/2006/main" xmlns:r="http://schemas.openxmlformats.org/officeDocument/2006/relationships" xmlns:p="http://schemas.openxmlformats.org/presentationml/2006/main">
   <p:cSld>
     <p:spTree>
@@ -10473,7 +10504,7 @@
             <a:fld id="{1C3486A8-E8FB-4965-B61C-9B9FA7DC7BEE}" type="slidenum">
               <a:rPr lang="en-US" smtClean="0"/>
               <a:pPr/>
-              <a:t>31</a:t>
+              <a:t>32</a:t>
             </a:fld>
             <a:endParaRPr lang="en-US"/>
           </a:p>
@@ -10492,7 +10523,7 @@
 </p:sld>
 </file>
 
-<file path=ppt/slides/slide32.xml><?xml version="1.0" encoding="utf-8"?>
+<file path=ppt/slides/slide33.xml><?xml version="1.0" encoding="utf-8"?>
 <p:sld xmlns:a="http://schemas.openxmlformats.org/drawingml/2006/main" xmlns:r="http://schemas.openxmlformats.org/officeDocument/2006/relationships" xmlns:p="http://schemas.openxmlformats.org/presentationml/2006/main">
   <p:cSld>
     <p:spTree>
@@ -11255,7 +11286,7 @@
             <a:fld id="{1C3486A8-E8FB-4965-B61C-9B9FA7DC7BEE}" type="slidenum">
               <a:rPr lang="en-US" smtClean="0"/>
               <a:pPr/>
-              <a:t>32</a:t>
+              <a:t>33</a:t>
             </a:fld>
             <a:endParaRPr lang="en-US"/>
           </a:p>
@@ -11304,7 +11335,7 @@
 </p:sld>
 </file>
 
-<file path=ppt/slides/slide33.xml><?xml version="1.0" encoding="utf-8"?>
+<file path=ppt/slides/slide34.xml><?xml version="1.0" encoding="utf-8"?>
 <p:sld xmlns:a="http://schemas.openxmlformats.org/drawingml/2006/main" xmlns:r="http://schemas.openxmlformats.org/officeDocument/2006/relationships" xmlns:p="http://schemas.openxmlformats.org/presentationml/2006/main">
   <p:cSld>
     <p:spTree>
@@ -11965,7 +11996,7 @@
             <a:fld id="{1C3486A8-E8FB-4965-B61C-9B9FA7DC7BEE}" type="slidenum">
               <a:rPr lang="en-US" smtClean="0"/>
               <a:pPr/>
-              <a:t>33</a:t>
+              <a:t>34</a:t>
             </a:fld>
             <a:endParaRPr lang="en-US"/>
           </a:p>
@@ -12014,149 +12045,6 @@
 </p:sld>
 </file>
 
-<file path=ppt/slides/slide34.xml><?xml version="1.0" encoding="utf-8"?>
-<p:sld xmlns:a="http://schemas.openxmlformats.org/drawingml/2006/main" xmlns:r="http://schemas.openxmlformats.org/officeDocument/2006/relationships" xmlns:p="http://schemas.openxmlformats.org/presentationml/2006/main">
-  <p:cSld>
-    <p:spTree>
-      <p:nvGrpSpPr>
-        <p:cNvPr id="1" name=""/>
-        <p:cNvGrpSpPr/>
-        <p:nvPr/>
-      </p:nvGrpSpPr>
-      <p:grpSpPr>
-        <a:xfrm>
-          <a:off x="0" y="0"/>
-          <a:ext cx="0" cy="0"/>
-          <a:chOff x="0" y="0"/>
-          <a:chExt cx="0" cy="0"/>
-        </a:xfrm>
-      </p:grpSpPr>
-      <p:sp>
-        <p:nvSpPr>
-          <p:cNvPr id="2" name="Title 1">
-            <a:extLst>
-              <a:ext uri="{FF2B5EF4-FFF2-40B4-BE49-F238E27FC236}">
-                <a16:creationId xmlns:a16="http://schemas.microsoft.com/office/drawing/2014/main" id="{A82DBE75-89D1-5441-8399-5D21C8F24232}"/>
-              </a:ext>
-            </a:extLst>
-          </p:cNvPr>
-          <p:cNvSpPr>
-            <a:spLocks noGrp="1"/>
-          </p:cNvSpPr>
-          <p:nvPr>
-            <p:ph type="title"/>
-          </p:nvPr>
-        </p:nvSpPr>
-        <p:spPr/>
-        <p:txBody>
-          <a:bodyPr/>
-          <a:lstStyle/>
-          <a:p>
-            <a:r>
-              <a:rPr lang="en-US" dirty="0"/>
-              <a:t>Hosting the shiny app</a:t>
-            </a:r>
-          </a:p>
-        </p:txBody>
-      </p:sp>
-      <p:sp>
-        <p:nvSpPr>
-          <p:cNvPr id="3" name="Content Placeholder 2">
-            <a:extLst>
-              <a:ext uri="{FF2B5EF4-FFF2-40B4-BE49-F238E27FC236}">
-                <a16:creationId xmlns:a16="http://schemas.microsoft.com/office/drawing/2014/main" id="{0317B98D-799B-C444-8B06-B3C99954D7A8}"/>
-              </a:ext>
-            </a:extLst>
-          </p:cNvPr>
-          <p:cNvSpPr>
-            <a:spLocks noGrp="1"/>
-          </p:cNvSpPr>
-          <p:nvPr>
-            <p:ph idx="1"/>
-          </p:nvPr>
-        </p:nvSpPr>
-        <p:spPr/>
-        <p:txBody>
-          <a:bodyPr/>
-          <a:lstStyle/>
-          <a:p>
-            <a:r>
-              <a:rPr lang="en-US" sz="2800" dirty="0" err="1"/>
-              <a:t>timetrackR</a:t>
-            </a:r>
-            <a:r>
-              <a:rPr lang="en-US" sz="2800" dirty="0"/>
-              <a:t> is currently hosted on </a:t>
-            </a:r>
-            <a:r>
-              <a:rPr lang="en-US" sz="2800" dirty="0" err="1"/>
-              <a:t>shinyapps.io</a:t>
-            </a:r>
-            <a:endParaRPr lang="en-US" sz="2800" dirty="0"/>
-          </a:p>
-          <a:p>
-            <a:r>
-              <a:rPr lang="en-US" sz="2800" dirty="0"/>
-              <a:t>MSK has access to hosting shiny apps on </a:t>
-            </a:r>
-            <a:r>
-              <a:rPr lang="en-US" sz="2800" dirty="0" err="1"/>
-              <a:t>Rconnect</a:t>
-            </a:r>
-            <a:endParaRPr lang="en-US" sz="2800" dirty="0"/>
-          </a:p>
-          <a:p>
-            <a:pPr lvl="1"/>
-            <a:r>
-              <a:rPr lang="en-US" sz="2400" dirty="0"/>
-              <a:t>Contact Juan Carlos for additional information about how to get set up</a:t>
-            </a:r>
-          </a:p>
-        </p:txBody>
-      </p:sp>
-      <p:sp>
-        <p:nvSpPr>
-          <p:cNvPr id="4" name="Slide Number Placeholder 3">
-            <a:extLst>
-              <a:ext uri="{FF2B5EF4-FFF2-40B4-BE49-F238E27FC236}">
-                <a16:creationId xmlns:a16="http://schemas.microsoft.com/office/drawing/2014/main" id="{7FEF7A6A-AC27-9141-B960-F248219C7E86}"/>
-              </a:ext>
-            </a:extLst>
-          </p:cNvPr>
-          <p:cNvSpPr>
-            <a:spLocks noGrp="1"/>
-          </p:cNvSpPr>
-          <p:nvPr>
-            <p:ph type="sldNum" sz="quarter" idx="4"/>
-          </p:nvPr>
-        </p:nvSpPr>
-        <p:spPr/>
-        <p:txBody>
-          <a:bodyPr/>
-          <a:lstStyle/>
-          <a:p>
-            <a:fld id="{1C3486A8-E8FB-4965-B61C-9B9FA7DC7BEE}" type="slidenum">
-              <a:rPr lang="en-US" smtClean="0"/>
-              <a:pPr/>
-              <a:t>34</a:t>
-            </a:fld>
-            <a:endParaRPr lang="en-US"/>
-          </a:p>
-        </p:txBody>
-      </p:sp>
-    </p:spTree>
-    <p:extLst>
-      <p:ext uri="{BB962C8B-B14F-4D97-AF65-F5344CB8AC3E}">
-        <p14:creationId xmlns:p14="http://schemas.microsoft.com/office/powerpoint/2010/main" val="3747534480"/>
-      </p:ext>
-    </p:extLst>
-  </p:cSld>
-  <p:clrMapOvr>
-    <a:masterClrMapping/>
-  </p:clrMapOvr>
-</p:sld>
-</file>
-
 <file path=ppt/slides/slide35.xml><?xml version="1.0" encoding="utf-8"?>
 <p:sld xmlns:a="http://schemas.openxmlformats.org/drawingml/2006/main" xmlns:r="http://schemas.openxmlformats.org/officeDocument/2006/relationships" xmlns:p="http://schemas.openxmlformats.org/presentationml/2006/main">
   <p:cSld>
@@ -12179,7 +12067,7 @@
           <p:cNvPr id="2" name="Title 1">
             <a:extLst>
               <a:ext uri="{FF2B5EF4-FFF2-40B4-BE49-F238E27FC236}">
-                <a16:creationId xmlns:a16="http://schemas.microsoft.com/office/drawing/2014/main" id="{633F03C8-ABD3-4A00-AD80-087F21332873}"/>
+                <a16:creationId xmlns:a16="http://schemas.microsoft.com/office/drawing/2014/main" id="{A82DBE75-89D1-5441-8399-5D21C8F24232}"/>
               </a:ext>
             </a:extLst>
           </p:cNvPr>
@@ -12197,7 +12085,7 @@
           <a:p>
             <a:r>
               <a:rPr lang="en-US" dirty="0"/>
-              <a:t>Caveats</a:t>
+              <a:t>Hosting the shiny app</a:t>
             </a:r>
           </a:p>
         </p:txBody>
@@ -12207,7 +12095,7 @@
           <p:cNvPr id="3" name="Content Placeholder 2">
             <a:extLst>
               <a:ext uri="{FF2B5EF4-FFF2-40B4-BE49-F238E27FC236}">
-                <a16:creationId xmlns:a16="http://schemas.microsoft.com/office/drawing/2014/main" id="{D263E9DF-7C0F-4369-8FD3-EEA6C90D66F0}"/>
+                <a16:creationId xmlns:a16="http://schemas.microsoft.com/office/drawing/2014/main" id="{0317B98D-799B-C444-8B06-B3C99954D7A8}"/>
               </a:ext>
             </a:extLst>
           </p:cNvPr>
@@ -12224,28 +12112,45 @@
           <a:lstStyle/>
           <a:p>
             <a:r>
+              <a:rPr lang="en-US" sz="2800" dirty="0" err="1"/>
+              <a:t>timetrackR</a:t>
+            </a:r>
+            <a:r>
               <a:rPr lang="en-US" sz="2800" dirty="0"/>
-              <a:t>Be careful about your denominators: Analysis is based on </a:t>
-            </a:r>
-            <a:r>
-              <a:rPr lang="en-US" sz="2800" i="1" dirty="0"/>
-              <a:t>what you recorded</a:t>
-            </a:r>
+              <a:t> is currently hosted on </a:t>
+            </a:r>
+            <a:r>
+              <a:rPr lang="en-US" sz="2800" dirty="0" err="1"/>
+              <a:t>shinyapps.io</a:t>
+            </a:r>
+            <a:endParaRPr lang="en-US" sz="2800" dirty="0"/>
           </a:p>
           <a:p>
             <a:r>
               <a:rPr lang="en-US" sz="2800" dirty="0"/>
-              <a:t>Entirely retrospective: it’s a summary of what you’ve done, doesn’t include projected time allocations</a:t>
-            </a:r>
-          </a:p>
-        </p:txBody>
-      </p:sp>
-      <p:sp>
-        <p:nvSpPr>
-          <p:cNvPr id="5" name="Slide Number Placeholder 4">
+              <a:t>MSK has access to hosting shiny apps on </a:t>
+            </a:r>
+            <a:r>
+              <a:rPr lang="en-US" sz="2800" dirty="0" err="1"/>
+              <a:t>Rconnect</a:t>
+            </a:r>
+            <a:endParaRPr lang="en-US" sz="2800" dirty="0"/>
+          </a:p>
+          <a:p>
+            <a:pPr lvl="1"/>
+            <a:r>
+              <a:rPr lang="en-US" sz="2400" dirty="0"/>
+              <a:t>Contact Juan Carlos for additional information about how to get set up</a:t>
+            </a:r>
+          </a:p>
+        </p:txBody>
+      </p:sp>
+      <p:sp>
+        <p:nvSpPr>
+          <p:cNvPr id="4" name="Slide Number Placeholder 3">
             <a:extLst>
               <a:ext uri="{FF2B5EF4-FFF2-40B4-BE49-F238E27FC236}">
-                <a16:creationId xmlns:a16="http://schemas.microsoft.com/office/drawing/2014/main" id="{5A453F05-4D37-4551-A440-48E8ED1FE85E}"/>
+                <a16:creationId xmlns:a16="http://schemas.microsoft.com/office/drawing/2014/main" id="{7FEF7A6A-AC27-9141-B960-F248219C7E86}"/>
               </a:ext>
             </a:extLst>
           </p:cNvPr>
@@ -12273,7 +12178,7 @@
     </p:spTree>
     <p:extLst>
       <p:ext uri="{BB962C8B-B14F-4D97-AF65-F5344CB8AC3E}">
-        <p14:creationId xmlns:p14="http://schemas.microsoft.com/office/powerpoint/2010/main" val="2875116697"/>
+        <p14:creationId xmlns:p14="http://schemas.microsoft.com/office/powerpoint/2010/main" val="3747534480"/>
       </p:ext>
     </p:extLst>
   </p:cSld>
@@ -12305,7 +12210,7 @@
           <p:cNvPr id="2" name="Title 1">
             <a:extLst>
               <a:ext uri="{FF2B5EF4-FFF2-40B4-BE49-F238E27FC236}">
-                <a16:creationId xmlns:a16="http://schemas.microsoft.com/office/drawing/2014/main" id="{8B4B5790-0EA7-4012-93A7-22425D41E1E3}"/>
+                <a16:creationId xmlns:a16="http://schemas.microsoft.com/office/drawing/2014/main" id="{633F03C8-ABD3-4A00-AD80-087F21332873}"/>
               </a:ext>
             </a:extLst>
           </p:cNvPr>
@@ -12323,7 +12228,7 @@
           <a:p>
             <a:r>
               <a:rPr lang="en-US" dirty="0"/>
-              <a:t>Future Plans</a:t>
+              <a:t>Caveats</a:t>
             </a:r>
           </a:p>
         </p:txBody>
@@ -12333,7 +12238,7 @@
           <p:cNvPr id="3" name="Content Placeholder 2">
             <a:extLst>
               <a:ext uri="{FF2B5EF4-FFF2-40B4-BE49-F238E27FC236}">
-                <a16:creationId xmlns:a16="http://schemas.microsoft.com/office/drawing/2014/main" id="{4851F475-9DB2-4FC0-B370-DDE4324E134A}"/>
+                <a16:creationId xmlns:a16="http://schemas.microsoft.com/office/drawing/2014/main" id="{D263E9DF-7C0F-4369-8FD3-EEA6C90D66F0}"/>
               </a:ext>
             </a:extLst>
           </p:cNvPr>
@@ -12351,20 +12256,17 @@
           <a:p>
             <a:r>
               <a:rPr lang="en-US" sz="2800" dirty="0"/>
-              <a:t>Incorporate additional visualizations and/or summary measures</a:t>
-            </a:r>
-          </a:p>
-          <a:p>
-            <a:pPr lvl="1"/>
-            <a:r>
-              <a:rPr lang="en-US" sz="2400" dirty="0"/>
-              <a:t>Suggestions?</a:t>
+              <a:t>Be careful about your denominators: Analysis is based on </a:t>
+            </a:r>
+            <a:r>
+              <a:rPr lang="en-US" sz="2800" i="1" dirty="0"/>
+              <a:t>what you recorded</a:t>
             </a:r>
           </a:p>
           <a:p>
             <a:r>
               <a:rPr lang="en-US" sz="2800" dirty="0"/>
-              <a:t>Integrate with additional time tracking software other than Toggl?</a:t>
+              <a:t>Entirely retrospective: it’s a summary of what you’ve done, doesn’t include projected time allocations</a:t>
             </a:r>
           </a:p>
         </p:txBody>
@@ -12374,7 +12276,7 @@
           <p:cNvPr id="5" name="Slide Number Placeholder 4">
             <a:extLst>
               <a:ext uri="{FF2B5EF4-FFF2-40B4-BE49-F238E27FC236}">
-                <a16:creationId xmlns:a16="http://schemas.microsoft.com/office/drawing/2014/main" id="{8ECB3582-11B2-4221-9A20-0F2E986B1969}"/>
+                <a16:creationId xmlns:a16="http://schemas.microsoft.com/office/drawing/2014/main" id="{5A453F05-4D37-4551-A440-48E8ED1FE85E}"/>
               </a:ext>
             </a:extLst>
           </p:cNvPr>
@@ -12402,7 +12304,7 @@
     </p:spTree>
     <p:extLst>
       <p:ext uri="{BB962C8B-B14F-4D97-AF65-F5344CB8AC3E}">
-        <p14:creationId xmlns:p14="http://schemas.microsoft.com/office/powerpoint/2010/main" val="1472678012"/>
+        <p14:creationId xmlns:p14="http://schemas.microsoft.com/office/powerpoint/2010/main" val="2875116697"/>
       </p:ext>
     </p:extLst>
   </p:cSld>
@@ -12452,7 +12354,7 @@
           <a:p>
             <a:r>
               <a:rPr lang="en-US" dirty="0"/>
-              <a:t>Summary</a:t>
+              <a:t>Future Plans</a:t>
             </a:r>
           </a:p>
         </p:txBody>
@@ -12479,79 +12381,31 @@
           <a:lstStyle/>
           <a:p>
             <a:r>
+              <a:rPr lang="en-US" sz="2800" dirty="0"/>
+              <a:t>Incorporate additional visualizations and/or summary measures</a:t>
+            </a:r>
+          </a:p>
+          <a:p>
+            <a:pPr lvl="1"/>
+            <a:r>
               <a:rPr lang="en-US" sz="2400" dirty="0"/>
-              <a:t>Very few metrics are needed to gain a general understanding of how you’re spending your time</a:t>
-            </a:r>
-          </a:p>
-          <a:p>
-            <a:r>
-              <a:rPr lang="en-US" sz="2400" dirty="0"/>
-              <a:t>This information can be used to align your work with how you </a:t>
-            </a:r>
-            <a:r>
-              <a:rPr lang="en-US" sz="2400" i="1" dirty="0"/>
-              <a:t>intend</a:t>
-            </a:r>
-            <a:r>
-              <a:rPr lang="en-US" sz="2400" dirty="0"/>
-              <a:t> to spend your time</a:t>
-            </a:r>
-          </a:p>
-        </p:txBody>
-      </p:sp>
-      <p:pic>
-        <p:nvPicPr>
-          <p:cNvPr id="1026" name="Picture 2" descr="Image result for time management meme">
+              <a:t>Suggestions?</a:t>
+            </a:r>
+          </a:p>
+          <a:p>
+            <a:r>
+              <a:rPr lang="en-US" sz="2800" dirty="0"/>
+              <a:t>Integrate with additional time tracking software other than Toggl?</a:t>
+            </a:r>
+          </a:p>
+        </p:txBody>
+      </p:sp>
+      <p:sp>
+        <p:nvSpPr>
+          <p:cNvPr id="5" name="Slide Number Placeholder 4">
             <a:extLst>
               <a:ext uri="{FF2B5EF4-FFF2-40B4-BE49-F238E27FC236}">
-                <a16:creationId xmlns:a16="http://schemas.microsoft.com/office/drawing/2014/main" id="{7B30C622-4B2D-4127-9BB3-6372FD6BB5ED}"/>
-              </a:ext>
-            </a:extLst>
-          </p:cNvPr>
-          <p:cNvPicPr>
-            <a:picLocks noChangeAspect="1" noChangeArrowheads="1"/>
-          </p:cNvPicPr>
-          <p:nvPr/>
-        </p:nvPicPr>
-        <p:blipFill>
-          <a:blip r:embed="rId3">
-            <a:extLst>
-              <a:ext uri="{28A0092B-C50C-407E-A947-70E740481C1C}">
-                <a14:useLocalDpi xmlns:a14="http://schemas.microsoft.com/office/drawing/2010/main" val="0"/>
-              </a:ext>
-            </a:extLst>
-          </a:blip>
-          <a:srcRect/>
-          <a:stretch>
-            <a:fillRect/>
-          </a:stretch>
-        </p:blipFill>
-        <p:spPr bwMode="auto">
-          <a:xfrm>
-            <a:off x="3171906" y="3207379"/>
-            <a:ext cx="2521550" cy="2521550"/>
-          </a:xfrm>
-          <a:prstGeom prst="rect">
-            <a:avLst/>
-          </a:prstGeom>
-          <a:noFill/>
-          <a:extLst>
-            <a:ext uri="{909E8E84-426E-40DD-AFC4-6F175D3DCCD1}">
-              <a14:hiddenFill xmlns:a14="http://schemas.microsoft.com/office/drawing/2010/main">
-                <a:solidFill>
-                  <a:srgbClr val="FFFFFF"/>
-                </a:solidFill>
-              </a14:hiddenFill>
-            </a:ext>
-          </a:extLst>
-        </p:spPr>
-      </p:pic>
-      <p:sp>
-        <p:nvSpPr>
-          <p:cNvPr id="5" name="Slide Number Placeholder 4">
-            <a:extLst>
-              <a:ext uri="{FF2B5EF4-FFF2-40B4-BE49-F238E27FC236}">
-                <a16:creationId xmlns:a16="http://schemas.microsoft.com/office/drawing/2014/main" id="{0C4F9C53-CB7F-4CF6-8E03-B4F12AA5EFA4}"/>
+                <a16:creationId xmlns:a16="http://schemas.microsoft.com/office/drawing/2014/main" id="{8ECB3582-11B2-4221-9A20-0F2E986B1969}"/>
               </a:ext>
             </a:extLst>
           </p:cNvPr>
@@ -12579,7 +12433,7 @@
     </p:spTree>
     <p:extLst>
       <p:ext uri="{BB962C8B-B14F-4D97-AF65-F5344CB8AC3E}">
-        <p14:creationId xmlns:p14="http://schemas.microsoft.com/office/powerpoint/2010/main" val="1128304148"/>
+        <p14:creationId xmlns:p14="http://schemas.microsoft.com/office/powerpoint/2010/main" val="1472678012"/>
       </p:ext>
     </p:extLst>
   </p:cSld>
@@ -12608,6 +12462,183 @@
       </p:grpSpPr>
       <p:sp>
         <p:nvSpPr>
+          <p:cNvPr id="2" name="Title 1">
+            <a:extLst>
+              <a:ext uri="{FF2B5EF4-FFF2-40B4-BE49-F238E27FC236}">
+                <a16:creationId xmlns:a16="http://schemas.microsoft.com/office/drawing/2014/main" id="{8B4B5790-0EA7-4012-93A7-22425D41E1E3}"/>
+              </a:ext>
+            </a:extLst>
+          </p:cNvPr>
+          <p:cNvSpPr>
+            <a:spLocks noGrp="1"/>
+          </p:cNvSpPr>
+          <p:nvPr>
+            <p:ph type="title"/>
+          </p:nvPr>
+        </p:nvSpPr>
+        <p:spPr/>
+        <p:txBody>
+          <a:bodyPr/>
+          <a:lstStyle/>
+          <a:p>
+            <a:r>
+              <a:rPr lang="en-US" dirty="0"/>
+              <a:t>Summary</a:t>
+            </a:r>
+          </a:p>
+        </p:txBody>
+      </p:sp>
+      <p:sp>
+        <p:nvSpPr>
+          <p:cNvPr id="3" name="Content Placeholder 2">
+            <a:extLst>
+              <a:ext uri="{FF2B5EF4-FFF2-40B4-BE49-F238E27FC236}">
+                <a16:creationId xmlns:a16="http://schemas.microsoft.com/office/drawing/2014/main" id="{4851F475-9DB2-4FC0-B370-DDE4324E134A}"/>
+              </a:ext>
+            </a:extLst>
+          </p:cNvPr>
+          <p:cNvSpPr>
+            <a:spLocks noGrp="1"/>
+          </p:cNvSpPr>
+          <p:nvPr>
+            <p:ph idx="1"/>
+          </p:nvPr>
+        </p:nvSpPr>
+        <p:spPr/>
+        <p:txBody>
+          <a:bodyPr/>
+          <a:lstStyle/>
+          <a:p>
+            <a:r>
+              <a:rPr lang="en-US" sz="2400" dirty="0"/>
+              <a:t>Very few metrics are needed to gain a general understanding of how you’re spending your time</a:t>
+            </a:r>
+          </a:p>
+          <a:p>
+            <a:r>
+              <a:rPr lang="en-US" sz="2400" dirty="0"/>
+              <a:t>This information can be used to align your work with how you </a:t>
+            </a:r>
+            <a:r>
+              <a:rPr lang="en-US" sz="2400" i="1" dirty="0"/>
+              <a:t>intend</a:t>
+            </a:r>
+            <a:r>
+              <a:rPr lang="en-US" sz="2400" dirty="0"/>
+              <a:t> to spend your time</a:t>
+            </a:r>
+          </a:p>
+        </p:txBody>
+      </p:sp>
+      <p:pic>
+        <p:nvPicPr>
+          <p:cNvPr id="1026" name="Picture 2" descr="Image result for time management meme">
+            <a:extLst>
+              <a:ext uri="{FF2B5EF4-FFF2-40B4-BE49-F238E27FC236}">
+                <a16:creationId xmlns:a16="http://schemas.microsoft.com/office/drawing/2014/main" id="{7B30C622-4B2D-4127-9BB3-6372FD6BB5ED}"/>
+              </a:ext>
+            </a:extLst>
+          </p:cNvPr>
+          <p:cNvPicPr>
+            <a:picLocks noChangeAspect="1" noChangeArrowheads="1"/>
+          </p:cNvPicPr>
+          <p:nvPr/>
+        </p:nvPicPr>
+        <p:blipFill>
+          <a:blip r:embed="rId3">
+            <a:extLst>
+              <a:ext uri="{28A0092B-C50C-407E-A947-70E740481C1C}">
+                <a14:useLocalDpi xmlns:a14="http://schemas.microsoft.com/office/drawing/2010/main" val="0"/>
+              </a:ext>
+            </a:extLst>
+          </a:blip>
+          <a:srcRect/>
+          <a:stretch>
+            <a:fillRect/>
+          </a:stretch>
+        </p:blipFill>
+        <p:spPr bwMode="auto">
+          <a:xfrm>
+            <a:off x="3171906" y="3207379"/>
+            <a:ext cx="2521550" cy="2521550"/>
+          </a:xfrm>
+          <a:prstGeom prst="rect">
+            <a:avLst/>
+          </a:prstGeom>
+          <a:noFill/>
+          <a:extLst>
+            <a:ext uri="{909E8E84-426E-40DD-AFC4-6F175D3DCCD1}">
+              <a14:hiddenFill xmlns:a14="http://schemas.microsoft.com/office/drawing/2010/main">
+                <a:solidFill>
+                  <a:srgbClr val="FFFFFF"/>
+                </a:solidFill>
+              </a14:hiddenFill>
+            </a:ext>
+          </a:extLst>
+        </p:spPr>
+      </p:pic>
+      <p:sp>
+        <p:nvSpPr>
+          <p:cNvPr id="5" name="Slide Number Placeholder 4">
+            <a:extLst>
+              <a:ext uri="{FF2B5EF4-FFF2-40B4-BE49-F238E27FC236}">
+                <a16:creationId xmlns:a16="http://schemas.microsoft.com/office/drawing/2014/main" id="{0C4F9C53-CB7F-4CF6-8E03-B4F12AA5EFA4}"/>
+              </a:ext>
+            </a:extLst>
+          </p:cNvPr>
+          <p:cNvSpPr>
+            <a:spLocks noGrp="1"/>
+          </p:cNvSpPr>
+          <p:nvPr>
+            <p:ph type="sldNum" sz="quarter" idx="4"/>
+          </p:nvPr>
+        </p:nvSpPr>
+        <p:spPr/>
+        <p:txBody>
+          <a:bodyPr/>
+          <a:lstStyle/>
+          <a:p>
+            <a:fld id="{1C3486A8-E8FB-4965-B61C-9B9FA7DC7BEE}" type="slidenum">
+              <a:rPr lang="en-US" smtClean="0"/>
+              <a:pPr/>
+              <a:t>38</a:t>
+            </a:fld>
+            <a:endParaRPr lang="en-US"/>
+          </a:p>
+        </p:txBody>
+      </p:sp>
+    </p:spTree>
+    <p:extLst>
+      <p:ext uri="{BB962C8B-B14F-4D97-AF65-F5344CB8AC3E}">
+        <p14:creationId xmlns:p14="http://schemas.microsoft.com/office/powerpoint/2010/main" val="1128304148"/>
+      </p:ext>
+    </p:extLst>
+  </p:cSld>
+  <p:clrMapOvr>
+    <a:masterClrMapping/>
+  </p:clrMapOvr>
+</p:sld>
+</file>
+
+<file path=ppt/slides/slide39.xml><?xml version="1.0" encoding="utf-8"?>
+<p:sld xmlns:a="http://schemas.openxmlformats.org/drawingml/2006/main" xmlns:r="http://schemas.openxmlformats.org/officeDocument/2006/relationships" xmlns:p="http://schemas.openxmlformats.org/presentationml/2006/main">
+  <p:cSld>
+    <p:spTree>
+      <p:nvGrpSpPr>
+        <p:cNvPr id="1" name=""/>
+        <p:cNvGrpSpPr/>
+        <p:nvPr/>
+      </p:nvGrpSpPr>
+      <p:grpSpPr>
+        <a:xfrm>
+          <a:off x="0" y="0"/>
+          <a:ext cx="0" cy="0"/>
+          <a:chOff x="0" y="0"/>
+          <a:chExt cx="0" cy="0"/>
+        </a:xfrm>
+      </p:grpSpPr>
+      <p:sp>
+        <p:nvSpPr>
           <p:cNvPr id="17409" name="Title 1"/>
           <p:cNvSpPr txBox="1">
             <a:spLocks/>
@@ -12628,14 +12659,14 @@
           </a:ln>
           <a:extLst>
             <a:ext uri="{909E8E84-426E-40dd-AFC4-6F175D3DCCD1}">
-              <a14:hiddenFill xmlns:a14="http://schemas.microsoft.com/office/drawing/2010/main" xmlns="">
+              <a14:hiddenFill xmlns="" xmlns:a14="http://schemas.microsoft.com/office/drawing/2010/main">
                 <a:solidFill>
                   <a:srgbClr val="FFFFFF"/>
                 </a:solidFill>
               </a14:hiddenFill>
             </a:ext>
             <a:ext uri="{91240B29-F687-4f45-9708-019B960494DF}">
-              <a14:hiddenLine xmlns:a14="http://schemas.microsoft.com/office/drawing/2010/main" xmlns="" w="9525">
+              <a14:hiddenLine xmlns="" xmlns:a14="http://schemas.microsoft.com/office/drawing/2010/main" w="9525">
                 <a:solidFill>
                   <a:srgbClr val="000000"/>
                 </a:solidFill>
@@ -14887,15 +14918,6 @@
 </file>
 
 <file path=customXml/item1.xml><?xml version="1.0" encoding="utf-8"?>
-<?mso-contentType ?>
-<FormTemplates xmlns="http://schemas.microsoft.com/sharepoint/v3/contenttype/forms">
-  <Display>DocumentLibraryForm</Display>
-  <Edit>DocumentLibraryForm</Edit>
-  <New>DocumentLibraryForm</New>
-</FormTemplates>
-</file>
-
-<file path=customXml/item2.xml><?xml version="1.0" encoding="utf-8"?>
 <p:properties xmlns:p="http://schemas.microsoft.com/office/2006/metadata/properties" xmlns:xsi="http://www.w3.org/2001/XMLSchema-instance" xmlns:pc="http://schemas.microsoft.com/office/infopath/2007/PartnerControls">
   <documentManagement>
     <ImageCreateDate xmlns="E64CF27C-2ECC-48E8-947E-CA63274FB2E8" xsi:nil="true"/>
@@ -14904,6 +14926,15 @@
     <wic_System_Copyright xmlns="http://schemas.microsoft.com/sharepoint/v3/fields" xsi:nil="true"/>
   </documentManagement>
 </p:properties>
+</file>
+
+<file path=customXml/item2.xml><?xml version="1.0" encoding="utf-8"?>
+<?mso-contentType ?>
+<FormTemplates xmlns="http://schemas.microsoft.com/sharepoint/v3/contenttype/forms">
+  <Display>DocumentLibraryForm</Display>
+  <Edit>DocumentLibraryForm</Edit>
+  <New>DocumentLibraryForm</New>
+</FormTemplates>
 </file>
 
 <file path=customXml/item3.xml><?xml version="1.0" encoding="utf-8"?>
@@ -15109,14 +15140,6 @@
 </file>
 
 <file path=customXml/itemProps1.xml><?xml version="1.0" encoding="utf-8"?>
-<ds:datastoreItem xmlns:ds="http://schemas.openxmlformats.org/officeDocument/2006/customXml" ds:itemID="{B01F69EB-AD96-4AD6-8A18-0C8728F5F031}">
-  <ds:schemaRefs>
-    <ds:schemaRef ds:uri="http://schemas.microsoft.com/sharepoint/v3/contenttype/forms"/>
-  </ds:schemaRefs>
-</ds:datastoreItem>
-</file>
-
-<file path=customXml/itemProps2.xml><?xml version="1.0" encoding="utf-8"?>
 <ds:datastoreItem xmlns:ds="http://schemas.openxmlformats.org/officeDocument/2006/customXml" ds:itemID="{2B30647F-A921-45DD-9E91-010F7EF4FB48}">
   <ds:schemaRefs>
     <ds:schemaRef ds:uri="http://schemas.microsoft.com/office/infopath/2007/PartnerControls"/>
@@ -15130,6 +15153,14 @@
     <ds:schemaRef ds:uri="http://schemas.microsoft.com/sharepoint/v3/fields"/>
     <ds:schemaRef ds:uri="http://www.w3.org/XML/1998/namespace"/>
     <ds:schemaRef ds:uri="http://purl.org/dc/dcmitype/"/>
+  </ds:schemaRefs>
+</ds:datastoreItem>
+</file>
+
+<file path=customXml/itemProps2.xml><?xml version="1.0" encoding="utf-8"?>
+<ds:datastoreItem xmlns:ds="http://schemas.openxmlformats.org/officeDocument/2006/customXml" ds:itemID="{B01F69EB-AD96-4AD6-8A18-0C8728F5F031}">
+  <ds:schemaRefs>
+    <ds:schemaRef ds:uri="http://schemas.microsoft.com/sharepoint/v3/contenttype/forms"/>
   </ds:schemaRefs>
 </ds:datastoreItem>
 </file>

</xml_diff>

<commit_message>
working version for strategy & innovation presentation
* delete old files
* change project timeline legend to 2 rows
* fix label spacing on total hours bar chart by project
</commit_message>
<xml_diff>
--- a/Strategy and Innovation timetrackR Presentation.pptx
+++ b/Strategy and Innovation timetrackR Presentation.pptx
@@ -5,10 +5,10 @@
     <p:sldMasterId id="2147483648" r:id="rId4"/>
   </p:sldMasterIdLst>
   <p:notesMasterIdLst>
-    <p:notesMasterId r:id="rId44"/>
+    <p:notesMasterId r:id="rId43"/>
   </p:notesMasterIdLst>
   <p:handoutMasterIdLst>
-    <p:handoutMasterId r:id="rId45"/>
+    <p:handoutMasterId r:id="rId44"/>
   </p:handoutMasterIdLst>
   <p:sldIdLst>
     <p:sldId id="256" r:id="rId5"/>
@@ -35,21 +35,20 @@
     <p:sldId id="328" r:id="rId26"/>
     <p:sldId id="329" r:id="rId27"/>
     <p:sldId id="266" r:id="rId28"/>
-    <p:sldId id="325" r:id="rId29"/>
-    <p:sldId id="316" r:id="rId30"/>
-    <p:sldId id="302" r:id="rId31"/>
-    <p:sldId id="315" r:id="rId32"/>
-    <p:sldId id="289" r:id="rId33"/>
-    <p:sldId id="294" r:id="rId34"/>
-    <p:sldId id="288" r:id="rId35"/>
-    <p:sldId id="295" r:id="rId36"/>
-    <p:sldId id="301" r:id="rId37"/>
-    <p:sldId id="307" r:id="rId38"/>
-    <p:sldId id="313" r:id="rId39"/>
-    <p:sldId id="262" r:id="rId40"/>
-    <p:sldId id="280" r:id="rId41"/>
-    <p:sldId id="263" r:id="rId42"/>
-    <p:sldId id="273" r:id="rId43"/>
+    <p:sldId id="316" r:id="rId29"/>
+    <p:sldId id="302" r:id="rId30"/>
+    <p:sldId id="315" r:id="rId31"/>
+    <p:sldId id="289" r:id="rId32"/>
+    <p:sldId id="294" r:id="rId33"/>
+    <p:sldId id="288" r:id="rId34"/>
+    <p:sldId id="295" r:id="rId35"/>
+    <p:sldId id="301" r:id="rId36"/>
+    <p:sldId id="307" r:id="rId37"/>
+    <p:sldId id="313" r:id="rId38"/>
+    <p:sldId id="262" r:id="rId39"/>
+    <p:sldId id="280" r:id="rId40"/>
+    <p:sldId id="263" r:id="rId41"/>
+    <p:sldId id="273" r:id="rId42"/>
   </p:sldIdLst>
   <p:sldSz cx="9144000" cy="6858000" type="screen4x3"/>
   <p:notesSz cx="6858000" cy="9144000"/>
@@ -889,7 +888,7 @@
           <a:p>
             <a:fld id="{9C5C8B17-D1C9-48DD-A1B1-EDA1E362804A}" type="slidenum">
               <a:rPr lang="en-US" smtClean="0"/>
-              <a:t>38</a:t>
+              <a:t>37</a:t>
             </a:fld>
             <a:endParaRPr lang="en-US"/>
           </a:p>
@@ -1663,7 +1662,7 @@
           <a:p>
             <a:fld id="{9C5C8B17-D1C9-48DD-A1B1-EDA1E362804A}" type="slidenum">
               <a:rPr lang="en-US" smtClean="0"/>
-              <a:t>34</a:t>
+              <a:t>33</a:t>
             </a:fld>
             <a:endParaRPr lang="en-US"/>
           </a:p>
@@ -3998,17 +3997,17 @@
           </a:ln>
           <a:extLst>
             <a:ext uri="{FAA26D3D-D897-4be2-8F04-BA451C77F1D7}">
-              <ma14:placeholderFlag xmlns:ma14="http://schemas.microsoft.com/office/mac/drawingml/2011/main" xmlns="" val="1"/>
+              <ma14:placeholderFlag xmlns="" xmlns:ma14="http://schemas.microsoft.com/office/mac/drawingml/2011/main" val="1"/>
             </a:ext>
             <a:ext uri="{909E8E84-426E-40dd-AFC4-6F175D3DCCD1}">
-              <a14:hiddenFill xmlns:a14="http://schemas.microsoft.com/office/drawing/2010/main" xmlns="">
+              <a14:hiddenFill xmlns="" xmlns:a14="http://schemas.microsoft.com/office/drawing/2010/main">
                 <a:solidFill>
                   <a:srgbClr val="FFFFFF"/>
                 </a:solidFill>
               </a14:hiddenFill>
             </a:ext>
             <a:ext uri="{91240B29-F687-4f45-9708-019B960494DF}">
-              <a14:hiddenLine xmlns:a14="http://schemas.microsoft.com/office/drawing/2010/main" xmlns="" w="9525">
+              <a14:hiddenLine xmlns="" xmlns:a14="http://schemas.microsoft.com/office/drawing/2010/main" w="9525">
                 <a:solidFill>
                   <a:srgbClr val="000000"/>
                 </a:solidFill>
@@ -4060,17 +4059,17 @@
           </a:ln>
           <a:extLst>
             <a:ext uri="{FAA26D3D-D897-4be2-8F04-BA451C77F1D7}">
-              <ma14:placeholderFlag xmlns:ma14="http://schemas.microsoft.com/office/mac/drawingml/2011/main" xmlns="" val="1"/>
+              <ma14:placeholderFlag xmlns="" xmlns:ma14="http://schemas.microsoft.com/office/mac/drawingml/2011/main" val="1"/>
             </a:ext>
             <a:ext uri="{909E8E84-426E-40dd-AFC4-6F175D3DCCD1}">
-              <a14:hiddenFill xmlns:a14="http://schemas.microsoft.com/office/drawing/2010/main" xmlns="">
+              <a14:hiddenFill xmlns="" xmlns:a14="http://schemas.microsoft.com/office/drawing/2010/main">
                 <a:solidFill>
                   <a:srgbClr val="FFFFFF"/>
                 </a:solidFill>
               </a14:hiddenFill>
             </a:ext>
             <a:ext uri="{91240B29-F687-4f45-9708-019B960494DF}">
-              <a14:hiddenLine xmlns:a14="http://schemas.microsoft.com/office/drawing/2010/main" xmlns="" w="9525">
+              <a14:hiddenLine xmlns="" xmlns:a14="http://schemas.microsoft.com/office/drawing/2010/main" w="9525">
                 <a:solidFill>
                   <a:srgbClr val="000000"/>
                 </a:solidFill>
@@ -8294,6 +8293,36 @@
           <a:chExt cx="0" cy="0"/>
         </a:xfrm>
       </p:grpSpPr>
+      <p:pic>
+        <p:nvPicPr>
+          <p:cNvPr id="3" name="Picture 2">
+            <a:extLst>
+              <a:ext uri="{FF2B5EF4-FFF2-40B4-BE49-F238E27FC236}">
+                <a16:creationId xmlns:a16="http://schemas.microsoft.com/office/drawing/2014/main" id="{ED868094-E745-BF45-B5FE-4E80ED6775BF}"/>
+              </a:ext>
+            </a:extLst>
+          </p:cNvPr>
+          <p:cNvPicPr>
+            <a:picLocks noChangeAspect="1"/>
+          </p:cNvPicPr>
+          <p:nvPr/>
+        </p:nvPicPr>
+        <p:blipFill>
+          <a:blip r:embed="rId2"/>
+          <a:stretch>
+            <a:fillRect/>
+          </a:stretch>
+        </p:blipFill>
+        <p:spPr>
+          <a:xfrm>
+            <a:off x="0" y="979146"/>
+            <a:ext cx="9144000" cy="4899708"/>
+          </a:xfrm>
+          <a:prstGeom prst="rect">
+            <a:avLst/>
+          </a:prstGeom>
+        </p:spPr>
+      </p:pic>
     </p:spTree>
     <p:extLst>
       <p:ext uri="{BB962C8B-B14F-4D97-AF65-F5344CB8AC3E}">
@@ -8579,7 +8608,7 @@
           <p:cNvPr id="2" name="Title 1">
             <a:extLst>
               <a:ext uri="{FF2B5EF4-FFF2-40B4-BE49-F238E27FC236}">
-                <a16:creationId xmlns:a16="http://schemas.microsoft.com/office/drawing/2014/main" id="{B1A140FF-A80A-524E-82A8-A3A4EC9A8310}"/>
+                <a16:creationId xmlns:a16="http://schemas.microsoft.com/office/drawing/2014/main" id="{155AD063-E272-0F4A-A013-C8F6CE117E93}"/>
               </a:ext>
             </a:extLst>
           </p:cNvPr>
@@ -8596,22 +8625,18 @@
           <a:lstStyle/>
           <a:p>
             <a:r>
-              <a:rPr lang="en-US" dirty="0">
-                <a:solidFill>
-                  <a:schemeClr val="accent2"/>
-                </a:solidFill>
-              </a:rPr>
-              <a:t>Workflow Integration</a:t>
-            </a:r>
-          </a:p>
-        </p:txBody>
-      </p:sp>
-      <p:sp>
-        <p:nvSpPr>
-          <p:cNvPr id="3" name="Slide Number Placeholder 2">
+              <a:rPr lang="en-US" dirty="0"/>
+              <a:t>Workflow integration</a:t>
+            </a:r>
+          </a:p>
+        </p:txBody>
+      </p:sp>
+      <p:sp>
+        <p:nvSpPr>
+          <p:cNvPr id="3" name="Content Placeholder 2">
             <a:extLst>
               <a:ext uri="{FF2B5EF4-FFF2-40B4-BE49-F238E27FC236}">
-                <a16:creationId xmlns:a16="http://schemas.microsoft.com/office/drawing/2014/main" id="{4F0454F6-C6F3-4843-8301-D13FC23C268F}"/>
+                <a16:creationId xmlns:a16="http://schemas.microsoft.com/office/drawing/2014/main" id="{D26AFD08-B620-EB4E-B0D1-990BD2DFA065}"/>
               </a:ext>
             </a:extLst>
           </p:cNvPr>
@@ -8619,7 +8644,79 @@
             <a:spLocks noGrp="1"/>
           </p:cNvSpPr>
           <p:nvPr>
-            <p:ph type="sldNum" sz="quarter" idx="11"/>
+            <p:ph idx="1"/>
+          </p:nvPr>
+        </p:nvSpPr>
+        <p:spPr/>
+        <p:txBody>
+          <a:bodyPr/>
+          <a:lstStyle/>
+          <a:p>
+            <a:r>
+              <a:rPr lang="en-US" dirty="0">
+                <a:solidFill>
+                  <a:schemeClr val="accent1"/>
+                </a:solidFill>
+              </a:rPr>
+              <a:t>Daily basis: </a:t>
+            </a:r>
+            <a:r>
+              <a:rPr lang="en-US" dirty="0"/>
+              <a:t>Use Toggl to record how you’re spending your time</a:t>
+            </a:r>
+          </a:p>
+          <a:p>
+            <a:pPr lvl="1"/>
+            <a:r>
+              <a:rPr lang="en-US" dirty="0"/>
+              <a:t>Requires minimal setup for project/clients</a:t>
+            </a:r>
+          </a:p>
+          <a:p>
+            <a:pPr lvl="1"/>
+            <a:r>
+              <a:rPr lang="en-US" dirty="0"/>
+              <a:t>Spend &lt;5 minutes a day recording my time</a:t>
+            </a:r>
+          </a:p>
+          <a:p>
+            <a:r>
+              <a:rPr lang="en-US" dirty="0">
+                <a:solidFill>
+                  <a:schemeClr val="accent1"/>
+                </a:solidFill>
+              </a:rPr>
+              <a:t>Weekly? Monthly? Quarterly?:</a:t>
+            </a:r>
+            <a:r>
+              <a:rPr lang="en-US" dirty="0"/>
+              <a:t> Export data from Toggl into </a:t>
+            </a:r>
+            <a:r>
+              <a:rPr lang="en-US" dirty="0" err="1"/>
+              <a:t>timetrackR</a:t>
+            </a:r>
+            <a:r>
+              <a:rPr lang="en-US" dirty="0"/>
+              <a:t> to look at how you’ve been spending your time</a:t>
+            </a:r>
+          </a:p>
+        </p:txBody>
+      </p:sp>
+      <p:sp>
+        <p:nvSpPr>
+          <p:cNvPr id="4" name="Slide Number Placeholder 3">
+            <a:extLst>
+              <a:ext uri="{FF2B5EF4-FFF2-40B4-BE49-F238E27FC236}">
+                <a16:creationId xmlns:a16="http://schemas.microsoft.com/office/drawing/2014/main" id="{61A1BF09-FFF6-2144-BBCD-C9B47890FF7A}"/>
+              </a:ext>
+            </a:extLst>
+          </p:cNvPr>
+          <p:cNvSpPr>
+            <a:spLocks noGrp="1"/>
+          </p:cNvSpPr>
+          <p:nvPr>
+            <p:ph type="sldNum" sz="quarter" idx="4"/>
           </p:nvPr>
         </p:nvSpPr>
         <p:spPr/>
@@ -8639,7 +8736,7 @@
     </p:spTree>
     <p:extLst>
       <p:ext uri="{BB962C8B-B14F-4D97-AF65-F5344CB8AC3E}">
-        <p14:creationId xmlns:p14="http://schemas.microsoft.com/office/powerpoint/2010/main" val="2433942188"/>
+        <p14:creationId xmlns:p14="http://schemas.microsoft.com/office/powerpoint/2010/main" val="2595252815"/>
       </p:ext>
     </p:extLst>
   </p:cSld>
@@ -8671,7 +8768,7 @@
           <p:cNvPr id="2" name="Title 1">
             <a:extLst>
               <a:ext uri="{FF2B5EF4-FFF2-40B4-BE49-F238E27FC236}">
-                <a16:creationId xmlns:a16="http://schemas.microsoft.com/office/drawing/2014/main" id="{155AD063-E272-0F4A-A013-C8F6CE117E93}"/>
+                <a16:creationId xmlns:a16="http://schemas.microsoft.com/office/drawing/2014/main" id="{EB72F780-0A20-420E-BDE8-1E2357373C89}"/>
               </a:ext>
             </a:extLst>
           </p:cNvPr>
@@ -8682,24 +8779,125 @@
             <p:ph type="title"/>
           </p:nvPr>
         </p:nvSpPr>
-        <p:spPr/>
+        <p:spPr>
+          <a:xfrm>
+            <a:off x="762000" y="1209214"/>
+            <a:ext cx="7647214" cy="4130229"/>
+          </a:xfrm>
+        </p:spPr>
         <p:txBody>
           <a:bodyPr/>
           <a:lstStyle/>
           <a:p>
             <a:r>
-              <a:rPr lang="en-US" dirty="0"/>
-              <a:t>Workflow integration</a:t>
-            </a:r>
-          </a:p>
-        </p:txBody>
-      </p:sp>
-      <p:sp>
-        <p:nvSpPr>
-          <p:cNvPr id="3" name="Content Placeholder 2">
+              <a:rPr lang="en-US" b="0" dirty="0">
+                <a:solidFill>
+                  <a:schemeClr val="accent2"/>
+                </a:solidFill>
+              </a:rPr>
+              <a:t>R Code Highlights:</a:t>
+            </a:r>
+            <a:br>
+              <a:rPr lang="en-US" b="0" dirty="0">
+                <a:solidFill>
+                  <a:schemeClr val="accent1"/>
+                </a:solidFill>
+              </a:rPr>
+            </a:br>
+            <a:r>
+              <a:rPr lang="en-US" b="0" dirty="0">
+                <a:solidFill>
+                  <a:schemeClr val="accent1"/>
+                </a:solidFill>
+              </a:rPr>
+              <a:t>     - </a:t>
+            </a:r>
+            <a:r>
+              <a:rPr lang="en-US" dirty="0">
+                <a:solidFill>
+                  <a:schemeClr val="accent1"/>
+                </a:solidFill>
+              </a:rPr>
+              <a:t>switch</a:t>
+            </a:r>
+            <a:r>
+              <a:rPr lang="en-US" b="0" dirty="0">
+                <a:solidFill>
+                  <a:schemeClr val="accent1"/>
+                </a:solidFill>
+              </a:rPr>
+              <a:t> function</a:t>
+            </a:r>
+            <a:br>
+              <a:rPr lang="en-US" b="0" dirty="0">
+                <a:solidFill>
+                  <a:schemeClr val="accent1"/>
+                </a:solidFill>
+              </a:rPr>
+            </a:br>
+            <a:r>
+              <a:rPr lang="en-US" b="0" dirty="0">
+                <a:solidFill>
+                  <a:schemeClr val="accent1"/>
+                </a:solidFill>
+              </a:rPr>
+              <a:t>     - </a:t>
+            </a:r>
+            <a:r>
+              <a:rPr lang="en-US" dirty="0" err="1">
+                <a:solidFill>
+                  <a:schemeClr val="accent1"/>
+                </a:solidFill>
+              </a:rPr>
+              <a:t>geom_segment</a:t>
+            </a:r>
+            <a:r>
+              <a:rPr lang="en-US" b="0" dirty="0">
+                <a:solidFill>
+                  <a:schemeClr val="accent1"/>
+                </a:solidFill>
+              </a:rPr>
+              <a:t>()</a:t>
+            </a:r>
+            <a:br>
+              <a:rPr lang="en-US" b="0" dirty="0">
+                <a:solidFill>
+                  <a:schemeClr val="accent1"/>
+                </a:solidFill>
+              </a:rPr>
+            </a:br>
+            <a:r>
+              <a:rPr lang="en-US" b="0" dirty="0">
+                <a:solidFill>
+                  <a:schemeClr val="accent1"/>
+                </a:solidFill>
+              </a:rPr>
+              <a:t>     - hex sticker</a:t>
+            </a:r>
+            <a:br>
+              <a:rPr lang="en-US" b="0" dirty="0">
+                <a:solidFill>
+                  <a:schemeClr val="accent1"/>
+                </a:solidFill>
+              </a:rPr>
+            </a:br>
+            <a:r>
+              <a:rPr lang="en-US" b="0" dirty="0">
+                <a:solidFill>
+                  <a:schemeClr val="accent1"/>
+                </a:solidFill>
+              </a:rPr>
+              <a:t>     - Hosting a shiny app</a:t>
+            </a:r>
+          </a:p>
+        </p:txBody>
+      </p:sp>
+      <p:sp>
+        <p:nvSpPr>
+          <p:cNvPr id="3" name="Slide Number Placeholder 2">
             <a:extLst>
               <a:ext uri="{FF2B5EF4-FFF2-40B4-BE49-F238E27FC236}">
-                <a16:creationId xmlns:a16="http://schemas.microsoft.com/office/drawing/2014/main" id="{D26AFD08-B620-EB4E-B0D1-990BD2DFA065}"/>
+                <a16:creationId xmlns:a16="http://schemas.microsoft.com/office/drawing/2014/main" id="{D3905B7C-8E7D-4914-A81F-D023D3B49551}"/>
               </a:ext>
             </a:extLst>
           </p:cNvPr>
@@ -8707,79 +8905,7 @@
             <a:spLocks noGrp="1"/>
           </p:cNvSpPr>
           <p:nvPr>
-            <p:ph idx="1"/>
-          </p:nvPr>
-        </p:nvSpPr>
-        <p:spPr/>
-        <p:txBody>
-          <a:bodyPr/>
-          <a:lstStyle/>
-          <a:p>
-            <a:r>
-              <a:rPr lang="en-US" dirty="0">
-                <a:solidFill>
-                  <a:schemeClr val="accent1"/>
-                </a:solidFill>
-              </a:rPr>
-              <a:t>Daily basis: </a:t>
-            </a:r>
-            <a:r>
-              <a:rPr lang="en-US" dirty="0"/>
-              <a:t>Use Toggl to record how you’re spending your time</a:t>
-            </a:r>
-          </a:p>
-          <a:p>
-            <a:pPr lvl="1"/>
-            <a:r>
-              <a:rPr lang="en-US" dirty="0"/>
-              <a:t>Requires minimal setup for project/clients</a:t>
-            </a:r>
-          </a:p>
-          <a:p>
-            <a:pPr lvl="1"/>
-            <a:r>
-              <a:rPr lang="en-US" dirty="0"/>
-              <a:t>Spend &lt;5 minutes a day recording my time</a:t>
-            </a:r>
-          </a:p>
-          <a:p>
-            <a:r>
-              <a:rPr lang="en-US" dirty="0">
-                <a:solidFill>
-                  <a:schemeClr val="accent1"/>
-                </a:solidFill>
-              </a:rPr>
-              <a:t>Weekly? Monthly? Quarterly?:</a:t>
-            </a:r>
-            <a:r>
-              <a:rPr lang="en-US" dirty="0"/>
-              <a:t> Export data from Toggl into </a:t>
-            </a:r>
-            <a:r>
-              <a:rPr lang="en-US" dirty="0" err="1"/>
-              <a:t>timetrackR</a:t>
-            </a:r>
-            <a:r>
-              <a:rPr lang="en-US" dirty="0"/>
-              <a:t> to look at how you’ve been spending your time</a:t>
-            </a:r>
-          </a:p>
-        </p:txBody>
-      </p:sp>
-      <p:sp>
-        <p:nvSpPr>
-          <p:cNvPr id="4" name="Slide Number Placeholder 3">
-            <a:extLst>
-              <a:ext uri="{FF2B5EF4-FFF2-40B4-BE49-F238E27FC236}">
-                <a16:creationId xmlns:a16="http://schemas.microsoft.com/office/drawing/2014/main" id="{61A1BF09-FFF6-2144-BBCD-C9B47890FF7A}"/>
-              </a:ext>
-            </a:extLst>
-          </p:cNvPr>
-          <p:cNvSpPr>
-            <a:spLocks noGrp="1"/>
-          </p:cNvSpPr>
-          <p:nvPr>
-            <p:ph type="sldNum" sz="quarter" idx="4"/>
+            <p:ph type="sldNum" sz="quarter" idx="11"/>
           </p:nvPr>
         </p:nvSpPr>
         <p:spPr/>
@@ -8799,7 +8925,7 @@
     </p:spTree>
     <p:extLst>
       <p:ext uri="{BB962C8B-B14F-4D97-AF65-F5344CB8AC3E}">
-        <p14:creationId xmlns:p14="http://schemas.microsoft.com/office/powerpoint/2010/main" val="2595252815"/>
+        <p14:creationId xmlns:p14="http://schemas.microsoft.com/office/powerpoint/2010/main" val="3104528174"/>
       </p:ext>
     </p:extLst>
   </p:cSld>
@@ -8831,195 +8957,6 @@
           <p:cNvPr id="2" name="Title 1">
             <a:extLst>
               <a:ext uri="{FF2B5EF4-FFF2-40B4-BE49-F238E27FC236}">
-                <a16:creationId xmlns:a16="http://schemas.microsoft.com/office/drawing/2014/main" id="{EB72F780-0A20-420E-BDE8-1E2357373C89}"/>
-              </a:ext>
-            </a:extLst>
-          </p:cNvPr>
-          <p:cNvSpPr>
-            <a:spLocks noGrp="1"/>
-          </p:cNvSpPr>
-          <p:nvPr>
-            <p:ph type="title"/>
-          </p:nvPr>
-        </p:nvSpPr>
-        <p:spPr>
-          <a:xfrm>
-            <a:off x="762000" y="1209214"/>
-            <a:ext cx="7647214" cy="4130229"/>
-          </a:xfrm>
-        </p:spPr>
-        <p:txBody>
-          <a:bodyPr/>
-          <a:lstStyle/>
-          <a:p>
-            <a:r>
-              <a:rPr lang="en-US" b="0" dirty="0">
-                <a:solidFill>
-                  <a:schemeClr val="accent2"/>
-                </a:solidFill>
-              </a:rPr>
-              <a:t>R Code Highlights:</a:t>
-            </a:r>
-            <a:br>
-              <a:rPr lang="en-US" b="0" dirty="0">
-                <a:solidFill>
-                  <a:schemeClr val="accent1"/>
-                </a:solidFill>
-              </a:rPr>
-            </a:br>
-            <a:r>
-              <a:rPr lang="en-US" b="0" dirty="0">
-                <a:solidFill>
-                  <a:schemeClr val="accent1"/>
-                </a:solidFill>
-              </a:rPr>
-              <a:t>     - </a:t>
-            </a:r>
-            <a:r>
-              <a:rPr lang="en-US" dirty="0">
-                <a:solidFill>
-                  <a:schemeClr val="accent1"/>
-                </a:solidFill>
-              </a:rPr>
-              <a:t>switch</a:t>
-            </a:r>
-            <a:r>
-              <a:rPr lang="en-US" b="0" dirty="0">
-                <a:solidFill>
-                  <a:schemeClr val="accent1"/>
-                </a:solidFill>
-              </a:rPr>
-              <a:t> function</a:t>
-            </a:r>
-            <a:br>
-              <a:rPr lang="en-US" b="0" dirty="0">
-                <a:solidFill>
-                  <a:schemeClr val="accent1"/>
-                </a:solidFill>
-              </a:rPr>
-            </a:br>
-            <a:r>
-              <a:rPr lang="en-US" b="0" dirty="0">
-                <a:solidFill>
-                  <a:schemeClr val="accent1"/>
-                </a:solidFill>
-              </a:rPr>
-              <a:t>     - </a:t>
-            </a:r>
-            <a:r>
-              <a:rPr lang="en-US" dirty="0" err="1">
-                <a:solidFill>
-                  <a:schemeClr val="accent1"/>
-                </a:solidFill>
-              </a:rPr>
-              <a:t>geom_segment</a:t>
-            </a:r>
-            <a:r>
-              <a:rPr lang="en-US" b="0" dirty="0">
-                <a:solidFill>
-                  <a:schemeClr val="accent1"/>
-                </a:solidFill>
-              </a:rPr>
-              <a:t>()</a:t>
-            </a:r>
-            <a:br>
-              <a:rPr lang="en-US" b="0" dirty="0">
-                <a:solidFill>
-                  <a:schemeClr val="accent1"/>
-                </a:solidFill>
-              </a:rPr>
-            </a:br>
-            <a:r>
-              <a:rPr lang="en-US" b="0" dirty="0">
-                <a:solidFill>
-                  <a:schemeClr val="accent1"/>
-                </a:solidFill>
-              </a:rPr>
-              <a:t>     - hex sticker</a:t>
-            </a:r>
-            <a:br>
-              <a:rPr lang="en-US" b="0" dirty="0">
-                <a:solidFill>
-                  <a:schemeClr val="accent1"/>
-                </a:solidFill>
-              </a:rPr>
-            </a:br>
-            <a:r>
-              <a:rPr lang="en-US" b="0" dirty="0">
-                <a:solidFill>
-                  <a:schemeClr val="accent1"/>
-                </a:solidFill>
-              </a:rPr>
-              <a:t>     - Hosting a shiny app</a:t>
-            </a:r>
-          </a:p>
-        </p:txBody>
-      </p:sp>
-      <p:sp>
-        <p:nvSpPr>
-          <p:cNvPr id="3" name="Slide Number Placeholder 2">
-            <a:extLst>
-              <a:ext uri="{FF2B5EF4-FFF2-40B4-BE49-F238E27FC236}">
-                <a16:creationId xmlns:a16="http://schemas.microsoft.com/office/drawing/2014/main" id="{D3905B7C-8E7D-4914-A81F-D023D3B49551}"/>
-              </a:ext>
-            </a:extLst>
-          </p:cNvPr>
-          <p:cNvSpPr>
-            <a:spLocks noGrp="1"/>
-          </p:cNvSpPr>
-          <p:nvPr>
-            <p:ph type="sldNum" sz="quarter" idx="11"/>
-          </p:nvPr>
-        </p:nvSpPr>
-        <p:spPr/>
-        <p:txBody>
-          <a:bodyPr/>
-          <a:lstStyle/>
-          <a:p>
-            <a:fld id="{1C3486A8-E8FB-4965-B61C-9B9FA7DC7BEE}" type="slidenum">
-              <a:rPr lang="en-US" smtClean="0"/>
-              <a:pPr/>
-              <a:t>27</a:t>
-            </a:fld>
-            <a:endParaRPr lang="en-US"/>
-          </a:p>
-        </p:txBody>
-      </p:sp>
-    </p:spTree>
-    <p:extLst>
-      <p:ext uri="{BB962C8B-B14F-4D97-AF65-F5344CB8AC3E}">
-        <p14:creationId xmlns:p14="http://schemas.microsoft.com/office/powerpoint/2010/main" val="3104528174"/>
-      </p:ext>
-    </p:extLst>
-  </p:cSld>
-  <p:clrMapOvr>
-    <a:masterClrMapping/>
-  </p:clrMapOvr>
-</p:sld>
-</file>
-
-<file path=ppt/slides/slide28.xml><?xml version="1.0" encoding="utf-8"?>
-<p:sld xmlns:a="http://schemas.openxmlformats.org/drawingml/2006/main" xmlns:r="http://schemas.openxmlformats.org/officeDocument/2006/relationships" xmlns:p="http://schemas.openxmlformats.org/presentationml/2006/main">
-  <p:cSld>
-    <p:spTree>
-      <p:nvGrpSpPr>
-        <p:cNvPr id="1" name=""/>
-        <p:cNvGrpSpPr/>
-        <p:nvPr/>
-      </p:nvGrpSpPr>
-      <p:grpSpPr>
-        <a:xfrm>
-          <a:off x="0" y="0"/>
-          <a:ext cx="0" cy="0"/>
-          <a:chOff x="0" y="0"/>
-          <a:chExt cx="0" cy="0"/>
-        </a:xfrm>
-      </p:grpSpPr>
-      <p:sp>
-        <p:nvSpPr>
-          <p:cNvPr id="2" name="Title 1">
-            <a:extLst>
-              <a:ext uri="{FF2B5EF4-FFF2-40B4-BE49-F238E27FC236}">
                 <a16:creationId xmlns:a16="http://schemas.microsoft.com/office/drawing/2014/main" id="{4BA35181-2264-4945-B7E3-8EB3E27DD03F}"/>
               </a:ext>
             </a:extLst>
@@ -9119,7 +9056,7 @@
             <a:fld id="{1C3486A8-E8FB-4965-B61C-9B9FA7DC7BEE}" type="slidenum">
               <a:rPr lang="en-US" smtClean="0"/>
               <a:pPr/>
-              <a:t>28</a:t>
+              <a:t>27</a:t>
             </a:fld>
             <a:endParaRPr lang="en-US"/>
           </a:p>
@@ -9168,7 +9105,7 @@
 </p:sld>
 </file>
 
-<file path=ppt/slides/slide29.xml><?xml version="1.0" encoding="utf-8"?>
+<file path=ppt/slides/slide28.xml><?xml version="1.0" encoding="utf-8"?>
 <p:sld xmlns:a="http://schemas.openxmlformats.org/drawingml/2006/main" xmlns:r="http://schemas.openxmlformats.org/officeDocument/2006/relationships" xmlns:p="http://schemas.openxmlformats.org/presentationml/2006/main">
   <p:cSld>
     <p:spTree>
@@ -9300,7 +9237,7 @@
             <a:fld id="{1C3486A8-E8FB-4965-B61C-9B9FA7DC7BEE}" type="slidenum">
               <a:rPr lang="en-US" smtClean="0"/>
               <a:pPr/>
-              <a:t>29</a:t>
+              <a:t>28</a:t>
             </a:fld>
             <a:endParaRPr lang="en-US"/>
           </a:p>
@@ -9319,203 +9256,7 @@
 </p:sld>
 </file>
 
-<file path=ppt/slides/slide3.xml><?xml version="1.0" encoding="utf-8"?>
-<p:sld xmlns:a="http://schemas.openxmlformats.org/drawingml/2006/main" xmlns:r="http://schemas.openxmlformats.org/officeDocument/2006/relationships" xmlns:p="http://schemas.openxmlformats.org/presentationml/2006/main">
-  <p:cSld>
-    <p:spTree>
-      <p:nvGrpSpPr>
-        <p:cNvPr id="1" name=""/>
-        <p:cNvGrpSpPr/>
-        <p:nvPr/>
-      </p:nvGrpSpPr>
-      <p:grpSpPr>
-        <a:xfrm>
-          <a:off x="0" y="0"/>
-          <a:ext cx="0" cy="0"/>
-          <a:chOff x="0" y="0"/>
-          <a:chExt cx="0" cy="0"/>
-        </a:xfrm>
-      </p:grpSpPr>
-      <p:sp>
-        <p:nvSpPr>
-          <p:cNvPr id="2" name="Title 1">
-            <a:extLst>
-              <a:ext uri="{FF2B5EF4-FFF2-40B4-BE49-F238E27FC236}">
-                <a16:creationId xmlns:a16="http://schemas.microsoft.com/office/drawing/2014/main" id="{49C63E00-FA56-B540-B358-E81F344879B5}"/>
-              </a:ext>
-            </a:extLst>
-          </p:cNvPr>
-          <p:cNvSpPr>
-            <a:spLocks noGrp="1"/>
-          </p:cNvSpPr>
-          <p:nvPr>
-            <p:ph type="title"/>
-          </p:nvPr>
-        </p:nvSpPr>
-        <p:spPr/>
-        <p:txBody>
-          <a:bodyPr/>
-          <a:lstStyle/>
-          <a:p>
-            <a:r>
-              <a:rPr lang="en-US" dirty="0"/>
-              <a:t>Today’s Objectives</a:t>
-            </a:r>
-          </a:p>
-        </p:txBody>
-      </p:sp>
-      <p:sp>
-        <p:nvSpPr>
-          <p:cNvPr id="3" name="Content Placeholder 2">
-            <a:extLst>
-              <a:ext uri="{FF2B5EF4-FFF2-40B4-BE49-F238E27FC236}">
-                <a16:creationId xmlns:a16="http://schemas.microsoft.com/office/drawing/2014/main" id="{65A14FCD-F8D9-3546-8C9B-A825BAC7E055}"/>
-              </a:ext>
-            </a:extLst>
-          </p:cNvPr>
-          <p:cNvSpPr>
-            <a:spLocks noGrp="1"/>
-          </p:cNvSpPr>
-          <p:nvPr>
-            <p:ph idx="1"/>
-          </p:nvPr>
-        </p:nvSpPr>
-        <p:spPr/>
-        <p:txBody>
-          <a:bodyPr/>
-          <a:lstStyle/>
-          <a:p>
-            <a:pPr marL="571500" indent="-571500">
-              <a:buAutoNum type="romanUcPeriod"/>
-            </a:pPr>
-            <a:r>
-              <a:rPr lang="en-US" b="1" dirty="0">
-                <a:solidFill>
-                  <a:schemeClr val="accent1"/>
-                </a:solidFill>
-              </a:rPr>
-              <a:t>Why</a:t>
-            </a:r>
-            <a:r>
-              <a:rPr lang="en-US" dirty="0"/>
-              <a:t> track your time?</a:t>
-            </a:r>
-          </a:p>
-          <a:p>
-            <a:pPr marL="571500" indent="-571500">
-              <a:buAutoNum type="romanUcPeriod"/>
-            </a:pPr>
-            <a:r>
-              <a:rPr lang="en-US" b="1" dirty="0">
-                <a:solidFill>
-                  <a:schemeClr val="accent1"/>
-                </a:solidFill>
-              </a:rPr>
-              <a:t>How</a:t>
-            </a:r>
-            <a:r>
-              <a:rPr lang="en-US" dirty="0"/>
-              <a:t> to track your time?</a:t>
-            </a:r>
-          </a:p>
-          <a:p>
-            <a:pPr marL="571500" indent="-571500">
-              <a:buAutoNum type="romanUcPeriod"/>
-            </a:pPr>
-            <a:r>
-              <a:rPr lang="en-US" b="1" dirty="0">
-                <a:solidFill>
-                  <a:schemeClr val="accent1"/>
-                </a:solidFill>
-              </a:rPr>
-              <a:t>What</a:t>
-            </a:r>
-            <a:r>
-              <a:rPr lang="en-US" dirty="0"/>
-              <a:t> to do once you’ve tracked your time (an introduction to timetrackR)</a:t>
-            </a:r>
-          </a:p>
-          <a:p>
-            <a:pPr marL="571500" indent="-571500">
-              <a:buAutoNum type="romanUcPeriod"/>
-            </a:pPr>
-            <a:r>
-              <a:rPr lang="en-US" dirty="0"/>
-              <a:t>timetrackR </a:t>
-            </a:r>
-            <a:r>
-              <a:rPr lang="en-US" b="1" dirty="0">
-                <a:solidFill>
-                  <a:schemeClr val="accent1"/>
-                </a:solidFill>
-              </a:rPr>
-              <a:t>demo</a:t>
-            </a:r>
-          </a:p>
-          <a:p>
-            <a:pPr marL="571500" indent="-571500">
-              <a:buAutoNum type="romanUcPeriod"/>
-            </a:pPr>
-            <a:r>
-              <a:rPr lang="en-US" dirty="0"/>
-              <a:t>Useful R code learned in the process</a:t>
-            </a:r>
-          </a:p>
-          <a:p>
-            <a:pPr marL="571500" indent="-571500">
-              <a:buAutoNum type="romanUcPeriod"/>
-            </a:pPr>
-            <a:r>
-              <a:rPr lang="en-US" dirty="0"/>
-              <a:t> Future work</a:t>
-            </a:r>
-          </a:p>
-        </p:txBody>
-      </p:sp>
-      <p:sp>
-        <p:nvSpPr>
-          <p:cNvPr id="4" name="Slide Number Placeholder 3">
-            <a:extLst>
-              <a:ext uri="{FF2B5EF4-FFF2-40B4-BE49-F238E27FC236}">
-                <a16:creationId xmlns:a16="http://schemas.microsoft.com/office/drawing/2014/main" id="{2B8E67FD-1566-ED4A-B310-AA91E7E0817D}"/>
-              </a:ext>
-            </a:extLst>
-          </p:cNvPr>
-          <p:cNvSpPr>
-            <a:spLocks noGrp="1"/>
-          </p:cNvSpPr>
-          <p:nvPr>
-            <p:ph type="sldNum" sz="quarter" idx="4"/>
-          </p:nvPr>
-        </p:nvSpPr>
-        <p:spPr/>
-        <p:txBody>
-          <a:bodyPr/>
-          <a:lstStyle/>
-          <a:p>
-            <a:fld id="{1C3486A8-E8FB-4965-B61C-9B9FA7DC7BEE}" type="slidenum">
-              <a:rPr lang="en-US" smtClean="0"/>
-              <a:pPr/>
-              <a:t>3</a:t>
-            </a:fld>
-            <a:endParaRPr lang="en-US"/>
-          </a:p>
-        </p:txBody>
-      </p:sp>
-    </p:spTree>
-    <p:extLst>
-      <p:ext uri="{BB962C8B-B14F-4D97-AF65-F5344CB8AC3E}">
-        <p14:creationId xmlns:p14="http://schemas.microsoft.com/office/powerpoint/2010/main" val="1364271941"/>
-      </p:ext>
-    </p:extLst>
-  </p:cSld>
-  <p:clrMapOvr>
-    <a:masterClrMapping/>
-  </p:clrMapOvr>
-</p:sld>
-</file>
-
-<file path=ppt/slides/slide30.xml><?xml version="1.0" encoding="utf-8"?>
+<file path=ppt/slides/slide29.xml><?xml version="1.0" encoding="utf-8"?>
 <p:sld xmlns:a="http://schemas.openxmlformats.org/drawingml/2006/main" xmlns:r="http://schemas.openxmlformats.org/officeDocument/2006/relationships" xmlns:p="http://schemas.openxmlformats.org/presentationml/2006/main">
   <p:cSld>
     <p:spTree>
@@ -10001,7 +9742,7 @@
             <a:fld id="{1C3486A8-E8FB-4965-B61C-9B9FA7DC7BEE}" type="slidenum">
               <a:rPr lang="en-US" smtClean="0"/>
               <a:pPr/>
-              <a:t>30</a:t>
+              <a:t>29</a:t>
             </a:fld>
             <a:endParaRPr lang="en-US"/>
           </a:p>
@@ -10020,7 +9761,7 @@
 </p:sld>
 </file>
 
-<file path=ppt/slides/slide31.xml><?xml version="1.0" encoding="utf-8"?>
+<file path=ppt/slides/slide3.xml><?xml version="1.0" encoding="utf-8"?>
 <p:sld xmlns:a="http://schemas.openxmlformats.org/drawingml/2006/main" xmlns:r="http://schemas.openxmlformats.org/officeDocument/2006/relationships" xmlns:p="http://schemas.openxmlformats.org/presentationml/2006/main">
   <p:cSld>
     <p:spTree>
@@ -10042,6 +9783,202 @@
           <p:cNvPr id="2" name="Title 1">
             <a:extLst>
               <a:ext uri="{FF2B5EF4-FFF2-40B4-BE49-F238E27FC236}">
+                <a16:creationId xmlns:a16="http://schemas.microsoft.com/office/drawing/2014/main" id="{49C63E00-FA56-B540-B358-E81F344879B5}"/>
+              </a:ext>
+            </a:extLst>
+          </p:cNvPr>
+          <p:cNvSpPr>
+            <a:spLocks noGrp="1"/>
+          </p:cNvSpPr>
+          <p:nvPr>
+            <p:ph type="title"/>
+          </p:nvPr>
+        </p:nvSpPr>
+        <p:spPr/>
+        <p:txBody>
+          <a:bodyPr/>
+          <a:lstStyle/>
+          <a:p>
+            <a:r>
+              <a:rPr lang="en-US" dirty="0"/>
+              <a:t>Today’s Objectives</a:t>
+            </a:r>
+          </a:p>
+        </p:txBody>
+      </p:sp>
+      <p:sp>
+        <p:nvSpPr>
+          <p:cNvPr id="3" name="Content Placeholder 2">
+            <a:extLst>
+              <a:ext uri="{FF2B5EF4-FFF2-40B4-BE49-F238E27FC236}">
+                <a16:creationId xmlns:a16="http://schemas.microsoft.com/office/drawing/2014/main" id="{65A14FCD-F8D9-3546-8C9B-A825BAC7E055}"/>
+              </a:ext>
+            </a:extLst>
+          </p:cNvPr>
+          <p:cNvSpPr>
+            <a:spLocks noGrp="1"/>
+          </p:cNvSpPr>
+          <p:nvPr>
+            <p:ph idx="1"/>
+          </p:nvPr>
+        </p:nvSpPr>
+        <p:spPr/>
+        <p:txBody>
+          <a:bodyPr/>
+          <a:lstStyle/>
+          <a:p>
+            <a:pPr marL="571500" indent="-571500">
+              <a:buAutoNum type="romanUcPeriod"/>
+            </a:pPr>
+            <a:r>
+              <a:rPr lang="en-US" b="1" dirty="0">
+                <a:solidFill>
+                  <a:schemeClr val="accent1"/>
+                </a:solidFill>
+              </a:rPr>
+              <a:t>Why</a:t>
+            </a:r>
+            <a:r>
+              <a:rPr lang="en-US" dirty="0"/>
+              <a:t> track your time?</a:t>
+            </a:r>
+          </a:p>
+          <a:p>
+            <a:pPr marL="571500" indent="-571500">
+              <a:buAutoNum type="romanUcPeriod"/>
+            </a:pPr>
+            <a:r>
+              <a:rPr lang="en-US" b="1" dirty="0">
+                <a:solidFill>
+                  <a:schemeClr val="accent1"/>
+                </a:solidFill>
+              </a:rPr>
+              <a:t>How</a:t>
+            </a:r>
+            <a:r>
+              <a:rPr lang="en-US" dirty="0"/>
+              <a:t> to track your time?</a:t>
+            </a:r>
+          </a:p>
+          <a:p>
+            <a:pPr marL="571500" indent="-571500">
+              <a:buAutoNum type="romanUcPeriod"/>
+            </a:pPr>
+            <a:r>
+              <a:rPr lang="en-US" b="1" dirty="0">
+                <a:solidFill>
+                  <a:schemeClr val="accent1"/>
+                </a:solidFill>
+              </a:rPr>
+              <a:t>What</a:t>
+            </a:r>
+            <a:r>
+              <a:rPr lang="en-US" dirty="0"/>
+              <a:t> to do once you’ve tracked your time (an introduction to timetrackR)</a:t>
+            </a:r>
+          </a:p>
+          <a:p>
+            <a:pPr marL="571500" indent="-571500">
+              <a:buAutoNum type="romanUcPeriod"/>
+            </a:pPr>
+            <a:r>
+              <a:rPr lang="en-US" dirty="0"/>
+              <a:t>timetrackR </a:t>
+            </a:r>
+            <a:r>
+              <a:rPr lang="en-US" b="1" dirty="0">
+                <a:solidFill>
+                  <a:schemeClr val="accent1"/>
+                </a:solidFill>
+              </a:rPr>
+              <a:t>demo</a:t>
+            </a:r>
+          </a:p>
+          <a:p>
+            <a:pPr marL="571500" indent="-571500">
+              <a:buAutoNum type="romanUcPeriod"/>
+            </a:pPr>
+            <a:r>
+              <a:rPr lang="en-US" dirty="0"/>
+              <a:t>Useful R code learned in the process</a:t>
+            </a:r>
+          </a:p>
+          <a:p>
+            <a:pPr marL="571500" indent="-571500">
+              <a:buAutoNum type="romanUcPeriod"/>
+            </a:pPr>
+            <a:r>
+              <a:rPr lang="en-US" dirty="0"/>
+              <a:t> Future work</a:t>
+            </a:r>
+          </a:p>
+        </p:txBody>
+      </p:sp>
+      <p:sp>
+        <p:nvSpPr>
+          <p:cNvPr id="4" name="Slide Number Placeholder 3">
+            <a:extLst>
+              <a:ext uri="{FF2B5EF4-FFF2-40B4-BE49-F238E27FC236}">
+                <a16:creationId xmlns:a16="http://schemas.microsoft.com/office/drawing/2014/main" id="{2B8E67FD-1566-ED4A-B310-AA91E7E0817D}"/>
+              </a:ext>
+            </a:extLst>
+          </p:cNvPr>
+          <p:cNvSpPr>
+            <a:spLocks noGrp="1"/>
+          </p:cNvSpPr>
+          <p:nvPr>
+            <p:ph type="sldNum" sz="quarter" idx="4"/>
+          </p:nvPr>
+        </p:nvSpPr>
+        <p:spPr/>
+        <p:txBody>
+          <a:bodyPr/>
+          <a:lstStyle/>
+          <a:p>
+            <a:fld id="{1C3486A8-E8FB-4965-B61C-9B9FA7DC7BEE}" type="slidenum">
+              <a:rPr lang="en-US" smtClean="0"/>
+              <a:pPr/>
+              <a:t>3</a:t>
+            </a:fld>
+            <a:endParaRPr lang="en-US"/>
+          </a:p>
+        </p:txBody>
+      </p:sp>
+    </p:spTree>
+    <p:extLst>
+      <p:ext uri="{BB962C8B-B14F-4D97-AF65-F5344CB8AC3E}">
+        <p14:creationId xmlns:p14="http://schemas.microsoft.com/office/powerpoint/2010/main" val="1364271941"/>
+      </p:ext>
+    </p:extLst>
+  </p:cSld>
+  <p:clrMapOvr>
+    <a:masterClrMapping/>
+  </p:clrMapOvr>
+</p:sld>
+</file>
+
+<file path=ppt/slides/slide30.xml><?xml version="1.0" encoding="utf-8"?>
+<p:sld xmlns:a="http://schemas.openxmlformats.org/drawingml/2006/main" xmlns:r="http://schemas.openxmlformats.org/officeDocument/2006/relationships" xmlns:p="http://schemas.openxmlformats.org/presentationml/2006/main">
+  <p:cSld>
+    <p:spTree>
+      <p:nvGrpSpPr>
+        <p:cNvPr id="1" name=""/>
+        <p:cNvGrpSpPr/>
+        <p:nvPr/>
+      </p:nvGrpSpPr>
+      <p:grpSpPr>
+        <a:xfrm>
+          <a:off x="0" y="0"/>
+          <a:ext cx="0" cy="0"/>
+          <a:chOff x="0" y="0"/>
+          <a:chExt cx="0" cy="0"/>
+        </a:xfrm>
+      </p:grpSpPr>
+      <p:sp>
+        <p:nvSpPr>
+          <p:cNvPr id="2" name="Title 1">
+            <a:extLst>
+              <a:ext uri="{FF2B5EF4-FFF2-40B4-BE49-F238E27FC236}">
                 <a16:creationId xmlns:a16="http://schemas.microsoft.com/office/drawing/2014/main" id="{240F9A70-6D57-4D90-A9B1-9D51FC41F5F9}"/>
               </a:ext>
             </a:extLst>
@@ -10145,7 +10082,7 @@
             <a:fld id="{1C3486A8-E8FB-4965-B61C-9B9FA7DC7BEE}" type="slidenum">
               <a:rPr lang="en-US" smtClean="0"/>
               <a:pPr/>
-              <a:t>31</a:t>
+              <a:t>30</a:t>
             </a:fld>
             <a:endParaRPr lang="en-US"/>
           </a:p>
@@ -10194,7 +10131,7 @@
 </p:sld>
 </file>
 
-<file path=ppt/slides/slide32.xml><?xml version="1.0" encoding="utf-8"?>
+<file path=ppt/slides/slide31.xml><?xml version="1.0" encoding="utf-8"?>
 <p:sld xmlns:a="http://schemas.openxmlformats.org/drawingml/2006/main" xmlns:r="http://schemas.openxmlformats.org/officeDocument/2006/relationships" xmlns:p="http://schemas.openxmlformats.org/presentationml/2006/main">
   <p:cSld>
     <p:spTree>
@@ -10504,7 +10441,7 @@
             <a:fld id="{1C3486A8-E8FB-4965-B61C-9B9FA7DC7BEE}" type="slidenum">
               <a:rPr lang="en-US" smtClean="0"/>
               <a:pPr/>
-              <a:t>32</a:t>
+              <a:t>31</a:t>
             </a:fld>
             <a:endParaRPr lang="en-US"/>
           </a:p>
@@ -10523,7 +10460,7 @@
 </p:sld>
 </file>
 
-<file path=ppt/slides/slide33.xml><?xml version="1.0" encoding="utf-8"?>
+<file path=ppt/slides/slide32.xml><?xml version="1.0" encoding="utf-8"?>
 <p:sld xmlns:a="http://schemas.openxmlformats.org/drawingml/2006/main" xmlns:r="http://schemas.openxmlformats.org/officeDocument/2006/relationships" xmlns:p="http://schemas.openxmlformats.org/presentationml/2006/main">
   <p:cSld>
     <p:spTree>
@@ -11286,7 +11223,7 @@
             <a:fld id="{1C3486A8-E8FB-4965-B61C-9B9FA7DC7BEE}" type="slidenum">
               <a:rPr lang="en-US" smtClean="0"/>
               <a:pPr/>
-              <a:t>33</a:t>
+              <a:t>32</a:t>
             </a:fld>
             <a:endParaRPr lang="en-US"/>
           </a:p>
@@ -11335,7 +11272,7 @@
 </p:sld>
 </file>
 
-<file path=ppt/slides/slide34.xml><?xml version="1.0" encoding="utf-8"?>
+<file path=ppt/slides/slide33.xml><?xml version="1.0" encoding="utf-8"?>
 <p:sld xmlns:a="http://schemas.openxmlformats.org/drawingml/2006/main" xmlns:r="http://schemas.openxmlformats.org/officeDocument/2006/relationships" xmlns:p="http://schemas.openxmlformats.org/presentationml/2006/main">
   <p:cSld>
     <p:spTree>
@@ -11996,7 +11933,7 @@
             <a:fld id="{1C3486A8-E8FB-4965-B61C-9B9FA7DC7BEE}" type="slidenum">
               <a:rPr lang="en-US" smtClean="0"/>
               <a:pPr/>
-              <a:t>34</a:t>
+              <a:t>33</a:t>
             </a:fld>
             <a:endParaRPr lang="en-US"/>
           </a:p>
@@ -12045,6 +11982,149 @@
 </p:sld>
 </file>
 
+<file path=ppt/slides/slide34.xml><?xml version="1.0" encoding="utf-8"?>
+<p:sld xmlns:a="http://schemas.openxmlformats.org/drawingml/2006/main" xmlns:r="http://schemas.openxmlformats.org/officeDocument/2006/relationships" xmlns:p="http://schemas.openxmlformats.org/presentationml/2006/main">
+  <p:cSld>
+    <p:spTree>
+      <p:nvGrpSpPr>
+        <p:cNvPr id="1" name=""/>
+        <p:cNvGrpSpPr/>
+        <p:nvPr/>
+      </p:nvGrpSpPr>
+      <p:grpSpPr>
+        <a:xfrm>
+          <a:off x="0" y="0"/>
+          <a:ext cx="0" cy="0"/>
+          <a:chOff x="0" y="0"/>
+          <a:chExt cx="0" cy="0"/>
+        </a:xfrm>
+      </p:grpSpPr>
+      <p:sp>
+        <p:nvSpPr>
+          <p:cNvPr id="2" name="Title 1">
+            <a:extLst>
+              <a:ext uri="{FF2B5EF4-FFF2-40B4-BE49-F238E27FC236}">
+                <a16:creationId xmlns:a16="http://schemas.microsoft.com/office/drawing/2014/main" id="{A82DBE75-89D1-5441-8399-5D21C8F24232}"/>
+              </a:ext>
+            </a:extLst>
+          </p:cNvPr>
+          <p:cNvSpPr>
+            <a:spLocks noGrp="1"/>
+          </p:cNvSpPr>
+          <p:nvPr>
+            <p:ph type="title"/>
+          </p:nvPr>
+        </p:nvSpPr>
+        <p:spPr/>
+        <p:txBody>
+          <a:bodyPr/>
+          <a:lstStyle/>
+          <a:p>
+            <a:r>
+              <a:rPr lang="en-US" dirty="0"/>
+              <a:t>Hosting the shiny app</a:t>
+            </a:r>
+          </a:p>
+        </p:txBody>
+      </p:sp>
+      <p:sp>
+        <p:nvSpPr>
+          <p:cNvPr id="3" name="Content Placeholder 2">
+            <a:extLst>
+              <a:ext uri="{FF2B5EF4-FFF2-40B4-BE49-F238E27FC236}">
+                <a16:creationId xmlns:a16="http://schemas.microsoft.com/office/drawing/2014/main" id="{0317B98D-799B-C444-8B06-B3C99954D7A8}"/>
+              </a:ext>
+            </a:extLst>
+          </p:cNvPr>
+          <p:cNvSpPr>
+            <a:spLocks noGrp="1"/>
+          </p:cNvSpPr>
+          <p:nvPr>
+            <p:ph idx="1"/>
+          </p:nvPr>
+        </p:nvSpPr>
+        <p:spPr/>
+        <p:txBody>
+          <a:bodyPr/>
+          <a:lstStyle/>
+          <a:p>
+            <a:r>
+              <a:rPr lang="en-US" sz="2800" dirty="0" err="1"/>
+              <a:t>timetrackR</a:t>
+            </a:r>
+            <a:r>
+              <a:rPr lang="en-US" sz="2800" dirty="0"/>
+              <a:t> is currently hosted on </a:t>
+            </a:r>
+            <a:r>
+              <a:rPr lang="en-US" sz="2800" dirty="0" err="1"/>
+              <a:t>shinyapps.io</a:t>
+            </a:r>
+            <a:endParaRPr lang="en-US" sz="2800" dirty="0"/>
+          </a:p>
+          <a:p>
+            <a:r>
+              <a:rPr lang="en-US" sz="2800" dirty="0"/>
+              <a:t>MSK has access to hosting shiny apps on </a:t>
+            </a:r>
+            <a:r>
+              <a:rPr lang="en-US" sz="2800" dirty="0" err="1"/>
+              <a:t>Rconnect</a:t>
+            </a:r>
+            <a:endParaRPr lang="en-US" sz="2800" dirty="0"/>
+          </a:p>
+          <a:p>
+            <a:pPr lvl="1"/>
+            <a:r>
+              <a:rPr lang="en-US" sz="2400" dirty="0"/>
+              <a:t>Contact Juan Carlos for additional information about how to get set up</a:t>
+            </a:r>
+          </a:p>
+        </p:txBody>
+      </p:sp>
+      <p:sp>
+        <p:nvSpPr>
+          <p:cNvPr id="4" name="Slide Number Placeholder 3">
+            <a:extLst>
+              <a:ext uri="{FF2B5EF4-FFF2-40B4-BE49-F238E27FC236}">
+                <a16:creationId xmlns:a16="http://schemas.microsoft.com/office/drawing/2014/main" id="{7FEF7A6A-AC27-9141-B960-F248219C7E86}"/>
+              </a:ext>
+            </a:extLst>
+          </p:cNvPr>
+          <p:cNvSpPr>
+            <a:spLocks noGrp="1"/>
+          </p:cNvSpPr>
+          <p:nvPr>
+            <p:ph type="sldNum" sz="quarter" idx="4"/>
+          </p:nvPr>
+        </p:nvSpPr>
+        <p:spPr/>
+        <p:txBody>
+          <a:bodyPr/>
+          <a:lstStyle/>
+          <a:p>
+            <a:fld id="{1C3486A8-E8FB-4965-B61C-9B9FA7DC7BEE}" type="slidenum">
+              <a:rPr lang="en-US" smtClean="0"/>
+              <a:pPr/>
+              <a:t>34</a:t>
+            </a:fld>
+            <a:endParaRPr lang="en-US"/>
+          </a:p>
+        </p:txBody>
+      </p:sp>
+    </p:spTree>
+    <p:extLst>
+      <p:ext uri="{BB962C8B-B14F-4D97-AF65-F5344CB8AC3E}">
+        <p14:creationId xmlns:p14="http://schemas.microsoft.com/office/powerpoint/2010/main" val="3747534480"/>
+      </p:ext>
+    </p:extLst>
+  </p:cSld>
+  <p:clrMapOvr>
+    <a:masterClrMapping/>
+  </p:clrMapOvr>
+</p:sld>
+</file>
+
 <file path=ppt/slides/slide35.xml><?xml version="1.0" encoding="utf-8"?>
 <p:sld xmlns:a="http://schemas.openxmlformats.org/drawingml/2006/main" xmlns:r="http://schemas.openxmlformats.org/officeDocument/2006/relationships" xmlns:p="http://schemas.openxmlformats.org/presentationml/2006/main">
   <p:cSld>
@@ -12067,7 +12147,7 @@
           <p:cNvPr id="2" name="Title 1">
             <a:extLst>
               <a:ext uri="{FF2B5EF4-FFF2-40B4-BE49-F238E27FC236}">
-                <a16:creationId xmlns:a16="http://schemas.microsoft.com/office/drawing/2014/main" id="{A82DBE75-89D1-5441-8399-5D21C8F24232}"/>
+                <a16:creationId xmlns:a16="http://schemas.microsoft.com/office/drawing/2014/main" id="{633F03C8-ABD3-4A00-AD80-087F21332873}"/>
               </a:ext>
             </a:extLst>
           </p:cNvPr>
@@ -12085,7 +12165,7 @@
           <a:p>
             <a:r>
               <a:rPr lang="en-US" dirty="0"/>
-              <a:t>Hosting the shiny app</a:t>
+              <a:t>Caveats</a:t>
             </a:r>
           </a:p>
         </p:txBody>
@@ -12095,7 +12175,7 @@
           <p:cNvPr id="3" name="Content Placeholder 2">
             <a:extLst>
               <a:ext uri="{FF2B5EF4-FFF2-40B4-BE49-F238E27FC236}">
-                <a16:creationId xmlns:a16="http://schemas.microsoft.com/office/drawing/2014/main" id="{0317B98D-799B-C444-8B06-B3C99954D7A8}"/>
+                <a16:creationId xmlns:a16="http://schemas.microsoft.com/office/drawing/2014/main" id="{D263E9DF-7C0F-4369-8FD3-EEA6C90D66F0}"/>
               </a:ext>
             </a:extLst>
           </p:cNvPr>
@@ -12112,45 +12192,28 @@
           <a:lstStyle/>
           <a:p>
             <a:r>
-              <a:rPr lang="en-US" sz="2800" dirty="0" err="1"/>
-              <a:t>timetrackR</a:t>
-            </a:r>
-            <a:r>
               <a:rPr lang="en-US" sz="2800" dirty="0"/>
-              <a:t> is currently hosted on </a:t>
-            </a:r>
-            <a:r>
-              <a:rPr lang="en-US" sz="2800" dirty="0" err="1"/>
-              <a:t>shinyapps.io</a:t>
-            </a:r>
-            <a:endParaRPr lang="en-US" sz="2800" dirty="0"/>
+              <a:t>Be careful about your denominators: Analysis is based on </a:t>
+            </a:r>
+            <a:r>
+              <a:rPr lang="en-US" sz="2800" i="1" dirty="0"/>
+              <a:t>what you recorded</a:t>
+            </a:r>
           </a:p>
           <a:p>
             <a:r>
               <a:rPr lang="en-US" sz="2800" dirty="0"/>
-              <a:t>MSK has access to hosting shiny apps on </a:t>
-            </a:r>
-            <a:r>
-              <a:rPr lang="en-US" sz="2800" dirty="0" err="1"/>
-              <a:t>Rconnect</a:t>
-            </a:r>
-            <a:endParaRPr lang="en-US" sz="2800" dirty="0"/>
-          </a:p>
-          <a:p>
-            <a:pPr lvl="1"/>
-            <a:r>
-              <a:rPr lang="en-US" sz="2400" dirty="0"/>
-              <a:t>Contact Juan Carlos for additional information about how to get set up</a:t>
-            </a:r>
-          </a:p>
-        </p:txBody>
-      </p:sp>
-      <p:sp>
-        <p:nvSpPr>
-          <p:cNvPr id="4" name="Slide Number Placeholder 3">
+              <a:t>Entirely retrospective: it’s a summary of what you’ve done, doesn’t include projected time allocations</a:t>
+            </a:r>
+          </a:p>
+        </p:txBody>
+      </p:sp>
+      <p:sp>
+        <p:nvSpPr>
+          <p:cNvPr id="5" name="Slide Number Placeholder 4">
             <a:extLst>
               <a:ext uri="{FF2B5EF4-FFF2-40B4-BE49-F238E27FC236}">
-                <a16:creationId xmlns:a16="http://schemas.microsoft.com/office/drawing/2014/main" id="{7FEF7A6A-AC27-9141-B960-F248219C7E86}"/>
+                <a16:creationId xmlns:a16="http://schemas.microsoft.com/office/drawing/2014/main" id="{5A453F05-4D37-4551-A440-48E8ED1FE85E}"/>
               </a:ext>
             </a:extLst>
           </p:cNvPr>
@@ -12178,7 +12241,7 @@
     </p:spTree>
     <p:extLst>
       <p:ext uri="{BB962C8B-B14F-4D97-AF65-F5344CB8AC3E}">
-        <p14:creationId xmlns:p14="http://schemas.microsoft.com/office/powerpoint/2010/main" val="3747534480"/>
+        <p14:creationId xmlns:p14="http://schemas.microsoft.com/office/powerpoint/2010/main" val="2875116697"/>
       </p:ext>
     </p:extLst>
   </p:cSld>
@@ -12210,132 +12273,6 @@
           <p:cNvPr id="2" name="Title 1">
             <a:extLst>
               <a:ext uri="{FF2B5EF4-FFF2-40B4-BE49-F238E27FC236}">
-                <a16:creationId xmlns:a16="http://schemas.microsoft.com/office/drawing/2014/main" id="{633F03C8-ABD3-4A00-AD80-087F21332873}"/>
-              </a:ext>
-            </a:extLst>
-          </p:cNvPr>
-          <p:cNvSpPr>
-            <a:spLocks noGrp="1"/>
-          </p:cNvSpPr>
-          <p:nvPr>
-            <p:ph type="title"/>
-          </p:nvPr>
-        </p:nvSpPr>
-        <p:spPr/>
-        <p:txBody>
-          <a:bodyPr/>
-          <a:lstStyle/>
-          <a:p>
-            <a:r>
-              <a:rPr lang="en-US" dirty="0"/>
-              <a:t>Caveats</a:t>
-            </a:r>
-          </a:p>
-        </p:txBody>
-      </p:sp>
-      <p:sp>
-        <p:nvSpPr>
-          <p:cNvPr id="3" name="Content Placeholder 2">
-            <a:extLst>
-              <a:ext uri="{FF2B5EF4-FFF2-40B4-BE49-F238E27FC236}">
-                <a16:creationId xmlns:a16="http://schemas.microsoft.com/office/drawing/2014/main" id="{D263E9DF-7C0F-4369-8FD3-EEA6C90D66F0}"/>
-              </a:ext>
-            </a:extLst>
-          </p:cNvPr>
-          <p:cNvSpPr>
-            <a:spLocks noGrp="1"/>
-          </p:cNvSpPr>
-          <p:nvPr>
-            <p:ph idx="1"/>
-          </p:nvPr>
-        </p:nvSpPr>
-        <p:spPr/>
-        <p:txBody>
-          <a:bodyPr/>
-          <a:lstStyle/>
-          <a:p>
-            <a:r>
-              <a:rPr lang="en-US" sz="2800" dirty="0"/>
-              <a:t>Be careful about your denominators: Analysis is based on </a:t>
-            </a:r>
-            <a:r>
-              <a:rPr lang="en-US" sz="2800" i="1" dirty="0"/>
-              <a:t>what you recorded</a:t>
-            </a:r>
-          </a:p>
-          <a:p>
-            <a:r>
-              <a:rPr lang="en-US" sz="2800" dirty="0"/>
-              <a:t>Entirely retrospective: it’s a summary of what you’ve done, doesn’t include projected time allocations</a:t>
-            </a:r>
-          </a:p>
-        </p:txBody>
-      </p:sp>
-      <p:sp>
-        <p:nvSpPr>
-          <p:cNvPr id="5" name="Slide Number Placeholder 4">
-            <a:extLst>
-              <a:ext uri="{FF2B5EF4-FFF2-40B4-BE49-F238E27FC236}">
-                <a16:creationId xmlns:a16="http://schemas.microsoft.com/office/drawing/2014/main" id="{5A453F05-4D37-4551-A440-48E8ED1FE85E}"/>
-              </a:ext>
-            </a:extLst>
-          </p:cNvPr>
-          <p:cNvSpPr>
-            <a:spLocks noGrp="1"/>
-          </p:cNvSpPr>
-          <p:nvPr>
-            <p:ph type="sldNum" sz="quarter" idx="4"/>
-          </p:nvPr>
-        </p:nvSpPr>
-        <p:spPr/>
-        <p:txBody>
-          <a:bodyPr/>
-          <a:lstStyle/>
-          <a:p>
-            <a:fld id="{1C3486A8-E8FB-4965-B61C-9B9FA7DC7BEE}" type="slidenum">
-              <a:rPr lang="en-US" smtClean="0"/>
-              <a:pPr/>
-              <a:t>36</a:t>
-            </a:fld>
-            <a:endParaRPr lang="en-US"/>
-          </a:p>
-        </p:txBody>
-      </p:sp>
-    </p:spTree>
-    <p:extLst>
-      <p:ext uri="{BB962C8B-B14F-4D97-AF65-F5344CB8AC3E}">
-        <p14:creationId xmlns:p14="http://schemas.microsoft.com/office/powerpoint/2010/main" val="2875116697"/>
-      </p:ext>
-    </p:extLst>
-  </p:cSld>
-  <p:clrMapOvr>
-    <a:masterClrMapping/>
-  </p:clrMapOvr>
-</p:sld>
-</file>
-
-<file path=ppt/slides/slide37.xml><?xml version="1.0" encoding="utf-8"?>
-<p:sld xmlns:a="http://schemas.openxmlformats.org/drawingml/2006/main" xmlns:r="http://schemas.openxmlformats.org/officeDocument/2006/relationships" xmlns:p="http://schemas.openxmlformats.org/presentationml/2006/main">
-  <p:cSld>
-    <p:spTree>
-      <p:nvGrpSpPr>
-        <p:cNvPr id="1" name=""/>
-        <p:cNvGrpSpPr/>
-        <p:nvPr/>
-      </p:nvGrpSpPr>
-      <p:grpSpPr>
-        <a:xfrm>
-          <a:off x="0" y="0"/>
-          <a:ext cx="0" cy="0"/>
-          <a:chOff x="0" y="0"/>
-          <a:chExt cx="0" cy="0"/>
-        </a:xfrm>
-      </p:grpSpPr>
-      <p:sp>
-        <p:nvSpPr>
-          <p:cNvPr id="2" name="Title 1">
-            <a:extLst>
-              <a:ext uri="{FF2B5EF4-FFF2-40B4-BE49-F238E27FC236}">
                 <a16:creationId xmlns:a16="http://schemas.microsoft.com/office/drawing/2014/main" id="{8B4B5790-0EA7-4012-93A7-22425D41E1E3}"/>
               </a:ext>
             </a:extLst>
@@ -12395,6 +12332,12 @@
           <a:p>
             <a:r>
               <a:rPr lang="en-US" sz="2800" dirty="0"/>
+              <a:t>Integrate with Toggl’s API?</a:t>
+            </a:r>
+          </a:p>
+          <a:p>
+            <a:r>
+              <a:rPr lang="en-US" sz="2800" dirty="0"/>
               <a:t>Integrate with additional time tracking software other than Toggl?</a:t>
             </a:r>
           </a:p>
@@ -12424,7 +12367,7 @@
             <a:fld id="{1C3486A8-E8FB-4965-B61C-9B9FA7DC7BEE}" type="slidenum">
               <a:rPr lang="en-US" smtClean="0"/>
               <a:pPr/>
-              <a:t>37</a:t>
+              <a:t>36</a:t>
             </a:fld>
             <a:endParaRPr lang="en-US"/>
           </a:p>
@@ -12443,7 +12386,7 @@
 </p:sld>
 </file>
 
-<file path=ppt/slides/slide38.xml><?xml version="1.0" encoding="utf-8"?>
+<file path=ppt/slides/slide37.xml><?xml version="1.0" encoding="utf-8"?>
 <p:sld xmlns:a="http://schemas.openxmlformats.org/drawingml/2006/main" xmlns:r="http://schemas.openxmlformats.org/officeDocument/2006/relationships" xmlns:p="http://schemas.openxmlformats.org/presentationml/2006/main">
   <p:cSld>
     <p:spTree>
@@ -12601,7 +12544,7 @@
             <a:fld id="{1C3486A8-E8FB-4965-B61C-9B9FA7DC7BEE}" type="slidenum">
               <a:rPr lang="en-US" smtClean="0"/>
               <a:pPr/>
-              <a:t>38</a:t>
+              <a:t>37</a:t>
             </a:fld>
             <a:endParaRPr lang="en-US"/>
           </a:p>
@@ -12620,7 +12563,7 @@
 </p:sld>
 </file>
 
-<file path=ppt/slides/slide39.xml><?xml version="1.0" encoding="utf-8"?>
+<file path=ppt/slides/slide38.xml><?xml version="1.0" encoding="utf-8"?>
 <p:sld xmlns:a="http://schemas.openxmlformats.org/drawingml/2006/main" xmlns:r="http://schemas.openxmlformats.org/officeDocument/2006/relationships" xmlns:p="http://schemas.openxmlformats.org/presentationml/2006/main">
   <p:cSld>
     <p:spTree>
@@ -12659,14 +12602,14 @@
           </a:ln>
           <a:extLst>
             <a:ext uri="{909E8E84-426E-40dd-AFC4-6F175D3DCCD1}">
-              <a14:hiddenFill xmlns="" xmlns:a14="http://schemas.microsoft.com/office/drawing/2010/main">
+              <a14:hiddenFill xmlns:a14="http://schemas.microsoft.com/office/drawing/2010/main" xmlns="">
                 <a:solidFill>
                   <a:srgbClr val="FFFFFF"/>
                 </a:solidFill>
               </a14:hiddenFill>
             </a:ext>
             <a:ext uri="{91240B29-F687-4f45-9708-019B960494DF}">
-              <a14:hiddenLine xmlns="" xmlns:a14="http://schemas.microsoft.com/office/drawing/2010/main" w="9525">
+              <a14:hiddenLine xmlns:a14="http://schemas.microsoft.com/office/drawing/2010/main" xmlns="" w="9525">
                 <a:solidFill>
                   <a:srgbClr val="000000"/>
                 </a:solidFill>
@@ -14918,17 +14861,6 @@
 </file>
 
 <file path=customXml/item1.xml><?xml version="1.0" encoding="utf-8"?>
-<p:properties xmlns:p="http://schemas.microsoft.com/office/2006/metadata/properties" xmlns:xsi="http://www.w3.org/2001/XMLSchema-instance" xmlns:pc="http://schemas.microsoft.com/office/infopath/2007/PartnerControls">
-  <documentManagement>
-    <ImageCreateDate xmlns="E64CF27C-2ECC-48E8-947E-CA63274FB2E8" xsi:nil="true"/>
-    <PublishingExpirationDate xmlns="http://schemas.microsoft.com/sharepoint/v3" xsi:nil="true"/>
-    <PublishingStartDate xmlns="http://schemas.microsoft.com/sharepoint/v3" xsi:nil="true"/>
-    <wic_System_Copyright xmlns="http://schemas.microsoft.com/sharepoint/v3/fields" xsi:nil="true"/>
-  </documentManagement>
-</p:properties>
-</file>
-
-<file path=customXml/item2.xml><?xml version="1.0" encoding="utf-8"?>
 <?mso-contentType ?>
 <FormTemplates xmlns="http://schemas.microsoft.com/sharepoint/v3/contenttype/forms">
   <Display>DocumentLibraryForm</Display>
@@ -14937,7 +14869,7 @@
 </FormTemplates>
 </file>
 
-<file path=customXml/item3.xml><?xml version="1.0" encoding="utf-8"?>
+<file path=customXml/item2.xml><?xml version="1.0" encoding="utf-8"?>
 <ct:contentTypeSchema xmlns:ct="http://schemas.microsoft.com/office/2006/metadata/contentType" xmlns:ma="http://schemas.microsoft.com/office/2006/metadata/properties/metaAttributes" ct:_="" ma:_="" ma:contentTypeName="Image" ma:contentTypeID="0x0101009148F5A04DDD49CBA7127AADA5FB792B00AADE34325A8B49CDA8BB4DB53328F214008DA1A4150FB2B848A3EB7B452BFA7AC5" ma:contentTypeVersion="1" ma:contentTypeDescription="Upload an image." ma:contentTypeScope="" ma:versionID="c5dd4a19140d82efd42bf2e2156fee3e">
   <xsd:schema xmlns:xsd="http://www.w3.org/2001/XMLSchema" xmlns:xs="http://www.w3.org/2001/XMLSchema" xmlns:p="http://schemas.microsoft.com/office/2006/metadata/properties" xmlns:ns1="http://schemas.microsoft.com/sharepoint/v3" xmlns:ns2="E64CF27C-2ECC-48E8-947E-CA63274FB2E8" xmlns:ns3="http://schemas.microsoft.com/sharepoint/v3/fields" targetNamespace="http://schemas.microsoft.com/office/2006/metadata/properties" ma:root="true" ma:fieldsID="8669bc30feb5185623fa09da941496e2" ns1:_="" ns2:_="" ns3:_="">
     <xsd:import namespace="http://schemas.microsoft.com/sharepoint/v3"/>
@@ -15139,25 +15071,18 @@
 </ct:contentTypeSchema>
 </file>
 
-<file path=customXml/itemProps1.xml><?xml version="1.0" encoding="utf-8"?>
-<ds:datastoreItem xmlns:ds="http://schemas.openxmlformats.org/officeDocument/2006/customXml" ds:itemID="{2B30647F-A921-45DD-9E91-010F7EF4FB48}">
-  <ds:schemaRefs>
-    <ds:schemaRef ds:uri="http://schemas.microsoft.com/office/infopath/2007/PartnerControls"/>
-    <ds:schemaRef ds:uri="http://purl.org/dc/elements/1.1/"/>
-    <ds:schemaRef ds:uri="http://schemas.microsoft.com/office/2006/metadata/properties"/>
-    <ds:schemaRef ds:uri="E64CF27C-2ECC-48E8-947E-CA63274FB2E8"/>
-    <ds:schemaRef ds:uri="http://schemas.microsoft.com/sharepoint/v3"/>
-    <ds:schemaRef ds:uri="http://purl.org/dc/terms/"/>
-    <ds:schemaRef ds:uri="http://schemas.openxmlformats.org/package/2006/metadata/core-properties"/>
-    <ds:schemaRef ds:uri="http://schemas.microsoft.com/office/2006/documentManagement/types"/>
-    <ds:schemaRef ds:uri="http://schemas.microsoft.com/sharepoint/v3/fields"/>
-    <ds:schemaRef ds:uri="http://www.w3.org/XML/1998/namespace"/>
-    <ds:schemaRef ds:uri="http://purl.org/dc/dcmitype/"/>
-  </ds:schemaRefs>
-</ds:datastoreItem>
+<file path=customXml/item3.xml><?xml version="1.0" encoding="utf-8"?>
+<p:properties xmlns:p="http://schemas.microsoft.com/office/2006/metadata/properties" xmlns:xsi="http://www.w3.org/2001/XMLSchema-instance" xmlns:pc="http://schemas.microsoft.com/office/infopath/2007/PartnerControls">
+  <documentManagement>
+    <ImageCreateDate xmlns="E64CF27C-2ECC-48E8-947E-CA63274FB2E8" xsi:nil="true"/>
+    <PublishingExpirationDate xmlns="http://schemas.microsoft.com/sharepoint/v3" xsi:nil="true"/>
+    <PublishingStartDate xmlns="http://schemas.microsoft.com/sharepoint/v3" xsi:nil="true"/>
+    <wic_System_Copyright xmlns="http://schemas.microsoft.com/sharepoint/v3/fields" xsi:nil="true"/>
+  </documentManagement>
+</p:properties>
 </file>
 
-<file path=customXml/itemProps2.xml><?xml version="1.0" encoding="utf-8"?>
+<file path=customXml/itemProps1.xml><?xml version="1.0" encoding="utf-8"?>
 <ds:datastoreItem xmlns:ds="http://schemas.openxmlformats.org/officeDocument/2006/customXml" ds:itemID="{B01F69EB-AD96-4AD6-8A18-0C8728F5F031}">
   <ds:schemaRefs>
     <ds:schemaRef ds:uri="http://schemas.microsoft.com/sharepoint/v3/contenttype/forms"/>
@@ -15165,7 +15090,7 @@
 </ds:datastoreItem>
 </file>
 
-<file path=customXml/itemProps3.xml><?xml version="1.0" encoding="utf-8"?>
+<file path=customXml/itemProps2.xml><?xml version="1.0" encoding="utf-8"?>
 <ds:datastoreItem xmlns:ds="http://schemas.openxmlformats.org/officeDocument/2006/customXml" ds:itemID="{E57EBD8B-EA50-4231-9F03-F9188E4066E3}">
   <ds:schemaRefs>
     <ds:schemaRef ds:uri="http://schemas.microsoft.com/office/2006/metadata/contentType"/>
@@ -15183,4 +15108,22 @@
     <ds:schemaRef ds:uri="http://schemas.microsoft.com/internal/obd"/>
   </ds:schemaRefs>
 </ds:datastoreItem>
+</file>
+
+<file path=customXml/itemProps3.xml><?xml version="1.0" encoding="utf-8"?>
+<ds:datastoreItem xmlns:ds="http://schemas.openxmlformats.org/officeDocument/2006/customXml" ds:itemID="{2B30647F-A921-45DD-9E91-010F7EF4FB48}">
+  <ds:schemaRefs>
+    <ds:schemaRef ds:uri="http://schemas.microsoft.com/office/infopath/2007/PartnerControls"/>
+    <ds:schemaRef ds:uri="http://purl.org/dc/elements/1.1/"/>
+    <ds:schemaRef ds:uri="http://schemas.microsoft.com/office/2006/metadata/properties"/>
+    <ds:schemaRef ds:uri="E64CF27C-2ECC-48E8-947E-CA63274FB2E8"/>
+    <ds:schemaRef ds:uri="http://schemas.microsoft.com/sharepoint/v3"/>
+    <ds:schemaRef ds:uri="http://purl.org/dc/terms/"/>
+    <ds:schemaRef ds:uri="http://schemas.openxmlformats.org/package/2006/metadata/core-properties"/>
+    <ds:schemaRef ds:uri="http://schemas.microsoft.com/office/2006/documentManagement/types"/>
+    <ds:schemaRef ds:uri="http://schemas.microsoft.com/sharepoint/v3/fields"/>
+    <ds:schemaRef ds:uri="http://www.w3.org/XML/1998/namespace"/>
+    <ds:schemaRef ds:uri="http://purl.org/dc/dcmitype/"/>
+  </ds:schemaRefs>
+</ds:datastoreItem>
 </file>
</xml_diff>

<commit_message>
Delete presentation outline, upload final presentation
</commit_message>
<xml_diff>
--- a/Strategy and Innovation timetrackR Presentation.pptx
+++ b/Strategy and Innovation timetrackR Presentation.pptx
@@ -5,10 +5,10 @@
     <p:sldMasterId id="2147483648" r:id="rId4"/>
   </p:sldMasterIdLst>
   <p:notesMasterIdLst>
-    <p:notesMasterId r:id="rId44"/>
+    <p:notesMasterId r:id="rId42"/>
   </p:notesMasterIdLst>
   <p:handoutMasterIdLst>
-    <p:handoutMasterId r:id="rId45"/>
+    <p:handoutMasterId r:id="rId43"/>
   </p:handoutMasterIdLst>
   <p:sldIdLst>
     <p:sldId id="256" r:id="rId5"/>
@@ -39,17 +39,15 @@
     <p:sldId id="316" r:id="rId30"/>
     <p:sldId id="302" r:id="rId31"/>
     <p:sldId id="315" r:id="rId32"/>
-    <p:sldId id="289" r:id="rId33"/>
-    <p:sldId id="294" r:id="rId34"/>
-    <p:sldId id="288" r:id="rId35"/>
-    <p:sldId id="295" r:id="rId36"/>
-    <p:sldId id="301" r:id="rId37"/>
-    <p:sldId id="307" r:id="rId38"/>
-    <p:sldId id="313" r:id="rId39"/>
-    <p:sldId id="262" r:id="rId40"/>
-    <p:sldId id="280" r:id="rId41"/>
-    <p:sldId id="263" r:id="rId42"/>
-    <p:sldId id="273" r:id="rId43"/>
+    <p:sldId id="288" r:id="rId33"/>
+    <p:sldId id="295" r:id="rId34"/>
+    <p:sldId id="301" r:id="rId35"/>
+    <p:sldId id="307" r:id="rId36"/>
+    <p:sldId id="313" r:id="rId37"/>
+    <p:sldId id="262" r:id="rId38"/>
+    <p:sldId id="280" r:id="rId39"/>
+    <p:sldId id="263" r:id="rId40"/>
+    <p:sldId id="273" r:id="rId41"/>
   </p:sldIdLst>
   <p:sldSz cx="9144000" cy="6858000" type="screen4x3"/>
   <p:notesSz cx="6858000" cy="9144000"/>
@@ -291,7 +289,7 @@
           <a:p>
             <a:fld id="{DA61AB23-0316-4A6A-B29B-19F469FB1971}" type="datetimeFigureOut">
               <a:rPr lang="en-US" smtClean="0"/>
-              <a:t>4/20/20</a:t>
+              <a:t>4/29/20</a:t>
             </a:fld>
             <a:endParaRPr lang="en-US"/>
           </a:p>
@@ -469,7 +467,7 @@
           <a:p>
             <a:fld id="{7F6DE0E8-87C7-4A14-9F3C-CD4E49706B18}" type="datetimeFigureOut">
               <a:rPr lang="en-US" smtClean="0"/>
-              <a:t>4/20/20</a:t>
+              <a:t>4/29/20</a:t>
             </a:fld>
             <a:endParaRPr lang="en-US"/>
           </a:p>
@@ -781,7 +779,10 @@
           <a:bodyPr/>
           <a:lstStyle/>
           <a:p>
-            <a:endParaRPr lang="en-US" dirty="0"/>
+            <a:r>
+              <a:rPr lang="en-US" dirty="0"/>
+              <a:t>Previously gave this talk for the February RLadies and have since updated the app a fair amount and am excited to be presenting an updated version today</a:t>
+            </a:r>
           </a:p>
         </p:txBody>
       </p:sp>
@@ -802,7 +803,7 @@
           <a:p>
             <a:fld id="{9C5C8B17-D1C9-48DD-A1B1-EDA1E362804A}" type="slidenum">
               <a:rPr lang="en-US" smtClean="0"/>
-              <a:t>5</a:t>
+              <a:t>1</a:t>
             </a:fld>
             <a:endParaRPr lang="en-US"/>
           </a:p>
@@ -811,7 +812,7 @@
     </p:spTree>
     <p:extLst>
       <p:ext uri="{BB962C8B-B14F-4D97-AF65-F5344CB8AC3E}">
-        <p14:creationId xmlns:p14="http://schemas.microsoft.com/office/powerpoint/2010/main" val="2750340782"/>
+        <p14:creationId xmlns:p14="http://schemas.microsoft.com/office/powerpoint/2010/main" val="3828203009"/>
       </p:ext>
     </p:extLst>
   </p:cSld>
@@ -865,10 +866,24 @@
           <a:bodyPr/>
           <a:lstStyle/>
           <a:p>
-            <a:r>
-              <a:rPr lang="en-US" dirty="0"/>
-              <a:t>For discussion: Do others do this? If so, how? In conjunction with management or separately? </a:t>
-            </a:r>
+            <a:pPr marL="0" marR="0" lvl="0" indent="0" algn="l" defTabSz="914400" rtl="0" eaLnBrk="1" fontAlgn="auto" latinLnBrk="0" hangingPunct="1">
+              <a:lnSpc>
+                <a:spcPct val="100000"/>
+              </a:lnSpc>
+              <a:spcBef>
+                <a:spcPts val="0"/>
+              </a:spcBef>
+              <a:spcAft>
+                <a:spcPts val="0"/>
+              </a:spcAft>
+              <a:buClrTx/>
+              <a:buSzTx/>
+              <a:buFontTx/>
+              <a:buNone/>
+              <a:tabLst/>
+              <a:defRPr/>
+            </a:pPr>
+            <a:endParaRPr lang="en-US" dirty="0"/>
           </a:p>
         </p:txBody>
       </p:sp>
@@ -889,7 +904,7 @@
           <a:p>
             <a:fld id="{9C5C8B17-D1C9-48DD-A1B1-EDA1E362804A}" type="slidenum">
               <a:rPr lang="en-US" smtClean="0"/>
-              <a:t>38</a:t>
+              <a:t>15</a:t>
             </a:fld>
             <a:endParaRPr lang="en-US"/>
           </a:p>
@@ -898,7 +913,893 @@
     </p:spTree>
     <p:extLst>
       <p:ext uri="{BB962C8B-B14F-4D97-AF65-F5344CB8AC3E}">
-        <p14:creationId xmlns:p14="http://schemas.microsoft.com/office/powerpoint/2010/main" val="3374403230"/>
+        <p14:creationId xmlns:p14="http://schemas.microsoft.com/office/powerpoint/2010/main" val="636758641"/>
+      </p:ext>
+    </p:extLst>
+  </p:cSld>
+  <p:clrMapOvr>
+    <a:masterClrMapping/>
+  </p:clrMapOvr>
+</p:notes>
+</file>
+
+<file path=ppt/notesSlides/notesSlide11.xml><?xml version="1.0" encoding="utf-8"?>
+<p:notes xmlns:a="http://schemas.openxmlformats.org/drawingml/2006/main" xmlns:r="http://schemas.openxmlformats.org/officeDocument/2006/relationships" xmlns:p="http://schemas.openxmlformats.org/presentationml/2006/main">
+  <p:cSld>
+    <p:spTree>
+      <p:nvGrpSpPr>
+        <p:cNvPr id="1" name=""/>
+        <p:cNvGrpSpPr/>
+        <p:nvPr/>
+      </p:nvGrpSpPr>
+      <p:grpSpPr>
+        <a:xfrm>
+          <a:off x="0" y="0"/>
+          <a:ext cx="0" cy="0"/>
+          <a:chOff x="0" y="0"/>
+          <a:chExt cx="0" cy="0"/>
+        </a:xfrm>
+      </p:grpSpPr>
+      <p:sp>
+        <p:nvSpPr>
+          <p:cNvPr id="2" name="Slide Image Placeholder 1"/>
+          <p:cNvSpPr>
+            <a:spLocks noGrp="1" noRot="1" noChangeAspect="1"/>
+          </p:cNvSpPr>
+          <p:nvPr>
+            <p:ph type="sldImg"/>
+          </p:nvPr>
+        </p:nvSpPr>
+        <p:spPr/>
+      </p:sp>
+      <p:sp>
+        <p:nvSpPr>
+          <p:cNvPr id="3" name="Notes Placeholder 2"/>
+          <p:cNvSpPr>
+            <a:spLocks noGrp="1"/>
+          </p:cNvSpPr>
+          <p:nvPr>
+            <p:ph type="body" idx="1"/>
+          </p:nvPr>
+        </p:nvSpPr>
+        <p:spPr/>
+        <p:txBody>
+          <a:bodyPr/>
+          <a:lstStyle/>
+          <a:p>
+            <a:r>
+              <a:rPr lang="en-US" dirty="0"/>
+              <a:t>+ timeline </a:t>
+            </a:r>
+          </a:p>
+        </p:txBody>
+      </p:sp>
+      <p:sp>
+        <p:nvSpPr>
+          <p:cNvPr id="4" name="Slide Number Placeholder 3"/>
+          <p:cNvSpPr>
+            <a:spLocks noGrp="1"/>
+          </p:cNvSpPr>
+          <p:nvPr>
+            <p:ph type="sldNum" sz="quarter" idx="5"/>
+          </p:nvPr>
+        </p:nvSpPr>
+        <p:spPr/>
+        <p:txBody>
+          <a:bodyPr/>
+          <a:lstStyle/>
+          <a:p>
+            <a:fld id="{9C5C8B17-D1C9-48DD-A1B1-EDA1E362804A}" type="slidenum">
+              <a:rPr lang="en-US" smtClean="0"/>
+              <a:t>18</a:t>
+            </a:fld>
+            <a:endParaRPr lang="en-US"/>
+          </a:p>
+        </p:txBody>
+      </p:sp>
+    </p:spTree>
+    <p:extLst>
+      <p:ext uri="{BB962C8B-B14F-4D97-AF65-F5344CB8AC3E}">
+        <p14:creationId xmlns:p14="http://schemas.microsoft.com/office/powerpoint/2010/main" val="1757699167"/>
+      </p:ext>
+    </p:extLst>
+  </p:cSld>
+  <p:clrMapOvr>
+    <a:masterClrMapping/>
+  </p:clrMapOvr>
+</p:notes>
+</file>
+
+<file path=ppt/notesSlides/notesSlide12.xml><?xml version="1.0" encoding="utf-8"?>
+<p:notes xmlns:a="http://schemas.openxmlformats.org/drawingml/2006/main" xmlns:r="http://schemas.openxmlformats.org/officeDocument/2006/relationships" xmlns:p="http://schemas.openxmlformats.org/presentationml/2006/main">
+  <p:cSld>
+    <p:spTree>
+      <p:nvGrpSpPr>
+        <p:cNvPr id="1" name=""/>
+        <p:cNvGrpSpPr/>
+        <p:nvPr/>
+      </p:nvGrpSpPr>
+      <p:grpSpPr>
+        <a:xfrm>
+          <a:off x="0" y="0"/>
+          <a:ext cx="0" cy="0"/>
+          <a:chOff x="0" y="0"/>
+          <a:chExt cx="0" cy="0"/>
+        </a:xfrm>
+      </p:grpSpPr>
+      <p:sp>
+        <p:nvSpPr>
+          <p:cNvPr id="2" name="Slide Image Placeholder 1"/>
+          <p:cNvSpPr>
+            <a:spLocks noGrp="1" noRot="1" noChangeAspect="1"/>
+          </p:cNvSpPr>
+          <p:nvPr>
+            <p:ph type="sldImg"/>
+          </p:nvPr>
+        </p:nvSpPr>
+        <p:spPr/>
+      </p:sp>
+      <p:sp>
+        <p:nvSpPr>
+          <p:cNvPr id="3" name="Notes Placeholder 2"/>
+          <p:cNvSpPr>
+            <a:spLocks noGrp="1"/>
+          </p:cNvSpPr>
+          <p:nvPr>
+            <p:ph type="body" idx="1"/>
+          </p:nvPr>
+        </p:nvSpPr>
+        <p:spPr/>
+        <p:txBody>
+          <a:bodyPr/>
+          <a:lstStyle/>
+          <a:p>
+            <a:pPr marL="0" marR="0" lvl="0" indent="0" algn="l" defTabSz="914400" rtl="0" eaLnBrk="1" fontAlgn="auto" latinLnBrk="0" hangingPunct="1">
+              <a:lnSpc>
+                <a:spcPct val="100000"/>
+              </a:lnSpc>
+              <a:spcBef>
+                <a:spcPts val="0"/>
+              </a:spcBef>
+              <a:spcAft>
+                <a:spcPts val="0"/>
+              </a:spcAft>
+              <a:buClrTx/>
+              <a:buSzTx/>
+              <a:buFontTx/>
+              <a:buNone/>
+              <a:tabLst/>
+              <a:defRPr/>
+            </a:pPr>
+            <a:r>
+              <a:rPr lang="en-US" sz="1200" dirty="0">
+                <a:hlinkClick r:id="rId3"/>
+              </a:rPr>
+              <a:t>timetrackr.shinyapps.io/timetrackR</a:t>
+            </a:r>
+            <a:endParaRPr lang="en-US" sz="1200" dirty="0"/>
+          </a:p>
+          <a:p>
+            <a:pPr marL="0" marR="0" lvl="0" indent="0" algn="l" defTabSz="914400" rtl="0" eaLnBrk="1" fontAlgn="auto" latinLnBrk="0" hangingPunct="1">
+              <a:lnSpc>
+                <a:spcPct val="100000"/>
+              </a:lnSpc>
+              <a:spcBef>
+                <a:spcPts val="0"/>
+              </a:spcBef>
+              <a:spcAft>
+                <a:spcPts val="0"/>
+              </a:spcAft>
+              <a:buClrTx/>
+              <a:buSzTx/>
+              <a:buFontTx/>
+              <a:buNone/>
+              <a:tabLst/>
+              <a:defRPr/>
+            </a:pPr>
+            <a:r>
+              <a:rPr lang="en-US" sz="1200" dirty="0"/>
+              <a:t>Go slower through demo – emphasize projects </a:t>
+            </a:r>
+          </a:p>
+          <a:p>
+            <a:endParaRPr lang="en-US" dirty="0"/>
+          </a:p>
+        </p:txBody>
+      </p:sp>
+      <p:sp>
+        <p:nvSpPr>
+          <p:cNvPr id="4" name="Slide Number Placeholder 3"/>
+          <p:cNvSpPr>
+            <a:spLocks noGrp="1"/>
+          </p:cNvSpPr>
+          <p:nvPr>
+            <p:ph type="sldNum" sz="quarter" idx="5"/>
+          </p:nvPr>
+        </p:nvSpPr>
+        <p:spPr/>
+        <p:txBody>
+          <a:bodyPr/>
+          <a:lstStyle/>
+          <a:p>
+            <a:fld id="{9C5C8B17-D1C9-48DD-A1B1-EDA1E362804A}" type="slidenum">
+              <a:rPr lang="en-US" smtClean="0"/>
+              <a:t>19</a:t>
+            </a:fld>
+            <a:endParaRPr lang="en-US"/>
+          </a:p>
+        </p:txBody>
+      </p:sp>
+    </p:spTree>
+    <p:extLst>
+      <p:ext uri="{BB962C8B-B14F-4D97-AF65-F5344CB8AC3E}">
+        <p14:creationId xmlns:p14="http://schemas.microsoft.com/office/powerpoint/2010/main" val="3460010275"/>
+      </p:ext>
+    </p:extLst>
+  </p:cSld>
+  <p:clrMapOvr>
+    <a:masterClrMapping/>
+  </p:clrMapOvr>
+</p:notes>
+</file>
+
+<file path=ppt/notesSlides/notesSlide13.xml><?xml version="1.0" encoding="utf-8"?>
+<p:notes xmlns:a="http://schemas.openxmlformats.org/drawingml/2006/main" xmlns:r="http://schemas.openxmlformats.org/officeDocument/2006/relationships" xmlns:p="http://schemas.openxmlformats.org/presentationml/2006/main">
+  <p:cSld>
+    <p:spTree>
+      <p:nvGrpSpPr>
+        <p:cNvPr id="1" name=""/>
+        <p:cNvGrpSpPr/>
+        <p:nvPr/>
+      </p:nvGrpSpPr>
+      <p:grpSpPr>
+        <a:xfrm>
+          <a:off x="0" y="0"/>
+          <a:ext cx="0" cy="0"/>
+          <a:chOff x="0" y="0"/>
+          <a:chExt cx="0" cy="0"/>
+        </a:xfrm>
+      </p:grpSpPr>
+      <p:sp>
+        <p:nvSpPr>
+          <p:cNvPr id="2" name="Slide Image Placeholder 1"/>
+          <p:cNvSpPr>
+            <a:spLocks noGrp="1" noRot="1" noChangeAspect="1"/>
+          </p:cNvSpPr>
+          <p:nvPr>
+            <p:ph type="sldImg"/>
+          </p:nvPr>
+        </p:nvSpPr>
+        <p:spPr/>
+      </p:sp>
+      <p:sp>
+        <p:nvSpPr>
+          <p:cNvPr id="3" name="Notes Placeholder 2"/>
+          <p:cNvSpPr>
+            <a:spLocks noGrp="1"/>
+          </p:cNvSpPr>
+          <p:nvPr>
+            <p:ph type="body" idx="1"/>
+          </p:nvPr>
+        </p:nvSpPr>
+        <p:spPr/>
+        <p:txBody>
+          <a:bodyPr/>
+          <a:lstStyle/>
+          <a:p>
+            <a:r>
+              <a:rPr lang="en-US"/>
+              <a:t>+ description of colors </a:t>
+            </a:r>
+          </a:p>
+        </p:txBody>
+      </p:sp>
+      <p:sp>
+        <p:nvSpPr>
+          <p:cNvPr id="4" name="Slide Number Placeholder 3"/>
+          <p:cNvSpPr>
+            <a:spLocks noGrp="1"/>
+          </p:cNvSpPr>
+          <p:nvPr>
+            <p:ph type="sldNum" sz="quarter" idx="5"/>
+          </p:nvPr>
+        </p:nvSpPr>
+        <p:spPr/>
+        <p:txBody>
+          <a:bodyPr/>
+          <a:lstStyle/>
+          <a:p>
+            <a:fld id="{9C5C8B17-D1C9-48DD-A1B1-EDA1E362804A}" type="slidenum">
+              <a:rPr lang="en-US" smtClean="0"/>
+              <a:t>20</a:t>
+            </a:fld>
+            <a:endParaRPr lang="en-US"/>
+          </a:p>
+        </p:txBody>
+      </p:sp>
+    </p:spTree>
+    <p:extLst>
+      <p:ext uri="{BB962C8B-B14F-4D97-AF65-F5344CB8AC3E}">
+        <p14:creationId xmlns:p14="http://schemas.microsoft.com/office/powerpoint/2010/main" val="1084252819"/>
+      </p:ext>
+    </p:extLst>
+  </p:cSld>
+  <p:clrMapOvr>
+    <a:masterClrMapping/>
+  </p:clrMapOvr>
+</p:notes>
+</file>
+
+<file path=ppt/notesSlides/notesSlide14.xml><?xml version="1.0" encoding="utf-8"?>
+<p:notes xmlns:a="http://schemas.openxmlformats.org/drawingml/2006/main" xmlns:r="http://schemas.openxmlformats.org/officeDocument/2006/relationships" xmlns:p="http://schemas.openxmlformats.org/presentationml/2006/main">
+  <p:cSld>
+    <p:spTree>
+      <p:nvGrpSpPr>
+        <p:cNvPr id="1" name=""/>
+        <p:cNvGrpSpPr/>
+        <p:nvPr/>
+      </p:nvGrpSpPr>
+      <p:grpSpPr>
+        <a:xfrm>
+          <a:off x="0" y="0"/>
+          <a:ext cx="0" cy="0"/>
+          <a:chOff x="0" y="0"/>
+          <a:chExt cx="0" cy="0"/>
+        </a:xfrm>
+      </p:grpSpPr>
+      <p:sp>
+        <p:nvSpPr>
+          <p:cNvPr id="2" name="Slide Image Placeholder 1"/>
+          <p:cNvSpPr>
+            <a:spLocks noGrp="1" noRot="1" noChangeAspect="1"/>
+          </p:cNvSpPr>
+          <p:nvPr>
+            <p:ph type="sldImg"/>
+          </p:nvPr>
+        </p:nvSpPr>
+        <p:spPr/>
+      </p:sp>
+      <p:sp>
+        <p:nvSpPr>
+          <p:cNvPr id="3" name="Notes Placeholder 2"/>
+          <p:cNvSpPr>
+            <a:spLocks noGrp="1"/>
+          </p:cNvSpPr>
+          <p:nvPr>
+            <p:ph type="body" idx="1"/>
+          </p:nvPr>
+        </p:nvSpPr>
+        <p:spPr/>
+        <p:txBody>
+          <a:bodyPr/>
+          <a:lstStyle/>
+          <a:p>
+            <a:endParaRPr lang="en-US" dirty="0"/>
+          </a:p>
+        </p:txBody>
+      </p:sp>
+      <p:sp>
+        <p:nvSpPr>
+          <p:cNvPr id="4" name="Slide Number Placeholder 3"/>
+          <p:cNvSpPr>
+            <a:spLocks noGrp="1"/>
+          </p:cNvSpPr>
+          <p:nvPr>
+            <p:ph type="sldNum" sz="quarter" idx="5"/>
+          </p:nvPr>
+        </p:nvSpPr>
+        <p:spPr/>
+        <p:txBody>
+          <a:bodyPr/>
+          <a:lstStyle/>
+          <a:p>
+            <a:fld id="{9C5C8B17-D1C9-48DD-A1B1-EDA1E362804A}" type="slidenum">
+              <a:rPr lang="en-US" smtClean="0"/>
+              <a:t>25</a:t>
+            </a:fld>
+            <a:endParaRPr lang="en-US"/>
+          </a:p>
+        </p:txBody>
+      </p:sp>
+    </p:spTree>
+    <p:extLst>
+      <p:ext uri="{BB962C8B-B14F-4D97-AF65-F5344CB8AC3E}">
+        <p14:creationId xmlns:p14="http://schemas.microsoft.com/office/powerpoint/2010/main" val="3552024904"/>
+      </p:ext>
+    </p:extLst>
+  </p:cSld>
+  <p:clrMapOvr>
+    <a:masterClrMapping/>
+  </p:clrMapOvr>
+</p:notes>
+</file>
+
+<file path=ppt/notesSlides/notesSlide15.xml><?xml version="1.0" encoding="utf-8"?>
+<p:notes xmlns:a="http://schemas.openxmlformats.org/drawingml/2006/main" xmlns:r="http://schemas.openxmlformats.org/officeDocument/2006/relationships" xmlns:p="http://schemas.openxmlformats.org/presentationml/2006/main">
+  <p:cSld>
+    <p:spTree>
+      <p:nvGrpSpPr>
+        <p:cNvPr id="1" name=""/>
+        <p:cNvGrpSpPr/>
+        <p:nvPr/>
+      </p:nvGrpSpPr>
+      <p:grpSpPr>
+        <a:xfrm>
+          <a:off x="0" y="0"/>
+          <a:ext cx="0" cy="0"/>
+          <a:chOff x="0" y="0"/>
+          <a:chExt cx="0" cy="0"/>
+        </a:xfrm>
+      </p:grpSpPr>
+      <p:sp>
+        <p:nvSpPr>
+          <p:cNvPr id="2" name="Slide Image Placeholder 1"/>
+          <p:cNvSpPr>
+            <a:spLocks noGrp="1" noRot="1" noChangeAspect="1"/>
+          </p:cNvSpPr>
+          <p:nvPr>
+            <p:ph type="sldImg"/>
+          </p:nvPr>
+        </p:nvSpPr>
+        <p:spPr/>
+      </p:sp>
+      <p:sp>
+        <p:nvSpPr>
+          <p:cNvPr id="3" name="Notes Placeholder 2"/>
+          <p:cNvSpPr>
+            <a:spLocks noGrp="1"/>
+          </p:cNvSpPr>
+          <p:nvPr>
+            <p:ph type="body" idx="1"/>
+          </p:nvPr>
+        </p:nvSpPr>
+        <p:spPr/>
+        <p:txBody>
+          <a:bodyPr/>
+          <a:lstStyle/>
+          <a:p>
+            <a:r>
+              <a:rPr lang="en-US" dirty="0"/>
+              <a:t>Definition of workflow (“workflow using timetrackR”)</a:t>
+            </a:r>
+          </a:p>
+        </p:txBody>
+      </p:sp>
+      <p:sp>
+        <p:nvSpPr>
+          <p:cNvPr id="4" name="Slide Number Placeholder 3"/>
+          <p:cNvSpPr>
+            <a:spLocks noGrp="1"/>
+          </p:cNvSpPr>
+          <p:nvPr>
+            <p:ph type="sldNum" sz="quarter" idx="5"/>
+          </p:nvPr>
+        </p:nvSpPr>
+        <p:spPr/>
+        <p:txBody>
+          <a:bodyPr/>
+          <a:lstStyle/>
+          <a:p>
+            <a:fld id="{9C5C8B17-D1C9-48DD-A1B1-EDA1E362804A}" type="slidenum">
+              <a:rPr lang="en-US" smtClean="0"/>
+              <a:t>26</a:t>
+            </a:fld>
+            <a:endParaRPr lang="en-US"/>
+          </a:p>
+        </p:txBody>
+      </p:sp>
+    </p:spTree>
+    <p:extLst>
+      <p:ext uri="{BB962C8B-B14F-4D97-AF65-F5344CB8AC3E}">
+        <p14:creationId xmlns:p14="http://schemas.microsoft.com/office/powerpoint/2010/main" val="3128954464"/>
+      </p:ext>
+    </p:extLst>
+  </p:cSld>
+  <p:clrMapOvr>
+    <a:masterClrMapping/>
+  </p:clrMapOvr>
+</p:notes>
+</file>
+
+<file path=ppt/notesSlides/notesSlide16.xml><?xml version="1.0" encoding="utf-8"?>
+<p:notes xmlns:a="http://schemas.openxmlformats.org/drawingml/2006/main" xmlns:r="http://schemas.openxmlformats.org/officeDocument/2006/relationships" xmlns:p="http://schemas.openxmlformats.org/presentationml/2006/main">
+  <p:cSld>
+    <p:spTree>
+      <p:nvGrpSpPr>
+        <p:cNvPr id="1" name=""/>
+        <p:cNvGrpSpPr/>
+        <p:nvPr/>
+      </p:nvGrpSpPr>
+      <p:grpSpPr>
+        <a:xfrm>
+          <a:off x="0" y="0"/>
+          <a:ext cx="0" cy="0"/>
+          <a:chOff x="0" y="0"/>
+          <a:chExt cx="0" cy="0"/>
+        </a:xfrm>
+      </p:grpSpPr>
+      <p:sp>
+        <p:nvSpPr>
+          <p:cNvPr id="2" name="Slide Image Placeholder 1"/>
+          <p:cNvSpPr>
+            <a:spLocks noGrp="1" noRot="1" noChangeAspect="1"/>
+          </p:cNvSpPr>
+          <p:nvPr>
+            <p:ph type="sldImg"/>
+          </p:nvPr>
+        </p:nvSpPr>
+        <p:spPr/>
+      </p:sp>
+      <p:sp>
+        <p:nvSpPr>
+          <p:cNvPr id="3" name="Notes Placeholder 2"/>
+          <p:cNvSpPr>
+            <a:spLocks noGrp="1"/>
+          </p:cNvSpPr>
+          <p:nvPr>
+            <p:ph type="body" idx="1"/>
+          </p:nvPr>
+        </p:nvSpPr>
+        <p:spPr/>
+        <p:txBody>
+          <a:bodyPr/>
+          <a:lstStyle/>
+          <a:p>
+            <a:endParaRPr lang="en-US" dirty="0"/>
+          </a:p>
+        </p:txBody>
+      </p:sp>
+      <p:sp>
+        <p:nvSpPr>
+          <p:cNvPr id="4" name="Slide Number Placeholder 3"/>
+          <p:cNvSpPr>
+            <a:spLocks noGrp="1"/>
+          </p:cNvSpPr>
+          <p:nvPr>
+            <p:ph type="sldNum" sz="quarter" idx="5"/>
+          </p:nvPr>
+        </p:nvSpPr>
+        <p:spPr/>
+        <p:txBody>
+          <a:bodyPr/>
+          <a:lstStyle/>
+          <a:p>
+            <a:fld id="{9C5C8B17-D1C9-48DD-A1B1-EDA1E362804A}" type="slidenum">
+              <a:rPr lang="en-US" smtClean="0"/>
+              <a:t>27</a:t>
+            </a:fld>
+            <a:endParaRPr lang="en-US"/>
+          </a:p>
+        </p:txBody>
+      </p:sp>
+    </p:spTree>
+    <p:extLst>
+      <p:ext uri="{BB962C8B-B14F-4D97-AF65-F5344CB8AC3E}">
+        <p14:creationId xmlns:p14="http://schemas.microsoft.com/office/powerpoint/2010/main" val="668042397"/>
+      </p:ext>
+    </p:extLst>
+  </p:cSld>
+  <p:clrMapOvr>
+    <a:masterClrMapping/>
+  </p:clrMapOvr>
+</p:notes>
+</file>
+
+<file path=ppt/notesSlides/notesSlide17.xml><?xml version="1.0" encoding="utf-8"?>
+<p:notes xmlns:a="http://schemas.openxmlformats.org/drawingml/2006/main" xmlns:r="http://schemas.openxmlformats.org/officeDocument/2006/relationships" xmlns:p="http://schemas.openxmlformats.org/presentationml/2006/main">
+  <p:cSld>
+    <p:spTree>
+      <p:nvGrpSpPr>
+        <p:cNvPr id="1" name=""/>
+        <p:cNvGrpSpPr/>
+        <p:nvPr/>
+      </p:nvGrpSpPr>
+      <p:grpSpPr>
+        <a:xfrm>
+          <a:off x="0" y="0"/>
+          <a:ext cx="0" cy="0"/>
+          <a:chOff x="0" y="0"/>
+          <a:chExt cx="0" cy="0"/>
+        </a:xfrm>
+      </p:grpSpPr>
+      <p:sp>
+        <p:nvSpPr>
+          <p:cNvPr id="2" name="Slide Image Placeholder 1"/>
+          <p:cNvSpPr>
+            <a:spLocks noGrp="1" noRot="1" noChangeAspect="1"/>
+          </p:cNvSpPr>
+          <p:nvPr>
+            <p:ph type="sldImg"/>
+          </p:nvPr>
+        </p:nvSpPr>
+        <p:spPr/>
+      </p:sp>
+      <p:sp>
+        <p:nvSpPr>
+          <p:cNvPr id="3" name="Notes Placeholder 2"/>
+          <p:cNvSpPr>
+            <a:spLocks noGrp="1"/>
+          </p:cNvSpPr>
+          <p:nvPr>
+            <p:ph type="body" idx="1"/>
+          </p:nvPr>
+        </p:nvSpPr>
+        <p:spPr/>
+        <p:txBody>
+          <a:bodyPr/>
+          <a:lstStyle/>
+          <a:p>
+            <a:r>
+              <a:rPr lang="en-US" dirty="0"/>
+              <a:t>If you’ve ever created a dashboard, you may want to consider </a:t>
+            </a:r>
+            <a:r>
+              <a:rPr lang="en-US" dirty="0" err="1"/>
+              <a:t>shinydashboard</a:t>
+            </a:r>
+            <a:endParaRPr lang="en-US" dirty="0"/>
+          </a:p>
+          <a:p>
+            <a:r>
+              <a:rPr lang="en-US" dirty="0"/>
+              <a:t>Reference other </a:t>
+            </a:r>
+            <a:r>
+              <a:rPr lang="en-US" dirty="0" err="1"/>
+              <a:t>Rpresenter</a:t>
+            </a:r>
+            <a:r>
+              <a:rPr lang="en-US" dirty="0"/>
+              <a:t> talks – Kristy – </a:t>
+            </a:r>
+            <a:r>
+              <a:rPr lang="en-US" dirty="0" err="1"/>
+              <a:t>flexdashboard</a:t>
+            </a:r>
+            <a:endParaRPr lang="en-US" dirty="0"/>
+          </a:p>
+        </p:txBody>
+      </p:sp>
+      <p:sp>
+        <p:nvSpPr>
+          <p:cNvPr id="4" name="Slide Number Placeholder 3"/>
+          <p:cNvSpPr>
+            <a:spLocks noGrp="1"/>
+          </p:cNvSpPr>
+          <p:nvPr>
+            <p:ph type="sldNum" sz="quarter" idx="5"/>
+          </p:nvPr>
+        </p:nvSpPr>
+        <p:spPr/>
+        <p:txBody>
+          <a:bodyPr/>
+          <a:lstStyle/>
+          <a:p>
+            <a:fld id="{9C5C8B17-D1C9-48DD-A1B1-EDA1E362804A}" type="slidenum">
+              <a:rPr lang="en-US" smtClean="0"/>
+              <a:t>28</a:t>
+            </a:fld>
+            <a:endParaRPr lang="en-US"/>
+          </a:p>
+        </p:txBody>
+      </p:sp>
+    </p:spTree>
+    <p:extLst>
+      <p:ext uri="{BB962C8B-B14F-4D97-AF65-F5344CB8AC3E}">
+        <p14:creationId xmlns:p14="http://schemas.microsoft.com/office/powerpoint/2010/main" val="3772832120"/>
+      </p:ext>
+    </p:extLst>
+  </p:cSld>
+  <p:clrMapOvr>
+    <a:masterClrMapping/>
+  </p:clrMapOvr>
+</p:notes>
+</file>
+
+<file path=ppt/notesSlides/notesSlide18.xml><?xml version="1.0" encoding="utf-8"?>
+<p:notes xmlns:a="http://schemas.openxmlformats.org/drawingml/2006/main" xmlns:r="http://schemas.openxmlformats.org/officeDocument/2006/relationships" xmlns:p="http://schemas.openxmlformats.org/presentationml/2006/main">
+  <p:cSld>
+    <p:spTree>
+      <p:nvGrpSpPr>
+        <p:cNvPr id="1" name=""/>
+        <p:cNvGrpSpPr/>
+        <p:nvPr/>
+      </p:nvGrpSpPr>
+      <p:grpSpPr>
+        <a:xfrm>
+          <a:off x="0" y="0"/>
+          <a:ext cx="0" cy="0"/>
+          <a:chOff x="0" y="0"/>
+          <a:chExt cx="0" cy="0"/>
+        </a:xfrm>
+      </p:grpSpPr>
+      <p:sp>
+        <p:nvSpPr>
+          <p:cNvPr id="2" name="Slide Image Placeholder 1"/>
+          <p:cNvSpPr>
+            <a:spLocks noGrp="1" noRot="1" noChangeAspect="1"/>
+          </p:cNvSpPr>
+          <p:nvPr>
+            <p:ph type="sldImg"/>
+          </p:nvPr>
+        </p:nvSpPr>
+        <p:spPr/>
+      </p:sp>
+      <p:sp>
+        <p:nvSpPr>
+          <p:cNvPr id="3" name="Notes Placeholder 2"/>
+          <p:cNvSpPr>
+            <a:spLocks noGrp="1"/>
+          </p:cNvSpPr>
+          <p:nvPr>
+            <p:ph type="body" idx="1"/>
+          </p:nvPr>
+        </p:nvSpPr>
+        <p:spPr/>
+        <p:txBody>
+          <a:bodyPr/>
+          <a:lstStyle/>
+          <a:p>
+            <a:r>
+              <a:rPr lang="en-US" dirty="0" err="1"/>
+              <a:t>Tiffanny</a:t>
+            </a:r>
+            <a:r>
+              <a:rPr lang="en-US" dirty="0"/>
+              <a:t> Newman gave a talk in February on Data Viz tips (</a:t>
+            </a:r>
+            <a:r>
+              <a:rPr lang="en-US" dirty="0" err="1"/>
+              <a:t>ggplot</a:t>
+            </a:r>
+            <a:r>
+              <a:rPr lang="en-US" dirty="0"/>
+              <a:t> tips and tricks): https://</a:t>
+            </a:r>
+            <a:r>
+              <a:rPr lang="en-US" dirty="0" err="1"/>
+              <a:t>github.mskcc.org</a:t>
+            </a:r>
+            <a:r>
+              <a:rPr lang="en-US" dirty="0"/>
+              <a:t>/pages/</a:t>
+            </a:r>
+            <a:r>
+              <a:rPr lang="en-US" dirty="0" err="1"/>
+              <a:t>datadojo</a:t>
+            </a:r>
+            <a:r>
+              <a:rPr lang="en-US" dirty="0"/>
+              <a:t>/</a:t>
+            </a:r>
+            <a:r>
+              <a:rPr lang="en-US" dirty="0" err="1"/>
+              <a:t>Rpresenters</a:t>
+            </a:r>
+            <a:r>
+              <a:rPr lang="en-US" dirty="0"/>
+              <a:t>/</a:t>
+            </a:r>
+          </a:p>
+        </p:txBody>
+      </p:sp>
+      <p:sp>
+        <p:nvSpPr>
+          <p:cNvPr id="4" name="Slide Number Placeholder 3"/>
+          <p:cNvSpPr>
+            <a:spLocks noGrp="1"/>
+          </p:cNvSpPr>
+          <p:nvPr>
+            <p:ph type="sldNum" sz="quarter" idx="5"/>
+          </p:nvPr>
+        </p:nvSpPr>
+        <p:spPr/>
+        <p:txBody>
+          <a:bodyPr/>
+          <a:lstStyle/>
+          <a:p>
+            <a:fld id="{9C5C8B17-D1C9-48DD-A1B1-EDA1E362804A}" type="slidenum">
+              <a:rPr lang="en-US" smtClean="0"/>
+              <a:t>29</a:t>
+            </a:fld>
+            <a:endParaRPr lang="en-US"/>
+          </a:p>
+        </p:txBody>
+      </p:sp>
+    </p:spTree>
+    <p:extLst>
+      <p:ext uri="{BB962C8B-B14F-4D97-AF65-F5344CB8AC3E}">
+        <p14:creationId xmlns:p14="http://schemas.microsoft.com/office/powerpoint/2010/main" val="1523525126"/>
+      </p:ext>
+    </p:extLst>
+  </p:cSld>
+  <p:clrMapOvr>
+    <a:masterClrMapping/>
+  </p:clrMapOvr>
+</p:notes>
+</file>
+
+<file path=ppt/notesSlides/notesSlide19.xml><?xml version="1.0" encoding="utf-8"?>
+<p:notes xmlns:a="http://schemas.openxmlformats.org/drawingml/2006/main" xmlns:r="http://schemas.openxmlformats.org/officeDocument/2006/relationships" xmlns:p="http://schemas.openxmlformats.org/presentationml/2006/main">
+  <p:cSld>
+    <p:spTree>
+      <p:nvGrpSpPr>
+        <p:cNvPr id="1" name=""/>
+        <p:cNvGrpSpPr/>
+        <p:nvPr/>
+      </p:nvGrpSpPr>
+      <p:grpSpPr>
+        <a:xfrm>
+          <a:off x="0" y="0"/>
+          <a:ext cx="0" cy="0"/>
+          <a:chOff x="0" y="0"/>
+          <a:chExt cx="0" cy="0"/>
+        </a:xfrm>
+      </p:grpSpPr>
+      <p:sp>
+        <p:nvSpPr>
+          <p:cNvPr id="2" name="Slide Image Placeholder 1"/>
+          <p:cNvSpPr>
+            <a:spLocks noGrp="1" noRot="1" noChangeAspect="1"/>
+          </p:cNvSpPr>
+          <p:nvPr>
+            <p:ph type="sldImg"/>
+          </p:nvPr>
+        </p:nvSpPr>
+        <p:spPr/>
+      </p:sp>
+      <p:sp>
+        <p:nvSpPr>
+          <p:cNvPr id="3" name="Notes Placeholder 2"/>
+          <p:cNvSpPr>
+            <a:spLocks noGrp="1"/>
+          </p:cNvSpPr>
+          <p:nvPr>
+            <p:ph type="body" idx="1"/>
+          </p:nvPr>
+        </p:nvSpPr>
+        <p:spPr/>
+        <p:txBody>
+          <a:bodyPr/>
+          <a:lstStyle/>
+          <a:p>
+            <a:r>
+              <a:rPr lang="en-US" dirty="0">
+                <a:hlinkClick r:id="rId3"/>
+              </a:rPr>
+              <a:t>https://github.com/GuangchuangYu/hexSticker</a:t>
+            </a:r>
+            <a:endParaRPr lang="en-US" dirty="0"/>
+          </a:p>
+        </p:txBody>
+      </p:sp>
+      <p:sp>
+        <p:nvSpPr>
+          <p:cNvPr id="4" name="Slide Number Placeholder 3"/>
+          <p:cNvSpPr>
+            <a:spLocks noGrp="1"/>
+          </p:cNvSpPr>
+          <p:nvPr>
+            <p:ph type="sldNum" sz="quarter" idx="5"/>
+          </p:nvPr>
+        </p:nvSpPr>
+        <p:spPr/>
+        <p:txBody>
+          <a:bodyPr/>
+          <a:lstStyle/>
+          <a:p>
+            <a:fld id="{9C5C8B17-D1C9-48DD-A1B1-EDA1E362804A}" type="slidenum">
+              <a:rPr lang="en-US" smtClean="0"/>
+              <a:t>32</a:t>
+            </a:fld>
+            <a:endParaRPr lang="en-US"/>
+          </a:p>
+        </p:txBody>
+      </p:sp>
+    </p:spTree>
+    <p:extLst>
+      <p:ext uri="{BB962C8B-B14F-4D97-AF65-F5344CB8AC3E}">
+        <p14:creationId xmlns:p14="http://schemas.microsoft.com/office/powerpoint/2010/main" val="298136880"/>
       </p:ext>
     </p:extLst>
   </p:cSld>
@@ -952,13 +1853,26 @@
           <a:bodyPr/>
           <a:lstStyle/>
           <a:p>
-            <a:r>
-              <a:rPr lang="en-US" sz="2800" dirty="0"/>
-              <a:t>Recall is often inaccurate: </a:t>
-            </a:r>
-            <a:r>
-              <a:rPr lang="en-US" sz="2400" dirty="0"/>
-              <a:t>Feels like we spend a lot of time on projects we don’t love and not enough time on projects we do</a:t>
+            <a:pPr marL="0" marR="0" lvl="0" indent="0" algn="l" defTabSz="914400" rtl="0" eaLnBrk="1" fontAlgn="auto" latinLnBrk="0" hangingPunct="1">
+              <a:lnSpc>
+                <a:spcPct val="100000"/>
+              </a:lnSpc>
+              <a:spcBef>
+                <a:spcPts val="0"/>
+              </a:spcBef>
+              <a:spcAft>
+                <a:spcPts val="0"/>
+              </a:spcAft>
+              <a:buClrTx/>
+              <a:buSzTx/>
+              <a:buFontTx/>
+              <a:buNone/>
+              <a:tabLst/>
+              <a:defRPr/>
+            </a:pPr>
+            <a:r>
+              <a:rPr lang="en-US" dirty="0"/>
+              <a:t>Note: save questions for end</a:t>
             </a:r>
           </a:p>
           <a:p>
@@ -983,7 +1897,7 @@
           <a:p>
             <a:fld id="{9C5C8B17-D1C9-48DD-A1B1-EDA1E362804A}" type="slidenum">
               <a:rPr lang="en-US" smtClean="0"/>
-              <a:t>6</a:t>
+              <a:t>3</a:t>
             </a:fld>
             <a:endParaRPr lang="en-US"/>
           </a:p>
@@ -992,7 +1906,94 @@
     </p:spTree>
     <p:extLst>
       <p:ext uri="{BB962C8B-B14F-4D97-AF65-F5344CB8AC3E}">
-        <p14:creationId xmlns:p14="http://schemas.microsoft.com/office/powerpoint/2010/main" val="44535701"/>
+        <p14:creationId xmlns:p14="http://schemas.microsoft.com/office/powerpoint/2010/main" val="3838744726"/>
+      </p:ext>
+    </p:extLst>
+  </p:cSld>
+  <p:clrMapOvr>
+    <a:masterClrMapping/>
+  </p:clrMapOvr>
+</p:notes>
+</file>
+
+<file path=ppt/notesSlides/notesSlide20.xml><?xml version="1.0" encoding="utf-8"?>
+<p:notes xmlns:a="http://schemas.openxmlformats.org/drawingml/2006/main" xmlns:r="http://schemas.openxmlformats.org/officeDocument/2006/relationships" xmlns:p="http://schemas.openxmlformats.org/presentationml/2006/main">
+  <p:cSld>
+    <p:spTree>
+      <p:nvGrpSpPr>
+        <p:cNvPr id="1" name=""/>
+        <p:cNvGrpSpPr/>
+        <p:nvPr/>
+      </p:nvGrpSpPr>
+      <p:grpSpPr>
+        <a:xfrm>
+          <a:off x="0" y="0"/>
+          <a:ext cx="0" cy="0"/>
+          <a:chOff x="0" y="0"/>
+          <a:chExt cx="0" cy="0"/>
+        </a:xfrm>
+      </p:grpSpPr>
+      <p:sp>
+        <p:nvSpPr>
+          <p:cNvPr id="2" name="Slide Image Placeholder 1"/>
+          <p:cNvSpPr>
+            <a:spLocks noGrp="1" noRot="1" noChangeAspect="1"/>
+          </p:cNvSpPr>
+          <p:nvPr>
+            <p:ph type="sldImg"/>
+          </p:nvPr>
+        </p:nvSpPr>
+        <p:spPr/>
+      </p:sp>
+      <p:sp>
+        <p:nvSpPr>
+          <p:cNvPr id="3" name="Notes Placeholder 2"/>
+          <p:cNvSpPr>
+            <a:spLocks noGrp="1"/>
+          </p:cNvSpPr>
+          <p:nvPr>
+            <p:ph type="body" idx="1"/>
+          </p:nvPr>
+        </p:nvSpPr>
+        <p:spPr/>
+        <p:txBody>
+          <a:bodyPr/>
+          <a:lstStyle/>
+          <a:p>
+            <a:r>
+              <a:rPr lang="en-US" dirty="0"/>
+              <a:t>For discussion: Do others do this? If so, how? In conjunction with management or separately? </a:t>
+            </a:r>
+          </a:p>
+        </p:txBody>
+      </p:sp>
+      <p:sp>
+        <p:nvSpPr>
+          <p:cNvPr id="4" name="Slide Number Placeholder 3"/>
+          <p:cNvSpPr>
+            <a:spLocks noGrp="1"/>
+          </p:cNvSpPr>
+          <p:nvPr>
+            <p:ph type="sldNum" sz="quarter" idx="5"/>
+          </p:nvPr>
+        </p:nvSpPr>
+        <p:spPr/>
+        <p:txBody>
+          <a:bodyPr/>
+          <a:lstStyle/>
+          <a:p>
+            <a:fld id="{9C5C8B17-D1C9-48DD-A1B1-EDA1E362804A}" type="slidenum">
+              <a:rPr lang="en-US" smtClean="0"/>
+              <a:t>36</a:t>
+            </a:fld>
+            <a:endParaRPr lang="en-US"/>
+          </a:p>
+        </p:txBody>
+      </p:sp>
+    </p:spTree>
+    <p:extLst>
+      <p:ext uri="{BB962C8B-B14F-4D97-AF65-F5344CB8AC3E}">
+        <p14:creationId xmlns:p14="http://schemas.microsoft.com/office/powerpoint/2010/main" val="3374403230"/>
       </p:ext>
     </p:extLst>
   </p:cSld>
@@ -1046,26 +2047,33 @@
           <a:bodyPr/>
           <a:lstStyle/>
           <a:p>
-            <a:pPr marL="0" marR="0" lvl="0" indent="0" algn="l" defTabSz="914400" rtl="0" eaLnBrk="1" fontAlgn="auto" latinLnBrk="0" hangingPunct="1">
-              <a:lnSpc>
-                <a:spcPct val="100000"/>
-              </a:lnSpc>
-              <a:spcBef>
-                <a:spcPts val="0"/>
-              </a:spcBef>
-              <a:spcAft>
-                <a:spcPts val="0"/>
-              </a:spcAft>
-              <a:buClrTx/>
-              <a:buSzTx/>
-              <a:buFontTx/>
-              <a:buNone/>
-              <a:tabLst/>
-              <a:defRPr/>
-            </a:pPr>
-            <a:r>
-              <a:rPr lang="en-US" dirty="0"/>
-              <a:t>"time audit” with a goal of answering the question of “Where is my time going and can it be efficiently directed?”</a:t>
+            <a:pPr lvl="0"/>
+            <a:r>
+              <a:rPr lang="en-US" sz="1200" kern="1200" dirty="0">
+                <a:solidFill>
+                  <a:schemeClr val="tx1"/>
+                </a:solidFill>
+                <a:effectLst/>
+                <a:latin typeface="+mn-lt"/>
+                <a:ea typeface="+mn-ea"/>
+                <a:cs typeface="+mn-cs"/>
+              </a:rPr>
+              <a:t>In the long term, you have no recollection of how you’re spending your day</a:t>
+            </a:r>
+          </a:p>
+          <a:p>
+            <a:pPr lvl="0"/>
+            <a:r>
+              <a:rPr lang="en-US" sz="1200" kern="1200" dirty="0">
+                <a:solidFill>
+                  <a:schemeClr val="tx1"/>
+                </a:solidFill>
+                <a:effectLst/>
+                <a:latin typeface="+mn-lt"/>
+                <a:ea typeface="+mn-ea"/>
+                <a:cs typeface="+mn-cs"/>
+              </a:rPr>
+              <a:t>Things are getting done and moving forward, but if you had to describe what you did last Tuesday, you probably couldn’t do it</a:t>
             </a:r>
           </a:p>
           <a:p>
@@ -1090,7 +2098,7 @@
           <a:p>
             <a:fld id="{9C5C8B17-D1C9-48DD-A1B1-EDA1E362804A}" type="slidenum">
               <a:rPr lang="en-US" smtClean="0"/>
-              <a:t>7</a:t>
+              <a:t>5</a:t>
             </a:fld>
             <a:endParaRPr lang="en-US"/>
           </a:p>
@@ -1099,7 +2107,7 @@
     </p:spTree>
     <p:extLst>
       <p:ext uri="{BB962C8B-B14F-4D97-AF65-F5344CB8AC3E}">
-        <p14:creationId xmlns:p14="http://schemas.microsoft.com/office/powerpoint/2010/main" val="4050095504"/>
+        <p14:creationId xmlns:p14="http://schemas.microsoft.com/office/powerpoint/2010/main" val="2750340782"/>
       </p:ext>
     </p:extLst>
   </p:cSld>
@@ -1153,6 +2161,51 @@
           <a:bodyPr/>
           <a:lstStyle/>
           <a:p>
+            <a:pPr marL="0" indent="0">
+              <a:buFont typeface="Arial" panose="020B0604020202020204" pitchFamily="34" charset="0"/>
+              <a:buNone/>
+            </a:pPr>
+            <a:r>
+              <a:rPr lang="en-US" sz="2800" dirty="0"/>
+              <a:t>Recall is often inaccurate: </a:t>
+            </a:r>
+            <a:r>
+              <a:rPr lang="en-US" sz="2400" dirty="0"/>
+              <a:t>Feels like we spend a lot of time on projects we don’t love and not enough time on projects we do</a:t>
+            </a:r>
+          </a:p>
+          <a:p>
+            <a:pPr marL="0" marR="0" lvl="0" indent="0" algn="l" defTabSz="914400" rtl="0" eaLnBrk="1" fontAlgn="auto" latinLnBrk="0" hangingPunct="1">
+              <a:lnSpc>
+                <a:spcPct val="100000"/>
+              </a:lnSpc>
+              <a:spcBef>
+                <a:spcPts val="0"/>
+              </a:spcBef>
+              <a:spcAft>
+                <a:spcPts val="0"/>
+              </a:spcAft>
+              <a:buClrTx/>
+              <a:buSzTx/>
+              <a:buFont typeface="Arial" panose="020B0604020202020204" pitchFamily="34" charset="0"/>
+              <a:buNone/>
+              <a:tabLst/>
+              <a:defRPr/>
+            </a:pPr>
+            <a:r>
+              <a:rPr lang="en-US" sz="1200" kern="1200" dirty="0">
+                <a:solidFill>
+                  <a:schemeClr val="tx1"/>
+                </a:solidFill>
+                <a:effectLst/>
+                <a:latin typeface="+mn-lt"/>
+                <a:ea typeface="+mn-ea"/>
+                <a:cs typeface="+mn-cs"/>
+              </a:rPr>
+              <a:t>As a resource to the institution, we’re balancing many “clients.” As a resource it’s important to manage expectations and to work efficiently. </a:t>
+            </a:r>
+          </a:p>
+          <a:p>
             <a:endParaRPr lang="en-US" dirty="0"/>
           </a:p>
         </p:txBody>
@@ -1174,7 +2227,7 @@
           <a:p>
             <a:fld id="{9C5C8B17-D1C9-48DD-A1B1-EDA1E362804A}" type="slidenum">
               <a:rPr lang="en-US" smtClean="0"/>
-              <a:t>13</a:t>
+              <a:t>6</a:t>
             </a:fld>
             <a:endParaRPr lang="en-US"/>
           </a:p>
@@ -1183,7 +2236,7 @@
     </p:spTree>
     <p:extLst>
       <p:ext uri="{BB962C8B-B14F-4D97-AF65-F5344CB8AC3E}">
-        <p14:creationId xmlns:p14="http://schemas.microsoft.com/office/powerpoint/2010/main" val="2307111784"/>
+        <p14:creationId xmlns:p14="http://schemas.microsoft.com/office/powerpoint/2010/main" val="44535701"/>
       </p:ext>
     </p:extLst>
   </p:cSld>
@@ -1254,6 +2307,12 @@
               <a:tabLst/>
               <a:defRPr/>
             </a:pPr>
+            <a:r>
+              <a:rPr lang="en-US" dirty="0"/>
+              <a:t>"time audit” with a goal of answering the question of “Where is my time going and can it be efficiently directed?”</a:t>
+            </a:r>
+          </a:p>
+          <a:p>
             <a:endParaRPr lang="en-US" dirty="0"/>
           </a:p>
         </p:txBody>
@@ -1275,7 +2334,7 @@
           <a:p>
             <a:fld id="{9C5C8B17-D1C9-48DD-A1B1-EDA1E362804A}" type="slidenum">
               <a:rPr lang="en-US" smtClean="0"/>
-              <a:t>14</a:t>
+              <a:t>7</a:t>
             </a:fld>
             <a:endParaRPr lang="en-US"/>
           </a:p>
@@ -1284,7 +2343,7 @@
     </p:spTree>
     <p:extLst>
       <p:ext uri="{BB962C8B-B14F-4D97-AF65-F5344CB8AC3E}">
-        <p14:creationId xmlns:p14="http://schemas.microsoft.com/office/powerpoint/2010/main" val="746084871"/>
+        <p14:creationId xmlns:p14="http://schemas.microsoft.com/office/powerpoint/2010/main" val="4050095504"/>
       </p:ext>
     </p:extLst>
   </p:cSld>
@@ -1338,26 +2397,9 @@
           <a:bodyPr/>
           <a:lstStyle/>
           <a:p>
-            <a:pPr marL="0" marR="0" lvl="0" indent="0" algn="l" defTabSz="914400" rtl="0" eaLnBrk="1" fontAlgn="auto" latinLnBrk="0" hangingPunct="1">
-              <a:lnSpc>
-                <a:spcPct val="100000"/>
-              </a:lnSpc>
-              <a:spcBef>
-                <a:spcPts val="0"/>
-              </a:spcBef>
-              <a:spcAft>
-                <a:spcPts val="0"/>
-              </a:spcAft>
-              <a:buClrTx/>
-              <a:buSzTx/>
-              <a:buFontTx/>
-              <a:buNone/>
-              <a:tabLst/>
-              <a:defRPr/>
-            </a:pPr>
             <a:r>
               <a:rPr lang="en-US" dirty="0"/>
-              <a:t>Brief note that a lot of what I’m going to talk about has to do with the structure of my job, which is primarily project based across multiple investigators. While that specific scenario won’t hold for everyone here, the general concepts are applicable. </a:t>
+              <a:t>Toggl demo</a:t>
             </a:r>
           </a:p>
         </p:txBody>
@@ -1379,7 +2421,7 @@
           <a:p>
             <a:fld id="{9C5C8B17-D1C9-48DD-A1B1-EDA1E362804A}" type="slidenum">
               <a:rPr lang="en-US" smtClean="0"/>
-              <a:t>15</a:t>
+              <a:t>8</a:t>
             </a:fld>
             <a:endParaRPr lang="en-US"/>
           </a:p>
@@ -1388,7 +2430,7 @@
     </p:spTree>
     <p:extLst>
       <p:ext uri="{BB962C8B-B14F-4D97-AF65-F5344CB8AC3E}">
-        <p14:creationId xmlns:p14="http://schemas.microsoft.com/office/powerpoint/2010/main" val="636758641"/>
+        <p14:creationId xmlns:p14="http://schemas.microsoft.com/office/powerpoint/2010/main" val="535123073"/>
       </p:ext>
     </p:extLst>
   </p:cSld>
@@ -1442,32 +2484,6 @@
           <a:bodyPr/>
           <a:lstStyle/>
           <a:p>
-            <a:pPr marL="0" marR="0" lvl="0" indent="0" algn="l" defTabSz="914400" rtl="0" eaLnBrk="1" fontAlgn="auto" latinLnBrk="0" hangingPunct="1">
-              <a:lnSpc>
-                <a:spcPct val="100000"/>
-              </a:lnSpc>
-              <a:spcBef>
-                <a:spcPts val="0"/>
-              </a:spcBef>
-              <a:spcAft>
-                <a:spcPts val="0"/>
-              </a:spcAft>
-              <a:buClrTx/>
-              <a:buSzTx/>
-              <a:buFontTx/>
-              <a:buNone/>
-              <a:tabLst/>
-              <a:defRPr/>
-            </a:pPr>
-            <a:r>
-              <a:rPr lang="en-US" sz="1200" dirty="0">
-                <a:hlinkClick r:id="rId3"/>
-              </a:rPr>
-              <a:t>timetrackr.shinyapps.io/timetrackr</a:t>
-            </a:r>
-            <a:endParaRPr lang="en-US" sz="1200" dirty="0"/>
-          </a:p>
-          <a:p>
             <a:endParaRPr lang="en-US" dirty="0"/>
           </a:p>
         </p:txBody>
@@ -1489,7 +2505,7 @@
           <a:p>
             <a:fld id="{9C5C8B17-D1C9-48DD-A1B1-EDA1E362804A}" type="slidenum">
               <a:rPr lang="en-US" smtClean="0"/>
-              <a:t>19</a:t>
+              <a:t>9</a:t>
             </a:fld>
             <a:endParaRPr lang="en-US"/>
           </a:p>
@@ -1498,7 +2514,7 @@
     </p:spTree>
     <p:extLst>
       <p:ext uri="{BB962C8B-B14F-4D97-AF65-F5344CB8AC3E}">
-        <p14:creationId xmlns:p14="http://schemas.microsoft.com/office/powerpoint/2010/main" val="3460010275"/>
+        <p14:creationId xmlns:p14="http://schemas.microsoft.com/office/powerpoint/2010/main" val="1824722203"/>
       </p:ext>
     </p:extLst>
   </p:cSld>
@@ -1573,7 +2589,7 @@
           <a:p>
             <a:fld id="{9C5C8B17-D1C9-48DD-A1B1-EDA1E362804A}" type="slidenum">
               <a:rPr lang="en-US" smtClean="0"/>
-              <a:t>25</a:t>
+              <a:t>13</a:t>
             </a:fld>
             <a:endParaRPr lang="en-US"/>
           </a:p>
@@ -1582,7 +2598,7 @@
     </p:spTree>
     <p:extLst>
       <p:ext uri="{BB962C8B-B14F-4D97-AF65-F5344CB8AC3E}">
-        <p14:creationId xmlns:p14="http://schemas.microsoft.com/office/powerpoint/2010/main" val="3552024904"/>
+        <p14:creationId xmlns:p14="http://schemas.microsoft.com/office/powerpoint/2010/main" val="2307111784"/>
       </p:ext>
     </p:extLst>
   </p:cSld>
@@ -1636,12 +2652,23 @@
           <a:bodyPr/>
           <a:lstStyle/>
           <a:p>
-            <a:r>
-              <a:rPr lang="en-US" dirty="0">
-                <a:hlinkClick r:id="rId3"/>
-              </a:rPr>
-              <a:t>https://github.com/GuangchuangYu/hexSticker</a:t>
-            </a:r>
+            <a:pPr marL="0" marR="0" lvl="0" indent="0" algn="l" defTabSz="914400" rtl="0" eaLnBrk="1" fontAlgn="auto" latinLnBrk="0" hangingPunct="1">
+              <a:lnSpc>
+                <a:spcPct val="100000"/>
+              </a:lnSpc>
+              <a:spcBef>
+                <a:spcPts val="0"/>
+              </a:spcBef>
+              <a:spcAft>
+                <a:spcPts val="0"/>
+              </a:spcAft>
+              <a:buClrTx/>
+              <a:buSzTx/>
+              <a:buFontTx/>
+              <a:buNone/>
+              <a:tabLst/>
+              <a:defRPr/>
+            </a:pPr>
             <a:endParaRPr lang="en-US" dirty="0"/>
           </a:p>
         </p:txBody>
@@ -1663,7 +2690,7 @@
           <a:p>
             <a:fld id="{9C5C8B17-D1C9-48DD-A1B1-EDA1E362804A}" type="slidenum">
               <a:rPr lang="en-US" smtClean="0"/>
-              <a:t>34</a:t>
+              <a:t>14</a:t>
             </a:fld>
             <a:endParaRPr lang="en-US"/>
           </a:p>
@@ -1672,7 +2699,7 @@
     </p:spTree>
     <p:extLst>
       <p:ext uri="{BB962C8B-B14F-4D97-AF65-F5344CB8AC3E}">
-        <p14:creationId xmlns:p14="http://schemas.microsoft.com/office/powerpoint/2010/main" val="298136880"/>
+        <p14:creationId xmlns:p14="http://schemas.microsoft.com/office/powerpoint/2010/main" val="746084871"/>
       </p:ext>
     </p:extLst>
   </p:cSld>
@@ -4975,7 +6002,7 @@
           <p:nvPr/>
         </p:nvPicPr>
         <p:blipFill>
-          <a:blip r:embed="rId2">
+          <a:blip r:embed="rId3">
             <a:extLst>
               <a:ext uri="{28A0092B-C50C-407E-A947-70E740481C1C}">
                 <a14:useLocalDpi xmlns:a14="http://schemas.microsoft.com/office/drawing/2010/main" val="0"/>
@@ -5022,7 +6049,7 @@
           <p:nvPr/>
         </p:nvPicPr>
         <p:blipFill>
-          <a:blip r:embed="rId3">
+          <a:blip r:embed="rId4">
             <a:extLst>
               <a:ext uri="{28A0092B-C50C-407E-A947-70E740481C1C}">
                 <a14:useLocalDpi xmlns:a14="http://schemas.microsoft.com/office/drawing/2010/main" val="0"/>
@@ -5069,7 +6096,7 @@
           <p:nvPr/>
         </p:nvPicPr>
         <p:blipFill>
-          <a:blip r:embed="rId4">
+          <a:blip r:embed="rId5">
             <a:extLst>
               <a:ext uri="{28A0092B-C50C-407E-A947-70E740481C1C}">
                 <a14:useLocalDpi xmlns:a14="http://schemas.microsoft.com/office/drawing/2010/main" val="0"/>
@@ -5116,7 +6143,7 @@
           <p:nvPr/>
         </p:nvPicPr>
         <p:blipFill>
-          <a:blip r:embed="rId5"/>
+          <a:blip r:embed="rId6"/>
           <a:stretch>
             <a:fillRect/>
           </a:stretch>
@@ -5721,11 +6748,7 @@
           <a:lstStyle/>
           <a:p>
             <a:r>
-              <a:rPr lang="en-US" dirty="0">
-                <a:solidFill>
-                  <a:schemeClr val="accent3"/>
-                </a:solidFill>
-              </a:rPr>
+              <a:rPr lang="en-US" dirty="0"/>
               <a:t>What is timetrackR?</a:t>
             </a:r>
           </a:p>
@@ -5749,20 +6772,23 @@
         </p:nvSpPr>
         <p:spPr>
           <a:xfrm>
-            <a:off x="1206500" y="1223895"/>
-            <a:ext cx="7679871" cy="4525963"/>
+            <a:off x="765630" y="1223895"/>
+            <a:ext cx="8120742" cy="4525963"/>
           </a:xfrm>
         </p:spPr>
         <p:txBody>
           <a:bodyPr/>
           <a:lstStyle/>
           <a:p>
+            <a:pPr marL="0" indent="0">
+              <a:buNone/>
+            </a:pPr>
             <a:r>
               <a:rPr lang="en-US" dirty="0"/>
               <a:t>A </a:t>
             </a:r>
             <a:r>
-              <a:rPr lang="en-US" dirty="0" err="1"/>
+              <a:rPr lang="en-US" i="1" dirty="0" err="1"/>
               <a:t>shinydashboard</a:t>
             </a:r>
             <a:r>
@@ -5812,10 +6838,10 @@
       </p:sp>
       <p:pic>
         <p:nvPicPr>
-          <p:cNvPr id="6" name="Picture 5">
+          <p:cNvPr id="7" name="Picture 6">
             <a:extLst>
               <a:ext uri="{FF2B5EF4-FFF2-40B4-BE49-F238E27FC236}">
-                <a16:creationId xmlns:a16="http://schemas.microsoft.com/office/drawing/2014/main" id="{9D7D8C4F-CF23-0A41-8A0C-9A604971437B}"/>
+                <a16:creationId xmlns:a16="http://schemas.microsoft.com/office/drawing/2014/main" id="{4FBB038E-1596-8845-8F10-FD4890C30DBD}"/>
               </a:ext>
             </a:extLst>
           </p:cNvPr>
@@ -5832,8 +6858,8 @@
         </p:blipFill>
         <p:spPr>
           <a:xfrm>
-            <a:off x="0" y="2319512"/>
-            <a:ext cx="9144000" cy="4538488"/>
+            <a:off x="1537523" y="3446630"/>
+            <a:ext cx="6136081" cy="3287949"/>
           </a:xfrm>
           <a:prstGeom prst="rect">
             <a:avLst/>
@@ -6002,14 +7028,7 @@
             <a:pPr lvl="1"/>
             <a:r>
               <a:rPr lang="en-US" sz="2000" dirty="0"/>
-              <a:t>Improving efficiency: “Where is my time going and can it be efficiently </a:t>
-            </a:r>
-            <a:br>
-              <a:rPr lang="en-US" sz="2000" dirty="0"/>
-            </a:br>
-            <a:r>
-              <a:rPr lang="en-US" sz="2000" dirty="0"/>
-              <a:t>(re-) directed?”</a:t>
+              <a:t>Improving efficiency: “Where is my time going and can it be efficiently (re-) directed?”</a:t>
             </a:r>
           </a:p>
           <a:p>
@@ -6107,12 +7126,12 @@
           <a:lstStyle/>
           <a:p>
             <a:r>
-              <a:rPr lang="en-US" i="1" dirty="0" err="1"/>
+              <a:rPr lang="en-US" i="1" dirty="0"/>
               <a:t>timetrackR</a:t>
             </a:r>
             <a:r>
               <a:rPr lang="en-US" dirty="0"/>
-              <a:t> Metrics &amp; Visualizations</a:t>
+              <a:t> Features</a:t>
             </a:r>
           </a:p>
         </p:txBody>
@@ -6152,7 +7171,7 @@
             </a:r>
             <a:r>
               <a:rPr lang="en-US" sz="2800" dirty="0"/>
-              <a:t>: Time spent per project/investigator/project phase</a:t>
+              <a:t>: Time spent per project/client/project phase</a:t>
             </a:r>
           </a:p>
           <a:p>
@@ -6177,7 +7196,7 @@
             </a:r>
             <a:r>
               <a:rPr lang="en-US" sz="2800" dirty="0"/>
-              <a:t>: Cumulative number of hours spent on a project</a:t>
+              <a:t>: Cumulative number of hours spent on a project or working with a client</a:t>
             </a:r>
           </a:p>
           <a:p>
@@ -6334,7 +7353,7 @@
           <a:lstStyle/>
           <a:p>
             <a:r>
-              <a:rPr lang="en-US" sz="2000" dirty="0">
+              <a:rPr lang="en-US" sz="2400" dirty="0">
                 <a:solidFill>
                   <a:schemeClr val="accent2"/>
                 </a:solidFill>
@@ -6345,13 +7364,13 @@
           <a:p>
             <a:pPr lvl="1"/>
             <a:r>
-              <a:rPr lang="en-US" sz="1600" dirty="0"/>
-              <a:t>Did an investigator ask for “quick help” on a project that is now taking up 30 hours a week?</a:t>
-            </a:r>
-          </a:p>
-          <a:p>
-            <a:r>
-              <a:rPr lang="en-US" sz="2000" dirty="0">
+              <a:rPr lang="en-US" sz="1800" dirty="0"/>
+              <a:t>Did an investigator ask for “quick help” on a project that is now taking up 20% of my time?</a:t>
+            </a:r>
+          </a:p>
+          <a:p>
+            <a:r>
+              <a:rPr lang="en-US" sz="2400" dirty="0">
                 <a:solidFill>
                   <a:schemeClr val="accent2"/>
                 </a:solidFill>
@@ -6362,20 +7381,20 @@
           <a:p>
             <a:pPr lvl="1"/>
             <a:r>
-              <a:rPr lang="en-US" sz="1600" dirty="0"/>
+              <a:rPr lang="en-US" sz="1800" dirty="0"/>
               <a:t>As a statistician, what percentage of time is spent in meetings vs doing analyses? Does this need to be rebalanced?</a:t>
             </a:r>
           </a:p>
           <a:p>
             <a:pPr lvl="1"/>
             <a:r>
-              <a:rPr lang="en-US" sz="1600" dirty="0"/>
+              <a:rPr lang="en-US" sz="1800" dirty="0"/>
               <a:t>Are the right projects/tasks being prioritized?</a:t>
             </a:r>
           </a:p>
           <a:p>
             <a:r>
-              <a:rPr lang="en-US" sz="2000" dirty="0">
+              <a:rPr lang="en-US" sz="2400" dirty="0">
                 <a:solidFill>
                   <a:schemeClr val="accent2"/>
                 </a:solidFill>
@@ -6386,17 +7405,17 @@
           <a:p>
             <a:pPr lvl="1"/>
             <a:r>
-              <a:rPr lang="en-US" sz="1600" dirty="0"/>
+              <a:rPr lang="en-US" sz="1800" dirty="0"/>
               <a:t>What percentage of my time am I spending on professional development? Is this more or less than I want it to be?</a:t>
             </a:r>
           </a:p>
           <a:p>
             <a:pPr lvl="1"/>
             <a:r>
-              <a:rPr lang="en-US" sz="1600" dirty="0"/>
+              <a:rPr lang="en-US" sz="1800" dirty="0"/>
               <a:t>What percentage of my time am I spending on departmental activities (seminars, interviews, etc.) or other non-project work? Am I appropriately accounting for that when estimating how long it will take me to complete a project?</a:t>
             </a:r>
-            <a:endParaRPr lang="en-US" sz="2400" dirty="0"/>
+            <a:endParaRPr lang="en-US" dirty="0"/>
           </a:p>
         </p:txBody>
       </p:sp>
@@ -6518,7 +7537,7 @@
           <a:lstStyle/>
           <a:p>
             <a:r>
-              <a:rPr lang="en-US" sz="2000" dirty="0">
+              <a:rPr lang="en-US" sz="2400" dirty="0">
                 <a:solidFill>
                   <a:schemeClr val="accent2"/>
                 </a:solidFill>
@@ -6529,63 +7548,56 @@
           <a:p>
             <a:pPr lvl="1"/>
             <a:r>
-              <a:rPr lang="en-US" sz="1800" dirty="0"/>
-              <a:t>Did an abstract take as long as a full analysis for a manuscript?</a:t>
+              <a:rPr lang="en-US" sz="2000" dirty="0"/>
+              <a:t>For a time-intensive project, was the result multiple manuscripts? </a:t>
+            </a:r>
+          </a:p>
+          <a:p>
+            <a:r>
+              <a:rPr lang="en-US" sz="2400" dirty="0">
+                <a:solidFill>
+                  <a:schemeClr val="accent2"/>
+                </a:solidFill>
+              </a:rPr>
+              <a:t>Determining when to cut your losses and when to pursue a project further</a:t>
             </a:r>
           </a:p>
           <a:p>
             <a:pPr lvl="1"/>
             <a:r>
-              <a:rPr lang="en-US" sz="1800" dirty="0"/>
-              <a:t>For a time-intensive project, was the result multiple manuscripts? </a:t>
-            </a:r>
-          </a:p>
-          <a:p>
-            <a:r>
-              <a:rPr lang="en-US" sz="2000" dirty="0">
+              <a:rPr lang="en-US" sz="2000" dirty="0"/>
+              <a:t>“We’ve spent 200+ hours on this project and aren’t close to the deliverable. Is this even going to be feasible?”</a:t>
+            </a:r>
+          </a:p>
+          <a:p>
+            <a:pPr lvl="1"/>
+            <a:r>
+              <a:rPr lang="en-US" sz="2000" dirty="0"/>
+              <a:t>“We’ve spent 100 hours on work for this conference presentation, should we turn it into a manuscript?”</a:t>
+            </a:r>
+          </a:p>
+          <a:p>
+            <a:r>
+              <a:rPr lang="en-US" sz="2400" dirty="0">
                 <a:solidFill>
                   <a:schemeClr val="accent2"/>
                 </a:solidFill>
               </a:rPr>
-              <a:t>Determining when to cut your losses and when to pursue a project further</a:t>
+              <a:t>Guiding project workflow &amp; managing re-analysis</a:t>
             </a:r>
           </a:p>
           <a:p>
             <a:pPr lvl="1"/>
             <a:r>
-              <a:rPr lang="en-US" sz="1800" dirty="0"/>
-              <a:t>“We’ve spent 200+ hours on this project and aren’t close to the deliverable. Is this even going to be feasible?”</a:t>
+              <a:rPr lang="en-US" sz="2000" dirty="0"/>
+              <a:t>Useful metric for when re-analyses are requested</a:t>
             </a:r>
           </a:p>
           <a:p>
             <a:pPr lvl="1"/>
             <a:r>
-              <a:rPr lang="en-US" sz="1800" dirty="0"/>
-              <a:t>“We’ve spent 100 hours on work for this conference presentation, should we turn it into a manuscript?”</a:t>
-            </a:r>
-          </a:p>
-          <a:p>
-            <a:r>
-              <a:rPr lang="en-US" sz="2000" dirty="0">
-                <a:solidFill>
-                  <a:schemeClr val="accent2"/>
-                </a:solidFill>
-              </a:rPr>
-              <a:t>Guiding project workflow &amp; managing re-analysis</a:t>
-            </a:r>
-          </a:p>
-          <a:p>
-            <a:pPr lvl="1"/>
-            <a:r>
-              <a:rPr lang="en-US" sz="1800" dirty="0"/>
-              <a:t>Useful metric for when re-analyses are requested</a:t>
-            </a:r>
-          </a:p>
-          <a:p>
-            <a:pPr lvl="1"/>
-            <a:r>
-              <a:rPr lang="en-US" sz="1800" dirty="0"/>
-              <a:t>“We’ve spent 20 hours on the analysis, please circulate the manuscript draft before we complete additional analyses.”</a:t>
+              <a:rPr lang="en-US" sz="2000" dirty="0"/>
+              <a:t>“We’ve spent 130 hours on the analysis, please circulate the manuscript draft before we complete additional analyses.”</a:t>
             </a:r>
           </a:p>
         </p:txBody>
@@ -6708,7 +7720,7 @@
           <a:lstStyle/>
           <a:p>
             <a:r>
-              <a:rPr lang="en-US" sz="2400" dirty="0">
+              <a:rPr lang="en-US" sz="2000" dirty="0">
                 <a:solidFill>
                   <a:schemeClr val="accent2"/>
                 </a:solidFill>
@@ -6719,28 +7731,28 @@
           <a:p>
             <a:pPr lvl="1"/>
             <a:r>
-              <a:rPr lang="en-US" sz="2000" dirty="0"/>
+              <a:rPr lang="en-US" sz="1800" dirty="0"/>
               <a:t>Based on a Gantt Chart which is usually used prospectively, but good for a year in review when used retrospectively</a:t>
             </a:r>
           </a:p>
           <a:p>
             <a:pPr lvl="1"/>
             <a:r>
-              <a:rPr lang="en-US" sz="2000" dirty="0"/>
+              <a:rPr lang="en-US" sz="1800" dirty="0"/>
               <a:t>Indicates transitions between analysis and re-analysis, indicates if analyses are happening after a manuscript is drafted, etc. </a:t>
             </a:r>
           </a:p>
           <a:p>
             <a:pPr lvl="2"/>
             <a:r>
-              <a:rPr lang="en-US" sz="1800" dirty="0"/>
+              <a:rPr lang="en-US" sz="1600" dirty="0"/>
               <a:t>Want to see: Project planning -&gt; Analysis -&gt; Manuscript -&gt; Revisions</a:t>
             </a:r>
           </a:p>
           <a:p>
             <a:pPr lvl="2"/>
             <a:r>
-              <a:rPr lang="en-US" sz="1800" dirty="0"/>
+              <a:rPr lang="en-US" sz="1600" dirty="0"/>
               <a:t>Do not want to see: Analysis -&gt; Manuscript -&gt; Re-analysis -&gt; Project Planning -&gt; Analysis -&gt; etc. </a:t>
             </a:r>
           </a:p>
@@ -6776,6 +7788,66 @@
           </a:p>
         </p:txBody>
       </p:sp>
+      <p:pic>
+        <p:nvPicPr>
+          <p:cNvPr id="4" name="Picture 3">
+            <a:extLst>
+              <a:ext uri="{FF2B5EF4-FFF2-40B4-BE49-F238E27FC236}">
+                <a16:creationId xmlns:a16="http://schemas.microsoft.com/office/drawing/2014/main" id="{35AB0EC0-5EE3-8344-B31D-674EC39A9C85}"/>
+              </a:ext>
+            </a:extLst>
+          </p:cNvPr>
+          <p:cNvPicPr>
+            <a:picLocks noChangeAspect="1"/>
+          </p:cNvPicPr>
+          <p:nvPr/>
+        </p:nvPicPr>
+        <p:blipFill>
+          <a:blip r:embed="rId3"/>
+          <a:stretch>
+            <a:fillRect/>
+          </a:stretch>
+        </p:blipFill>
+        <p:spPr>
+          <a:xfrm>
+            <a:off x="363538" y="3972035"/>
+            <a:ext cx="4045176" cy="2691881"/>
+          </a:xfrm>
+          <a:prstGeom prst="rect">
+            <a:avLst/>
+          </a:prstGeom>
+        </p:spPr>
+      </p:pic>
+      <p:pic>
+        <p:nvPicPr>
+          <p:cNvPr id="6" name="Picture 5">
+            <a:extLst>
+              <a:ext uri="{FF2B5EF4-FFF2-40B4-BE49-F238E27FC236}">
+                <a16:creationId xmlns:a16="http://schemas.microsoft.com/office/drawing/2014/main" id="{802EC052-B805-3046-84F7-08C95D423BCB}"/>
+              </a:ext>
+            </a:extLst>
+          </p:cNvPr>
+          <p:cNvPicPr>
+            <a:picLocks noChangeAspect="1"/>
+          </p:cNvPicPr>
+          <p:nvPr/>
+        </p:nvPicPr>
+        <p:blipFill>
+          <a:blip r:embed="rId4"/>
+          <a:stretch>
+            <a:fillRect/>
+          </a:stretch>
+        </p:blipFill>
+        <p:spPr>
+          <a:xfrm>
+            <a:off x="5031067" y="4168774"/>
+            <a:ext cx="4112933" cy="2689226"/>
+          </a:xfrm>
+          <a:prstGeom prst="rect">
+            <a:avLst/>
+          </a:prstGeom>
+        </p:spPr>
+      </p:pic>
     </p:spTree>
     <p:extLst>
       <p:ext uri="{BB962C8B-B14F-4D97-AF65-F5344CB8AC3E}">
@@ -8330,7 +9402,7 @@
           <p:nvPr/>
         </p:nvPicPr>
         <p:blipFill>
-          <a:blip r:embed="rId2"/>
+          <a:blip r:embed="rId3"/>
           <a:stretch>
             <a:fillRect/>
           </a:stretch>
@@ -8865,7 +9937,7 @@
               <a:t> Export data from Toggl into </a:t>
             </a:r>
             <a:r>
-              <a:rPr lang="en-US" dirty="0" err="1"/>
+              <a:rPr lang="en-US" i="1" dirty="0" err="1"/>
               <a:t>timetrackR</a:t>
             </a:r>
             <a:r>
@@ -8985,20 +10057,12 @@
               <a:t>     - </a:t>
             </a:r>
             <a:r>
-              <a:rPr lang="en-US" dirty="0">
+              <a:rPr lang="en-US" b="0" dirty="0" err="1">
                 <a:solidFill>
                   <a:schemeClr val="accent1"/>
                 </a:solidFill>
               </a:rPr>
-              <a:t>switch</a:t>
-            </a:r>
-            <a:r>
-              <a:rPr lang="en-US" b="0" dirty="0">
-                <a:solidFill>
-                  <a:schemeClr val="accent1"/>
-                </a:solidFill>
-              </a:rPr>
-              <a:t> function</a:t>
+              <a:t>shinydashboard</a:t>
             </a:r>
             <a:br>
               <a:rPr lang="en-US" b="0" dirty="0">
@@ -9013,10 +10077,26 @@
                   <a:schemeClr val="accent1"/>
                 </a:solidFill>
               </a:rPr>
-              <a:t>     - </a:t>
-            </a:r>
-            <a:r>
-              <a:rPr lang="en-US" dirty="0" err="1">
+              <a:t>	  - </a:t>
+            </a:r>
+            <a:r>
+              <a:rPr lang="en-US" b="0" dirty="0" err="1">
+                <a:solidFill>
+                  <a:schemeClr val="accent1"/>
+                </a:solidFill>
+              </a:rPr>
+              <a:t>ggplot</a:t>
+            </a:r>
+            <a:r>
+              <a:rPr lang="en-US" b="0" dirty="0">
+                <a:solidFill>
+                  <a:schemeClr val="accent1"/>
+                </a:solidFill>
+              </a:rPr>
+              <a:t>::</a:t>
+            </a:r>
+            <a:r>
+              <a:rPr lang="en-US" b="0" dirty="0" err="1">
                 <a:solidFill>
                   <a:schemeClr val="accent1"/>
                 </a:solidFill>
@@ -9196,7 +10276,7 @@
             </a:r>
             <a:r>
               <a:rPr lang="en-US" sz="2400" b="1" dirty="0" err="1">
-                <a:hlinkClick r:id="rId2"/>
+                <a:hlinkClick r:id="rId3"/>
               </a:rPr>
               <a:t>shinydashboard</a:t>
             </a:r>
@@ -9249,7 +10329,7 @@
           <p:nvPr/>
         </p:nvPicPr>
         <p:blipFill>
-          <a:blip r:embed="rId3"/>
+          <a:blip r:embed="rId4"/>
           <a:stretch>
             <a:fillRect/>
           </a:stretch>
@@ -9317,19 +10397,7 @@
           <a:p>
             <a:r>
               <a:rPr lang="en-US" dirty="0"/>
-              <a:t>The </a:t>
-            </a:r>
-            <a:r>
-              <a:rPr lang="en-US" dirty="0">
-                <a:solidFill>
-                  <a:schemeClr val="accent2"/>
-                </a:solidFill>
-              </a:rPr>
-              <a:t>switch</a:t>
-            </a:r>
-            <a:r>
-              <a:rPr lang="en-US" dirty="0"/>
-              <a:t> function</a:t>
+              <a:t>Project Timeline</a:t>
             </a:r>
           </a:p>
         </p:txBody>
@@ -9356,846 +10424,6 @@
           <a:lstStyle/>
           <a:p>
             <a:r>
-              <a:rPr lang="en-US" sz="2400" dirty="0"/>
-              <a:t>Used to update the figure depending on which input (statistician, date range, project status) is selected</a:t>
-            </a:r>
-          </a:p>
-          <a:p>
-            <a:r>
-              <a:rPr lang="en-US" sz="2400" dirty="0"/>
-              <a:t>To display the bar chart for active projects or for all projects:</a:t>
-            </a:r>
-          </a:p>
-          <a:p>
-            <a:pPr lvl="1"/>
-            <a:r>
-              <a:rPr lang="en-US" sz="2000" dirty="0"/>
-              <a:t>Utilize radio button so that user can select active or all projects</a:t>
-            </a:r>
-          </a:p>
-          <a:p>
-            <a:pPr lvl="1"/>
-            <a:r>
-              <a:rPr lang="en-US" sz="2000" dirty="0"/>
-              <a:t>Use the switch function to update the data frame depending on which is selected</a:t>
-            </a:r>
-          </a:p>
-          <a:p>
-            <a:endParaRPr lang="en-US" sz="2400" dirty="0"/>
-          </a:p>
-        </p:txBody>
-      </p:sp>
-      <p:sp>
-        <p:nvSpPr>
-          <p:cNvPr id="5" name="Slide Number Placeholder 4">
-            <a:extLst>
-              <a:ext uri="{FF2B5EF4-FFF2-40B4-BE49-F238E27FC236}">
-                <a16:creationId xmlns:a16="http://schemas.microsoft.com/office/drawing/2014/main" id="{AF018047-E10A-49DD-B1CA-6203BEAF485B}"/>
-              </a:ext>
-            </a:extLst>
-          </p:cNvPr>
-          <p:cNvSpPr>
-            <a:spLocks noGrp="1"/>
-          </p:cNvSpPr>
-          <p:nvPr>
-            <p:ph type="sldNum" sz="quarter" idx="4"/>
-          </p:nvPr>
-        </p:nvSpPr>
-        <p:spPr/>
-        <p:txBody>
-          <a:bodyPr/>
-          <a:lstStyle/>
-          <a:p>
-            <a:fld id="{1C3486A8-E8FB-4965-B61C-9B9FA7DC7BEE}" type="slidenum">
-              <a:rPr lang="en-US" smtClean="0"/>
-              <a:pPr/>
-              <a:t>29</a:t>
-            </a:fld>
-            <a:endParaRPr lang="en-US"/>
-          </a:p>
-        </p:txBody>
-      </p:sp>
-    </p:spTree>
-    <p:extLst>
-      <p:ext uri="{BB962C8B-B14F-4D97-AF65-F5344CB8AC3E}">
-        <p14:creationId xmlns:p14="http://schemas.microsoft.com/office/powerpoint/2010/main" val="3858287000"/>
-      </p:ext>
-    </p:extLst>
-  </p:cSld>
-  <p:clrMapOvr>
-    <a:masterClrMapping/>
-  </p:clrMapOvr>
-</p:sld>
-</file>
-
-<file path=ppt/slides/slide3.xml><?xml version="1.0" encoding="utf-8"?>
-<p:sld xmlns:a="http://schemas.openxmlformats.org/drawingml/2006/main" xmlns:r="http://schemas.openxmlformats.org/officeDocument/2006/relationships" xmlns:p="http://schemas.openxmlformats.org/presentationml/2006/main">
-  <p:cSld>
-    <p:spTree>
-      <p:nvGrpSpPr>
-        <p:cNvPr id="1" name=""/>
-        <p:cNvGrpSpPr/>
-        <p:nvPr/>
-      </p:nvGrpSpPr>
-      <p:grpSpPr>
-        <a:xfrm>
-          <a:off x="0" y="0"/>
-          <a:ext cx="0" cy="0"/>
-          <a:chOff x="0" y="0"/>
-          <a:chExt cx="0" cy="0"/>
-        </a:xfrm>
-      </p:grpSpPr>
-      <p:sp>
-        <p:nvSpPr>
-          <p:cNvPr id="2" name="Title 1">
-            <a:extLst>
-              <a:ext uri="{FF2B5EF4-FFF2-40B4-BE49-F238E27FC236}">
-                <a16:creationId xmlns:a16="http://schemas.microsoft.com/office/drawing/2014/main" id="{49C63E00-FA56-B540-B358-E81F344879B5}"/>
-              </a:ext>
-            </a:extLst>
-          </p:cNvPr>
-          <p:cNvSpPr>
-            <a:spLocks noGrp="1"/>
-          </p:cNvSpPr>
-          <p:nvPr>
-            <p:ph type="title"/>
-          </p:nvPr>
-        </p:nvSpPr>
-        <p:spPr/>
-        <p:txBody>
-          <a:bodyPr/>
-          <a:lstStyle/>
-          <a:p>
-            <a:r>
-              <a:rPr lang="en-US" dirty="0"/>
-              <a:t>Today’s Objectives</a:t>
-            </a:r>
-          </a:p>
-        </p:txBody>
-      </p:sp>
-      <p:sp>
-        <p:nvSpPr>
-          <p:cNvPr id="3" name="Content Placeholder 2">
-            <a:extLst>
-              <a:ext uri="{FF2B5EF4-FFF2-40B4-BE49-F238E27FC236}">
-                <a16:creationId xmlns:a16="http://schemas.microsoft.com/office/drawing/2014/main" id="{65A14FCD-F8D9-3546-8C9B-A825BAC7E055}"/>
-              </a:ext>
-            </a:extLst>
-          </p:cNvPr>
-          <p:cNvSpPr>
-            <a:spLocks noGrp="1"/>
-          </p:cNvSpPr>
-          <p:nvPr>
-            <p:ph idx="1"/>
-          </p:nvPr>
-        </p:nvSpPr>
-        <p:spPr/>
-        <p:txBody>
-          <a:bodyPr/>
-          <a:lstStyle/>
-          <a:p>
-            <a:pPr marL="571500" indent="-571500">
-              <a:buAutoNum type="romanUcPeriod"/>
-            </a:pPr>
-            <a:r>
-              <a:rPr lang="en-US" b="1" dirty="0">
-                <a:solidFill>
-                  <a:schemeClr val="accent1"/>
-                </a:solidFill>
-              </a:rPr>
-              <a:t>Why</a:t>
-            </a:r>
-            <a:r>
-              <a:rPr lang="en-US" dirty="0"/>
-              <a:t> track your time?</a:t>
-            </a:r>
-          </a:p>
-          <a:p>
-            <a:pPr marL="571500" indent="-571500">
-              <a:buAutoNum type="romanUcPeriod"/>
-            </a:pPr>
-            <a:r>
-              <a:rPr lang="en-US" b="1" dirty="0">
-                <a:solidFill>
-                  <a:schemeClr val="accent1"/>
-                </a:solidFill>
-              </a:rPr>
-              <a:t>How</a:t>
-            </a:r>
-            <a:r>
-              <a:rPr lang="en-US" dirty="0"/>
-              <a:t> to track your time?</a:t>
-            </a:r>
-          </a:p>
-          <a:p>
-            <a:pPr marL="571500" indent="-571500">
-              <a:buAutoNum type="romanUcPeriod"/>
-            </a:pPr>
-            <a:r>
-              <a:rPr lang="en-US" b="1" dirty="0">
-                <a:solidFill>
-                  <a:schemeClr val="accent1"/>
-                </a:solidFill>
-              </a:rPr>
-              <a:t>What</a:t>
-            </a:r>
-            <a:r>
-              <a:rPr lang="en-US" dirty="0"/>
-              <a:t> to do once you’ve tracked your time (an introduction to timetrackR)</a:t>
-            </a:r>
-          </a:p>
-          <a:p>
-            <a:pPr marL="571500" indent="-571500">
-              <a:buAutoNum type="romanUcPeriod"/>
-            </a:pPr>
-            <a:r>
-              <a:rPr lang="en-US" dirty="0"/>
-              <a:t>timetrackR </a:t>
-            </a:r>
-            <a:r>
-              <a:rPr lang="en-US" b="1" dirty="0">
-                <a:solidFill>
-                  <a:schemeClr val="accent1"/>
-                </a:solidFill>
-              </a:rPr>
-              <a:t>demo</a:t>
-            </a:r>
-          </a:p>
-          <a:p>
-            <a:pPr marL="571500" indent="-571500">
-              <a:buAutoNum type="romanUcPeriod"/>
-            </a:pPr>
-            <a:r>
-              <a:rPr lang="en-US" dirty="0"/>
-              <a:t>Useful R code learned in the process</a:t>
-            </a:r>
-          </a:p>
-          <a:p>
-            <a:pPr marL="571500" indent="-571500">
-              <a:buAutoNum type="romanUcPeriod"/>
-            </a:pPr>
-            <a:r>
-              <a:rPr lang="en-US" dirty="0"/>
-              <a:t> Future work</a:t>
-            </a:r>
-          </a:p>
-        </p:txBody>
-      </p:sp>
-      <p:sp>
-        <p:nvSpPr>
-          <p:cNvPr id="4" name="Slide Number Placeholder 3">
-            <a:extLst>
-              <a:ext uri="{FF2B5EF4-FFF2-40B4-BE49-F238E27FC236}">
-                <a16:creationId xmlns:a16="http://schemas.microsoft.com/office/drawing/2014/main" id="{2B8E67FD-1566-ED4A-B310-AA91E7E0817D}"/>
-              </a:ext>
-            </a:extLst>
-          </p:cNvPr>
-          <p:cNvSpPr>
-            <a:spLocks noGrp="1"/>
-          </p:cNvSpPr>
-          <p:nvPr>
-            <p:ph type="sldNum" sz="quarter" idx="4"/>
-          </p:nvPr>
-        </p:nvSpPr>
-        <p:spPr/>
-        <p:txBody>
-          <a:bodyPr/>
-          <a:lstStyle/>
-          <a:p>
-            <a:fld id="{1C3486A8-E8FB-4965-B61C-9B9FA7DC7BEE}" type="slidenum">
-              <a:rPr lang="en-US" smtClean="0"/>
-              <a:pPr/>
-              <a:t>3</a:t>
-            </a:fld>
-            <a:endParaRPr lang="en-US"/>
-          </a:p>
-        </p:txBody>
-      </p:sp>
-    </p:spTree>
-    <p:extLst>
-      <p:ext uri="{BB962C8B-B14F-4D97-AF65-F5344CB8AC3E}">
-        <p14:creationId xmlns:p14="http://schemas.microsoft.com/office/powerpoint/2010/main" val="1364271941"/>
-      </p:ext>
-    </p:extLst>
-  </p:cSld>
-  <p:clrMapOvr>
-    <a:masterClrMapping/>
-  </p:clrMapOvr>
-</p:sld>
-</file>
-
-<file path=ppt/slides/slide30.xml><?xml version="1.0" encoding="utf-8"?>
-<p:sld xmlns:a="http://schemas.openxmlformats.org/drawingml/2006/main" xmlns:r="http://schemas.openxmlformats.org/officeDocument/2006/relationships" xmlns:p="http://schemas.openxmlformats.org/presentationml/2006/main">
-  <p:cSld>
-    <p:spTree>
-      <p:nvGrpSpPr>
-        <p:cNvPr id="1" name=""/>
-        <p:cNvGrpSpPr/>
-        <p:nvPr/>
-      </p:nvGrpSpPr>
-      <p:grpSpPr>
-        <a:xfrm>
-          <a:off x="0" y="0"/>
-          <a:ext cx="0" cy="0"/>
-          <a:chOff x="0" y="0"/>
-          <a:chExt cx="0" cy="0"/>
-        </a:xfrm>
-      </p:grpSpPr>
-      <p:sp>
-        <p:nvSpPr>
-          <p:cNvPr id="2" name="Title 1">
-            <a:extLst>
-              <a:ext uri="{FF2B5EF4-FFF2-40B4-BE49-F238E27FC236}">
-                <a16:creationId xmlns:a16="http://schemas.microsoft.com/office/drawing/2014/main" id="{240F9A70-6D57-4D90-A9B1-9D51FC41F5F9}"/>
-              </a:ext>
-            </a:extLst>
-          </p:cNvPr>
-          <p:cNvSpPr>
-            <a:spLocks noGrp="1"/>
-          </p:cNvSpPr>
-          <p:nvPr>
-            <p:ph type="title"/>
-          </p:nvPr>
-        </p:nvSpPr>
-        <p:spPr/>
-        <p:txBody>
-          <a:bodyPr/>
-          <a:lstStyle/>
-          <a:p>
-            <a:r>
-              <a:rPr lang="en-US" dirty="0"/>
-              <a:t>switch function: Bar chart application</a:t>
-            </a:r>
-          </a:p>
-        </p:txBody>
-      </p:sp>
-      <p:sp>
-        <p:nvSpPr>
-          <p:cNvPr id="3" name="Content Placeholder 2">
-            <a:extLst>
-              <a:ext uri="{FF2B5EF4-FFF2-40B4-BE49-F238E27FC236}">
-                <a16:creationId xmlns:a16="http://schemas.microsoft.com/office/drawing/2014/main" id="{7B7B1E04-3197-475B-9A06-7AC8072CFE05}"/>
-              </a:ext>
-            </a:extLst>
-          </p:cNvPr>
-          <p:cNvSpPr>
-            <a:spLocks noGrp="1"/>
-          </p:cNvSpPr>
-          <p:nvPr>
-            <p:ph idx="1"/>
-          </p:nvPr>
-        </p:nvSpPr>
-        <p:spPr/>
-        <p:txBody>
-          <a:bodyPr/>
-          <a:lstStyle/>
-          <a:p>
-            <a:pPr marL="0" indent="0">
-              <a:buNone/>
-            </a:pPr>
-            <a:r>
-              <a:rPr lang="en-US" sz="2000" dirty="0"/>
-              <a:t>App interface:</a:t>
-            </a:r>
-            <a:endParaRPr lang="en-US" sz="2400" dirty="0"/>
-          </a:p>
-          <a:p>
-            <a:endParaRPr lang="en-US" sz="2400" dirty="0"/>
-          </a:p>
-          <a:p>
-            <a:endParaRPr lang="en-US" sz="2400" dirty="0"/>
-          </a:p>
-          <a:p>
-            <a:endParaRPr lang="en-US" sz="2400" dirty="0"/>
-          </a:p>
-          <a:p>
-            <a:endParaRPr lang="en-US" sz="2400" dirty="0"/>
-          </a:p>
-          <a:p>
-            <a:r>
-              <a:rPr lang="en-US" sz="1800" dirty="0" err="1">
-                <a:latin typeface="Courier"/>
-              </a:rPr>
-              <a:t>input$status_filter_bar</a:t>
-            </a:r>
-            <a:r>
-              <a:rPr lang="en-US" sz="1800" dirty="0">
-                <a:latin typeface="Courier"/>
-              </a:rPr>
-              <a:t> </a:t>
-            </a:r>
-            <a:r>
-              <a:rPr lang="en-US" sz="2000" dirty="0"/>
-              <a:t>returns either “Active projects” or “All projects” depending on which radio button is selected </a:t>
-            </a:r>
-          </a:p>
-          <a:p>
-            <a:r>
-              <a:rPr lang="en-US" sz="2000" dirty="0"/>
-              <a:t>Code (</a:t>
-            </a:r>
-            <a:r>
-              <a:rPr lang="en-US" sz="2000" dirty="0" err="1"/>
-              <a:t>server.R</a:t>
-            </a:r>
-            <a:r>
-              <a:rPr lang="en-US" sz="2000" dirty="0"/>
-              <a:t>):</a:t>
-            </a:r>
-            <a:endParaRPr lang="en-US" sz="2400" dirty="0"/>
-          </a:p>
-          <a:p>
-            <a:endParaRPr lang="en-US" sz="2400" dirty="0"/>
-          </a:p>
-          <a:p>
-            <a:endParaRPr lang="en-US" sz="1600" dirty="0">
-              <a:latin typeface="Courier"/>
-            </a:endParaRPr>
-          </a:p>
-          <a:p>
-            <a:endParaRPr lang="en-US" sz="1600" dirty="0">
-              <a:latin typeface="Courier"/>
-            </a:endParaRPr>
-          </a:p>
-          <a:p>
-            <a:endParaRPr lang="en-US" sz="1800" dirty="0"/>
-          </a:p>
-          <a:p>
-            <a:r>
-              <a:rPr lang="en-US" sz="1800" dirty="0"/>
-              <a:t>Using switch function to subset the data on active projects if needed, otherwise proceeding with all projects</a:t>
-            </a:r>
-            <a:endParaRPr lang="en-US" sz="2400" dirty="0"/>
-          </a:p>
-          <a:p>
-            <a:endParaRPr lang="en-US" sz="2400" dirty="0"/>
-          </a:p>
-          <a:p>
-            <a:endParaRPr lang="en-US" sz="2400" dirty="0"/>
-          </a:p>
-        </p:txBody>
-      </p:sp>
-      <p:sp>
-        <p:nvSpPr>
-          <p:cNvPr id="6" name="Rectangle 5">
-            <a:extLst>
-              <a:ext uri="{FF2B5EF4-FFF2-40B4-BE49-F238E27FC236}">
-                <a16:creationId xmlns:a16="http://schemas.microsoft.com/office/drawing/2014/main" id="{9A8554B4-C3D3-4D86-8F01-5351C0BDE7A5}"/>
-              </a:ext>
-            </a:extLst>
-          </p:cNvPr>
-          <p:cNvSpPr/>
-          <p:nvPr/>
-        </p:nvSpPr>
-        <p:spPr>
-          <a:xfrm>
-            <a:off x="1100363" y="4508818"/>
-            <a:ext cx="6741459" cy="954107"/>
-          </a:xfrm>
-          <a:prstGeom prst="rect">
-            <a:avLst/>
-          </a:prstGeom>
-        </p:spPr>
-        <p:style>
-          <a:lnRef idx="2">
-            <a:schemeClr val="accent2"/>
-          </a:lnRef>
-          <a:fillRef idx="1">
-            <a:schemeClr val="lt1"/>
-          </a:fillRef>
-          <a:effectRef idx="0">
-            <a:schemeClr val="accent2"/>
-          </a:effectRef>
-          <a:fontRef idx="minor">
-            <a:schemeClr val="dk1"/>
-          </a:fontRef>
-        </p:style>
-        <p:txBody>
-          <a:bodyPr wrap="square">
-            <a:spAutoFit/>
-          </a:bodyPr>
-          <a:lstStyle/>
-          <a:p>
-            <a:r>
-              <a:rPr lang="en-US" sz="1400" b="1" dirty="0">
-                <a:solidFill>
-                  <a:srgbClr val="007020"/>
-                </a:solidFill>
-                <a:latin typeface="Courier"/>
-              </a:rPr>
-              <a:t>switch</a:t>
-            </a:r>
-            <a:r>
-              <a:rPr lang="en-US" sz="1400" dirty="0">
-                <a:latin typeface="Courier"/>
-              </a:rPr>
-              <a:t>(</a:t>
-            </a:r>
-            <a:r>
-              <a:rPr lang="en-US" sz="1400" dirty="0" err="1">
-                <a:latin typeface="Courier"/>
-              </a:rPr>
-              <a:t>input</a:t>
-            </a:r>
-            <a:r>
-              <a:rPr lang="en-US" sz="1400" dirty="0" err="1">
-                <a:solidFill>
-                  <a:srgbClr val="666666"/>
-                </a:solidFill>
-                <a:latin typeface="Courier"/>
-              </a:rPr>
-              <a:t>$</a:t>
-            </a:r>
-            <a:r>
-              <a:rPr lang="en-US" sz="1400" dirty="0" err="1">
-                <a:latin typeface="Courier"/>
-              </a:rPr>
-              <a:t>status_filter_bar</a:t>
-            </a:r>
-            <a:r>
-              <a:rPr lang="en-US" sz="1400" dirty="0">
-                <a:latin typeface="Courier"/>
-              </a:rPr>
-              <a:t>,</a:t>
-            </a:r>
-            <a:br>
-              <a:rPr lang="en-US" sz="2400" dirty="0"/>
-            </a:br>
-            <a:r>
-              <a:rPr lang="en-US" sz="1400" dirty="0">
-                <a:latin typeface="Courier"/>
-              </a:rPr>
-              <a:t>           </a:t>
-            </a:r>
-            <a:r>
-              <a:rPr lang="en-US" sz="1400" dirty="0">
-                <a:solidFill>
-                  <a:srgbClr val="4070A0"/>
-                </a:solidFill>
-                <a:latin typeface="Courier"/>
-              </a:rPr>
-              <a:t>"Active projects"</a:t>
-            </a:r>
-            <a:r>
-              <a:rPr lang="en-US" sz="1400" dirty="0">
-                <a:latin typeface="Courier"/>
-              </a:rPr>
-              <a:t> =</a:t>
-            </a:r>
-            <a:r>
-              <a:rPr lang="en-US" sz="1400" dirty="0">
-                <a:solidFill>
-                  <a:srgbClr val="4070A0"/>
-                </a:solidFill>
-                <a:latin typeface="Courier"/>
-              </a:rPr>
-              <a:t> </a:t>
-            </a:r>
-            <a:r>
-              <a:rPr lang="en-US" sz="1400" dirty="0" err="1">
-                <a:latin typeface="Courier"/>
-              </a:rPr>
-              <a:t>bar_filtered</a:t>
-            </a:r>
-            <a:r>
-              <a:rPr lang="en-US" sz="1400" dirty="0">
-                <a:latin typeface="Courier"/>
-              </a:rPr>
-              <a:t> &lt;-</a:t>
-            </a:r>
-            <a:r>
-              <a:rPr lang="en-US" sz="1400" dirty="0">
-                <a:solidFill>
-                  <a:srgbClr val="4070A0"/>
-                </a:solidFill>
-                <a:latin typeface="Courier"/>
-              </a:rPr>
-              <a:t> </a:t>
-            </a:r>
-            <a:r>
-              <a:rPr lang="en-US" sz="1400" dirty="0">
-                <a:latin typeface="Courier"/>
-              </a:rPr>
-              <a:t>tracker </a:t>
-            </a:r>
-            <a:r>
-              <a:rPr lang="en-US" sz="1400" dirty="0">
-                <a:solidFill>
-                  <a:srgbClr val="666666"/>
-                </a:solidFill>
-                <a:latin typeface="Courier"/>
-              </a:rPr>
-              <a:t>%&gt;%</a:t>
-            </a:r>
-            <a:r>
-              <a:rPr lang="en-US" sz="1400" dirty="0">
-                <a:solidFill>
-                  <a:srgbClr val="4070A0"/>
-                </a:solidFill>
-                <a:latin typeface="Courier"/>
-              </a:rPr>
-              <a:t> </a:t>
-            </a:r>
-            <a:br>
-              <a:rPr lang="en-US" sz="2400" dirty="0"/>
-            </a:br>
-            <a:r>
-              <a:rPr lang="en-US" sz="1400" dirty="0">
-                <a:solidFill>
-                  <a:srgbClr val="4070A0"/>
-                </a:solidFill>
-                <a:latin typeface="Courier"/>
-              </a:rPr>
-              <a:t>             </a:t>
-            </a:r>
-            <a:r>
-              <a:rPr lang="en-US" sz="1400" b="1" dirty="0">
-                <a:solidFill>
-                  <a:srgbClr val="007020"/>
-                </a:solidFill>
-                <a:latin typeface="Courier"/>
-              </a:rPr>
-              <a:t>filter</a:t>
-            </a:r>
-            <a:r>
-              <a:rPr lang="en-US" sz="1400" dirty="0">
-                <a:latin typeface="Courier"/>
-              </a:rPr>
-              <a:t>(status </a:t>
-            </a:r>
-            <a:r>
-              <a:rPr lang="en-US" sz="1400" dirty="0">
-                <a:solidFill>
-                  <a:srgbClr val="666666"/>
-                </a:solidFill>
-                <a:latin typeface="Courier"/>
-              </a:rPr>
-              <a:t>==</a:t>
-            </a:r>
-            <a:r>
-              <a:rPr lang="en-US" sz="1400" dirty="0">
-                <a:solidFill>
-                  <a:srgbClr val="4070A0"/>
-                </a:solidFill>
-                <a:latin typeface="Courier"/>
-              </a:rPr>
-              <a:t> "Active"</a:t>
-            </a:r>
-            <a:r>
-              <a:rPr lang="en-US" sz="1400" dirty="0">
-                <a:latin typeface="Courier"/>
-              </a:rPr>
-              <a:t>),</a:t>
-            </a:r>
-            <a:br>
-              <a:rPr lang="en-US" sz="2400" dirty="0"/>
-            </a:br>
-            <a:r>
-              <a:rPr lang="en-US" sz="1400" dirty="0">
-                <a:latin typeface="Courier"/>
-              </a:rPr>
-              <a:t>           </a:t>
-            </a:r>
-            <a:r>
-              <a:rPr lang="en-US" sz="1400" dirty="0">
-                <a:solidFill>
-                  <a:srgbClr val="4070A0"/>
-                </a:solidFill>
-                <a:latin typeface="Courier"/>
-              </a:rPr>
-              <a:t>"All projects"</a:t>
-            </a:r>
-            <a:r>
-              <a:rPr lang="en-US" sz="1400" dirty="0">
-                <a:latin typeface="Courier"/>
-              </a:rPr>
-              <a:t> =</a:t>
-            </a:r>
-            <a:r>
-              <a:rPr lang="en-US" sz="1400" dirty="0">
-                <a:solidFill>
-                  <a:srgbClr val="4070A0"/>
-                </a:solidFill>
-                <a:latin typeface="Courier"/>
-              </a:rPr>
-              <a:t> </a:t>
-            </a:r>
-            <a:r>
-              <a:rPr lang="en-US" sz="1400" dirty="0" err="1">
-                <a:latin typeface="Courier"/>
-              </a:rPr>
-              <a:t>bar_filtered</a:t>
-            </a:r>
-            <a:r>
-              <a:rPr lang="en-US" sz="1400" dirty="0">
-                <a:latin typeface="Courier"/>
-              </a:rPr>
-              <a:t> &lt;-</a:t>
-            </a:r>
-            <a:r>
-              <a:rPr lang="en-US" sz="1400" dirty="0">
-                <a:solidFill>
-                  <a:srgbClr val="4070A0"/>
-                </a:solidFill>
-                <a:latin typeface="Courier"/>
-              </a:rPr>
-              <a:t> </a:t>
-            </a:r>
-            <a:r>
-              <a:rPr lang="en-US" sz="1400" dirty="0">
-                <a:latin typeface="Courier"/>
-              </a:rPr>
-              <a:t>tracker)</a:t>
-            </a:r>
-            <a:endParaRPr lang="en-US" sz="1400" dirty="0"/>
-          </a:p>
-        </p:txBody>
-      </p:sp>
-      <p:pic>
-        <p:nvPicPr>
-          <p:cNvPr id="7" name="Picture 6">
-            <a:extLst>
-              <a:ext uri="{FF2B5EF4-FFF2-40B4-BE49-F238E27FC236}">
-                <a16:creationId xmlns:a16="http://schemas.microsoft.com/office/drawing/2014/main" id="{ACF31CA0-F4F7-46F7-9DBC-96F4F9115B72}"/>
-              </a:ext>
-            </a:extLst>
-          </p:cNvPr>
-          <p:cNvPicPr>
-            <a:picLocks noChangeAspect="1"/>
-          </p:cNvPicPr>
-          <p:nvPr/>
-        </p:nvPicPr>
-        <p:blipFill>
-          <a:blip r:embed="rId2"/>
-          <a:stretch>
-            <a:fillRect/>
-          </a:stretch>
-        </p:blipFill>
-        <p:spPr>
-          <a:xfrm>
-            <a:off x="1234834" y="1632821"/>
-            <a:ext cx="4843237" cy="1594724"/>
-          </a:xfrm>
-          <a:prstGeom prst="rect">
-            <a:avLst/>
-          </a:prstGeom>
-          <a:ln w="28575">
-            <a:solidFill>
-              <a:schemeClr val="accent2"/>
-            </a:solidFill>
-          </a:ln>
-        </p:spPr>
-      </p:pic>
-      <p:sp>
-        <p:nvSpPr>
-          <p:cNvPr id="5" name="Slide Number Placeholder 4">
-            <a:extLst>
-              <a:ext uri="{FF2B5EF4-FFF2-40B4-BE49-F238E27FC236}">
-                <a16:creationId xmlns:a16="http://schemas.microsoft.com/office/drawing/2014/main" id="{13AAA3A0-3A7B-46E7-9865-E7A5C376ACC9}"/>
-              </a:ext>
-            </a:extLst>
-          </p:cNvPr>
-          <p:cNvSpPr>
-            <a:spLocks noGrp="1"/>
-          </p:cNvSpPr>
-          <p:nvPr>
-            <p:ph type="sldNum" sz="quarter" idx="4"/>
-          </p:nvPr>
-        </p:nvSpPr>
-        <p:spPr/>
-        <p:txBody>
-          <a:bodyPr/>
-          <a:lstStyle/>
-          <a:p>
-            <a:fld id="{1C3486A8-E8FB-4965-B61C-9B9FA7DC7BEE}" type="slidenum">
-              <a:rPr lang="en-US" smtClean="0"/>
-              <a:pPr/>
-              <a:t>30</a:t>
-            </a:fld>
-            <a:endParaRPr lang="en-US"/>
-          </a:p>
-        </p:txBody>
-      </p:sp>
-    </p:spTree>
-    <p:extLst>
-      <p:ext uri="{BB962C8B-B14F-4D97-AF65-F5344CB8AC3E}">
-        <p14:creationId xmlns:p14="http://schemas.microsoft.com/office/powerpoint/2010/main" val="1947615113"/>
-      </p:ext>
-    </p:extLst>
-  </p:cSld>
-  <p:clrMapOvr>
-    <a:masterClrMapping/>
-  </p:clrMapOvr>
-</p:sld>
-</file>
-
-<file path=ppt/slides/slide31.xml><?xml version="1.0" encoding="utf-8"?>
-<p:sld xmlns:a="http://schemas.openxmlformats.org/drawingml/2006/main" xmlns:r="http://schemas.openxmlformats.org/officeDocument/2006/relationships" xmlns:p="http://schemas.openxmlformats.org/presentationml/2006/main">
-  <p:cSld>
-    <p:spTree>
-      <p:nvGrpSpPr>
-        <p:cNvPr id="1" name=""/>
-        <p:cNvGrpSpPr/>
-        <p:nvPr/>
-      </p:nvGrpSpPr>
-      <p:grpSpPr>
-        <a:xfrm>
-          <a:off x="0" y="0"/>
-          <a:ext cx="0" cy="0"/>
-          <a:chOff x="0" y="0"/>
-          <a:chExt cx="0" cy="0"/>
-        </a:xfrm>
-      </p:grpSpPr>
-      <p:sp>
-        <p:nvSpPr>
-          <p:cNvPr id="2" name="Title 1">
-            <a:extLst>
-              <a:ext uri="{FF2B5EF4-FFF2-40B4-BE49-F238E27FC236}">
-                <a16:creationId xmlns:a16="http://schemas.microsoft.com/office/drawing/2014/main" id="{240F9A70-6D57-4D90-A9B1-9D51FC41F5F9}"/>
-              </a:ext>
-            </a:extLst>
-          </p:cNvPr>
-          <p:cNvSpPr>
-            <a:spLocks noGrp="1"/>
-          </p:cNvSpPr>
-          <p:nvPr>
-            <p:ph type="title"/>
-          </p:nvPr>
-        </p:nvSpPr>
-        <p:spPr/>
-        <p:txBody>
-          <a:bodyPr/>
-          <a:lstStyle/>
-          <a:p>
-            <a:r>
-              <a:rPr lang="en-US" dirty="0"/>
-              <a:t>Project Timeline</a:t>
-            </a:r>
-          </a:p>
-        </p:txBody>
-      </p:sp>
-      <p:sp>
-        <p:nvSpPr>
-          <p:cNvPr id="3" name="Content Placeholder 2">
-            <a:extLst>
-              <a:ext uri="{FF2B5EF4-FFF2-40B4-BE49-F238E27FC236}">
-                <a16:creationId xmlns:a16="http://schemas.microsoft.com/office/drawing/2014/main" id="{7B7B1E04-3197-475B-9A06-7AC8072CFE05}"/>
-              </a:ext>
-            </a:extLst>
-          </p:cNvPr>
-          <p:cNvSpPr>
-            <a:spLocks noGrp="1"/>
-          </p:cNvSpPr>
-          <p:nvPr>
-            <p:ph idx="1"/>
-          </p:nvPr>
-        </p:nvSpPr>
-        <p:spPr/>
-        <p:txBody>
-          <a:bodyPr/>
-          <a:lstStyle/>
-          <a:p>
-            <a:r>
               <a:rPr lang="en-US" sz="2800" dirty="0"/>
               <a:t>Made using </a:t>
             </a:r>
@@ -10254,7 +10482,7 @@
             <a:fld id="{1C3486A8-E8FB-4965-B61C-9B9FA7DC7BEE}" type="slidenum">
               <a:rPr lang="en-US" smtClean="0"/>
               <a:pPr/>
-              <a:t>31</a:t>
+              <a:t>29</a:t>
             </a:fld>
             <a:endParaRPr lang="en-US"/>
           </a:p>
@@ -10275,7 +10503,7 @@
           <p:nvPr/>
         </p:nvPicPr>
         <p:blipFill>
-          <a:blip r:embed="rId2"/>
+          <a:blip r:embed="rId3"/>
           <a:stretch>
             <a:fillRect/>
           </a:stretch>
@@ -10303,7 +10531,203 @@
 </p:sld>
 </file>
 
-<file path=ppt/slides/slide32.xml><?xml version="1.0" encoding="utf-8"?>
+<file path=ppt/slides/slide3.xml><?xml version="1.0" encoding="utf-8"?>
+<p:sld xmlns:a="http://schemas.openxmlformats.org/drawingml/2006/main" xmlns:r="http://schemas.openxmlformats.org/officeDocument/2006/relationships" xmlns:p="http://schemas.openxmlformats.org/presentationml/2006/main">
+  <p:cSld>
+    <p:spTree>
+      <p:nvGrpSpPr>
+        <p:cNvPr id="1" name=""/>
+        <p:cNvGrpSpPr/>
+        <p:nvPr/>
+      </p:nvGrpSpPr>
+      <p:grpSpPr>
+        <a:xfrm>
+          <a:off x="0" y="0"/>
+          <a:ext cx="0" cy="0"/>
+          <a:chOff x="0" y="0"/>
+          <a:chExt cx="0" cy="0"/>
+        </a:xfrm>
+      </p:grpSpPr>
+      <p:sp>
+        <p:nvSpPr>
+          <p:cNvPr id="2" name="Title 1">
+            <a:extLst>
+              <a:ext uri="{FF2B5EF4-FFF2-40B4-BE49-F238E27FC236}">
+                <a16:creationId xmlns:a16="http://schemas.microsoft.com/office/drawing/2014/main" id="{49C63E00-FA56-B540-B358-E81F344879B5}"/>
+              </a:ext>
+            </a:extLst>
+          </p:cNvPr>
+          <p:cNvSpPr>
+            <a:spLocks noGrp="1"/>
+          </p:cNvSpPr>
+          <p:nvPr>
+            <p:ph type="title"/>
+          </p:nvPr>
+        </p:nvSpPr>
+        <p:spPr/>
+        <p:txBody>
+          <a:bodyPr/>
+          <a:lstStyle/>
+          <a:p>
+            <a:r>
+              <a:rPr lang="en-US" dirty="0"/>
+              <a:t>Today’s Objectives</a:t>
+            </a:r>
+          </a:p>
+        </p:txBody>
+      </p:sp>
+      <p:sp>
+        <p:nvSpPr>
+          <p:cNvPr id="3" name="Content Placeholder 2">
+            <a:extLst>
+              <a:ext uri="{FF2B5EF4-FFF2-40B4-BE49-F238E27FC236}">
+                <a16:creationId xmlns:a16="http://schemas.microsoft.com/office/drawing/2014/main" id="{65A14FCD-F8D9-3546-8C9B-A825BAC7E055}"/>
+              </a:ext>
+            </a:extLst>
+          </p:cNvPr>
+          <p:cNvSpPr>
+            <a:spLocks noGrp="1"/>
+          </p:cNvSpPr>
+          <p:nvPr>
+            <p:ph idx="1"/>
+          </p:nvPr>
+        </p:nvSpPr>
+        <p:spPr/>
+        <p:txBody>
+          <a:bodyPr/>
+          <a:lstStyle/>
+          <a:p>
+            <a:pPr marL="571500" indent="-571500">
+              <a:buAutoNum type="romanUcPeriod"/>
+            </a:pPr>
+            <a:r>
+              <a:rPr lang="en-US" b="1" dirty="0">
+                <a:solidFill>
+                  <a:schemeClr val="accent1"/>
+                </a:solidFill>
+              </a:rPr>
+              <a:t>Why</a:t>
+            </a:r>
+            <a:r>
+              <a:rPr lang="en-US" dirty="0"/>
+              <a:t> track your time?</a:t>
+            </a:r>
+          </a:p>
+          <a:p>
+            <a:pPr marL="571500" indent="-571500">
+              <a:buAutoNum type="romanUcPeriod"/>
+            </a:pPr>
+            <a:r>
+              <a:rPr lang="en-US" b="1" dirty="0">
+                <a:solidFill>
+                  <a:schemeClr val="accent1"/>
+                </a:solidFill>
+              </a:rPr>
+              <a:t>How</a:t>
+            </a:r>
+            <a:r>
+              <a:rPr lang="en-US" dirty="0"/>
+              <a:t> to track your time?</a:t>
+            </a:r>
+          </a:p>
+          <a:p>
+            <a:pPr marL="571500" indent="-571500">
+              <a:buAutoNum type="romanUcPeriod"/>
+            </a:pPr>
+            <a:r>
+              <a:rPr lang="en-US" b="1" dirty="0">
+                <a:solidFill>
+                  <a:schemeClr val="accent1"/>
+                </a:solidFill>
+              </a:rPr>
+              <a:t>What</a:t>
+            </a:r>
+            <a:r>
+              <a:rPr lang="en-US" dirty="0"/>
+              <a:t> to do once you’ve tracked your time (an introduction to timetrackR)</a:t>
+            </a:r>
+          </a:p>
+          <a:p>
+            <a:pPr marL="571500" indent="-571500">
+              <a:buAutoNum type="romanUcPeriod"/>
+            </a:pPr>
+            <a:r>
+              <a:rPr lang="en-US" dirty="0"/>
+              <a:t>timetrackR </a:t>
+            </a:r>
+            <a:r>
+              <a:rPr lang="en-US" b="1" dirty="0">
+                <a:solidFill>
+                  <a:schemeClr val="accent1"/>
+                </a:solidFill>
+              </a:rPr>
+              <a:t>demo</a:t>
+            </a:r>
+          </a:p>
+          <a:p>
+            <a:pPr marL="571500" indent="-571500">
+              <a:buAutoNum type="romanUcPeriod"/>
+            </a:pPr>
+            <a:r>
+              <a:rPr lang="en-US" dirty="0"/>
+              <a:t>Useful R code learned in the process</a:t>
+            </a:r>
+          </a:p>
+          <a:p>
+            <a:pPr marL="571500" indent="-571500">
+              <a:buAutoNum type="romanUcPeriod"/>
+            </a:pPr>
+            <a:r>
+              <a:rPr lang="en-US" dirty="0"/>
+              <a:t> Future work</a:t>
+            </a:r>
+          </a:p>
+        </p:txBody>
+      </p:sp>
+      <p:sp>
+        <p:nvSpPr>
+          <p:cNvPr id="4" name="Slide Number Placeholder 3">
+            <a:extLst>
+              <a:ext uri="{FF2B5EF4-FFF2-40B4-BE49-F238E27FC236}">
+                <a16:creationId xmlns:a16="http://schemas.microsoft.com/office/drawing/2014/main" id="{2B8E67FD-1566-ED4A-B310-AA91E7E0817D}"/>
+              </a:ext>
+            </a:extLst>
+          </p:cNvPr>
+          <p:cNvSpPr>
+            <a:spLocks noGrp="1"/>
+          </p:cNvSpPr>
+          <p:nvPr>
+            <p:ph type="sldNum" sz="quarter" idx="4"/>
+          </p:nvPr>
+        </p:nvSpPr>
+        <p:spPr/>
+        <p:txBody>
+          <a:bodyPr/>
+          <a:lstStyle/>
+          <a:p>
+            <a:fld id="{1C3486A8-E8FB-4965-B61C-9B9FA7DC7BEE}" type="slidenum">
+              <a:rPr lang="en-US" smtClean="0"/>
+              <a:pPr/>
+              <a:t>3</a:t>
+            </a:fld>
+            <a:endParaRPr lang="en-US"/>
+          </a:p>
+        </p:txBody>
+      </p:sp>
+    </p:spTree>
+    <p:extLst>
+      <p:ext uri="{BB962C8B-B14F-4D97-AF65-F5344CB8AC3E}">
+        <p14:creationId xmlns:p14="http://schemas.microsoft.com/office/powerpoint/2010/main" val="1364271941"/>
+      </p:ext>
+    </p:extLst>
+  </p:cSld>
+  <p:clrMapOvr>
+    <a:masterClrMapping/>
+  </p:clrMapOvr>
+</p:sld>
+</file>
+
+<file path=ppt/slides/slide30.xml><?xml version="1.0" encoding="utf-8"?>
 <p:sld xmlns:a="http://schemas.openxmlformats.org/drawingml/2006/main" xmlns:r="http://schemas.openxmlformats.org/officeDocument/2006/relationships" xmlns:p="http://schemas.openxmlformats.org/presentationml/2006/main">
   <p:cSld>
     <p:spTree>
@@ -10613,7 +11037,7 @@
             <a:fld id="{1C3486A8-E8FB-4965-B61C-9B9FA7DC7BEE}" type="slidenum">
               <a:rPr lang="en-US" smtClean="0"/>
               <a:pPr/>
-              <a:t>32</a:t>
+              <a:t>30</a:t>
             </a:fld>
             <a:endParaRPr lang="en-US"/>
           </a:p>
@@ -10632,7 +11056,7 @@
 </p:sld>
 </file>
 
-<file path=ppt/slides/slide33.xml><?xml version="1.0" encoding="utf-8"?>
+<file path=ppt/slides/slide31.xml><?xml version="1.0" encoding="utf-8"?>
 <p:sld xmlns:a="http://schemas.openxmlformats.org/drawingml/2006/main" xmlns:r="http://schemas.openxmlformats.org/officeDocument/2006/relationships" xmlns:p="http://schemas.openxmlformats.org/presentationml/2006/main">
   <p:cSld>
     <p:spTree>
@@ -11395,7 +11819,7 @@
             <a:fld id="{1C3486A8-E8FB-4965-B61C-9B9FA7DC7BEE}" type="slidenum">
               <a:rPr lang="en-US" smtClean="0"/>
               <a:pPr/>
-              <a:t>33</a:t>
+              <a:t>31</a:t>
             </a:fld>
             <a:endParaRPr lang="en-US"/>
           </a:p>
@@ -11444,7 +11868,7 @@
 </p:sld>
 </file>
 
-<file path=ppt/slides/slide34.xml><?xml version="1.0" encoding="utf-8"?>
+<file path=ppt/slides/slide32.xml><?xml version="1.0" encoding="utf-8"?>
 <p:sld xmlns:a="http://schemas.openxmlformats.org/drawingml/2006/main" xmlns:r="http://schemas.openxmlformats.org/officeDocument/2006/relationships" xmlns:p="http://schemas.openxmlformats.org/presentationml/2006/main">
   <p:cSld>
     <p:spTree>
@@ -12105,7 +12529,7 @@
             <a:fld id="{1C3486A8-E8FB-4965-B61C-9B9FA7DC7BEE}" type="slidenum">
               <a:rPr lang="en-US" smtClean="0"/>
               <a:pPr/>
-              <a:t>34</a:t>
+              <a:t>32</a:t>
             </a:fld>
             <a:endParaRPr lang="en-US"/>
           </a:p>
@@ -12154,6 +12578,275 @@
 </p:sld>
 </file>
 
+<file path=ppt/slides/slide33.xml><?xml version="1.0" encoding="utf-8"?>
+<p:sld xmlns:a="http://schemas.openxmlformats.org/drawingml/2006/main" xmlns:r="http://schemas.openxmlformats.org/officeDocument/2006/relationships" xmlns:p="http://schemas.openxmlformats.org/presentationml/2006/main">
+  <p:cSld>
+    <p:spTree>
+      <p:nvGrpSpPr>
+        <p:cNvPr id="1" name=""/>
+        <p:cNvGrpSpPr/>
+        <p:nvPr/>
+      </p:nvGrpSpPr>
+      <p:grpSpPr>
+        <a:xfrm>
+          <a:off x="0" y="0"/>
+          <a:ext cx="0" cy="0"/>
+          <a:chOff x="0" y="0"/>
+          <a:chExt cx="0" cy="0"/>
+        </a:xfrm>
+      </p:grpSpPr>
+      <p:sp>
+        <p:nvSpPr>
+          <p:cNvPr id="2" name="Title 1">
+            <a:extLst>
+              <a:ext uri="{FF2B5EF4-FFF2-40B4-BE49-F238E27FC236}">
+                <a16:creationId xmlns:a16="http://schemas.microsoft.com/office/drawing/2014/main" id="{A82DBE75-89D1-5441-8399-5D21C8F24232}"/>
+              </a:ext>
+            </a:extLst>
+          </p:cNvPr>
+          <p:cNvSpPr>
+            <a:spLocks noGrp="1"/>
+          </p:cNvSpPr>
+          <p:nvPr>
+            <p:ph type="title"/>
+          </p:nvPr>
+        </p:nvSpPr>
+        <p:spPr/>
+        <p:txBody>
+          <a:bodyPr/>
+          <a:lstStyle/>
+          <a:p>
+            <a:r>
+              <a:rPr lang="en-US" dirty="0"/>
+              <a:t>Hosting the shiny app</a:t>
+            </a:r>
+          </a:p>
+        </p:txBody>
+      </p:sp>
+      <p:sp>
+        <p:nvSpPr>
+          <p:cNvPr id="3" name="Content Placeholder 2">
+            <a:extLst>
+              <a:ext uri="{FF2B5EF4-FFF2-40B4-BE49-F238E27FC236}">
+                <a16:creationId xmlns:a16="http://schemas.microsoft.com/office/drawing/2014/main" id="{0317B98D-799B-C444-8B06-B3C99954D7A8}"/>
+              </a:ext>
+            </a:extLst>
+          </p:cNvPr>
+          <p:cNvSpPr>
+            <a:spLocks noGrp="1"/>
+          </p:cNvSpPr>
+          <p:nvPr>
+            <p:ph idx="1"/>
+          </p:nvPr>
+        </p:nvSpPr>
+        <p:spPr/>
+        <p:txBody>
+          <a:bodyPr/>
+          <a:lstStyle/>
+          <a:p>
+            <a:r>
+              <a:rPr lang="en-US" sz="2800" i="1" dirty="0" err="1"/>
+              <a:t>timetrackR</a:t>
+            </a:r>
+            <a:r>
+              <a:rPr lang="en-US" sz="2800" dirty="0"/>
+              <a:t> is currently hosted on </a:t>
+            </a:r>
+            <a:r>
+              <a:rPr lang="en-US" sz="2800" dirty="0" err="1"/>
+              <a:t>shinyapps.io</a:t>
+            </a:r>
+            <a:endParaRPr lang="en-US" sz="2800" dirty="0"/>
+          </a:p>
+          <a:p>
+            <a:r>
+              <a:rPr lang="en-US" sz="2800" dirty="0"/>
+              <a:t>MSK has access to hosting shiny apps on </a:t>
+            </a:r>
+            <a:r>
+              <a:rPr lang="en-US" sz="2800" dirty="0" err="1"/>
+              <a:t>RConnect</a:t>
+            </a:r>
+            <a:endParaRPr lang="en-US" sz="2800" dirty="0"/>
+          </a:p>
+          <a:p>
+            <a:pPr lvl="1"/>
+            <a:r>
+              <a:rPr lang="en-US" sz="2400" dirty="0"/>
+              <a:t>Contact Juan Carlos for additional information about how to get set up</a:t>
+            </a:r>
+          </a:p>
+        </p:txBody>
+      </p:sp>
+      <p:sp>
+        <p:nvSpPr>
+          <p:cNvPr id="4" name="Slide Number Placeholder 3">
+            <a:extLst>
+              <a:ext uri="{FF2B5EF4-FFF2-40B4-BE49-F238E27FC236}">
+                <a16:creationId xmlns:a16="http://schemas.microsoft.com/office/drawing/2014/main" id="{7FEF7A6A-AC27-9141-B960-F248219C7E86}"/>
+              </a:ext>
+            </a:extLst>
+          </p:cNvPr>
+          <p:cNvSpPr>
+            <a:spLocks noGrp="1"/>
+          </p:cNvSpPr>
+          <p:nvPr>
+            <p:ph type="sldNum" sz="quarter" idx="4"/>
+          </p:nvPr>
+        </p:nvSpPr>
+        <p:spPr/>
+        <p:txBody>
+          <a:bodyPr/>
+          <a:lstStyle/>
+          <a:p>
+            <a:fld id="{1C3486A8-E8FB-4965-B61C-9B9FA7DC7BEE}" type="slidenum">
+              <a:rPr lang="en-US" smtClean="0"/>
+              <a:pPr/>
+              <a:t>33</a:t>
+            </a:fld>
+            <a:endParaRPr lang="en-US"/>
+          </a:p>
+        </p:txBody>
+      </p:sp>
+    </p:spTree>
+    <p:extLst>
+      <p:ext uri="{BB962C8B-B14F-4D97-AF65-F5344CB8AC3E}">
+        <p14:creationId xmlns:p14="http://schemas.microsoft.com/office/powerpoint/2010/main" val="3747534480"/>
+      </p:ext>
+    </p:extLst>
+  </p:cSld>
+  <p:clrMapOvr>
+    <a:masterClrMapping/>
+  </p:clrMapOvr>
+</p:sld>
+</file>
+
+<file path=ppt/slides/slide34.xml><?xml version="1.0" encoding="utf-8"?>
+<p:sld xmlns:a="http://schemas.openxmlformats.org/drawingml/2006/main" xmlns:r="http://schemas.openxmlformats.org/officeDocument/2006/relationships" xmlns:p="http://schemas.openxmlformats.org/presentationml/2006/main">
+  <p:cSld>
+    <p:spTree>
+      <p:nvGrpSpPr>
+        <p:cNvPr id="1" name=""/>
+        <p:cNvGrpSpPr/>
+        <p:nvPr/>
+      </p:nvGrpSpPr>
+      <p:grpSpPr>
+        <a:xfrm>
+          <a:off x="0" y="0"/>
+          <a:ext cx="0" cy="0"/>
+          <a:chOff x="0" y="0"/>
+          <a:chExt cx="0" cy="0"/>
+        </a:xfrm>
+      </p:grpSpPr>
+      <p:sp>
+        <p:nvSpPr>
+          <p:cNvPr id="2" name="Title 1">
+            <a:extLst>
+              <a:ext uri="{FF2B5EF4-FFF2-40B4-BE49-F238E27FC236}">
+                <a16:creationId xmlns:a16="http://schemas.microsoft.com/office/drawing/2014/main" id="{633F03C8-ABD3-4A00-AD80-087F21332873}"/>
+              </a:ext>
+            </a:extLst>
+          </p:cNvPr>
+          <p:cNvSpPr>
+            <a:spLocks noGrp="1"/>
+          </p:cNvSpPr>
+          <p:nvPr>
+            <p:ph type="title"/>
+          </p:nvPr>
+        </p:nvSpPr>
+        <p:spPr/>
+        <p:txBody>
+          <a:bodyPr/>
+          <a:lstStyle/>
+          <a:p>
+            <a:r>
+              <a:rPr lang="en-US" dirty="0"/>
+              <a:t>Caveats</a:t>
+            </a:r>
+          </a:p>
+        </p:txBody>
+      </p:sp>
+      <p:sp>
+        <p:nvSpPr>
+          <p:cNvPr id="3" name="Content Placeholder 2">
+            <a:extLst>
+              <a:ext uri="{FF2B5EF4-FFF2-40B4-BE49-F238E27FC236}">
+                <a16:creationId xmlns:a16="http://schemas.microsoft.com/office/drawing/2014/main" id="{D263E9DF-7C0F-4369-8FD3-EEA6C90D66F0}"/>
+              </a:ext>
+            </a:extLst>
+          </p:cNvPr>
+          <p:cNvSpPr>
+            <a:spLocks noGrp="1"/>
+          </p:cNvSpPr>
+          <p:nvPr>
+            <p:ph idx="1"/>
+          </p:nvPr>
+        </p:nvSpPr>
+        <p:spPr/>
+        <p:txBody>
+          <a:bodyPr/>
+          <a:lstStyle/>
+          <a:p>
+            <a:r>
+              <a:rPr lang="en-US" sz="2800" dirty="0"/>
+              <a:t>Be careful about your denominators: Analysis is based on </a:t>
+            </a:r>
+            <a:r>
+              <a:rPr lang="en-US" sz="2800" i="1" dirty="0"/>
+              <a:t>what you recorded</a:t>
+            </a:r>
+          </a:p>
+          <a:p>
+            <a:r>
+              <a:rPr lang="en-US" sz="2800" dirty="0"/>
+              <a:t>Entirely retrospective: it’s a summary of what you’ve done, doesn’t include projected time allocations</a:t>
+            </a:r>
+          </a:p>
+        </p:txBody>
+      </p:sp>
+      <p:sp>
+        <p:nvSpPr>
+          <p:cNvPr id="5" name="Slide Number Placeholder 4">
+            <a:extLst>
+              <a:ext uri="{FF2B5EF4-FFF2-40B4-BE49-F238E27FC236}">
+                <a16:creationId xmlns:a16="http://schemas.microsoft.com/office/drawing/2014/main" id="{5A453F05-4D37-4551-A440-48E8ED1FE85E}"/>
+              </a:ext>
+            </a:extLst>
+          </p:cNvPr>
+          <p:cNvSpPr>
+            <a:spLocks noGrp="1"/>
+          </p:cNvSpPr>
+          <p:nvPr>
+            <p:ph type="sldNum" sz="quarter" idx="4"/>
+          </p:nvPr>
+        </p:nvSpPr>
+        <p:spPr/>
+        <p:txBody>
+          <a:bodyPr/>
+          <a:lstStyle/>
+          <a:p>
+            <a:fld id="{1C3486A8-E8FB-4965-B61C-9B9FA7DC7BEE}" type="slidenum">
+              <a:rPr lang="en-US" smtClean="0"/>
+              <a:pPr/>
+              <a:t>34</a:t>
+            </a:fld>
+            <a:endParaRPr lang="en-US"/>
+          </a:p>
+        </p:txBody>
+      </p:sp>
+    </p:spTree>
+    <p:extLst>
+      <p:ext uri="{BB962C8B-B14F-4D97-AF65-F5344CB8AC3E}">
+        <p14:creationId xmlns:p14="http://schemas.microsoft.com/office/powerpoint/2010/main" val="2875116697"/>
+      </p:ext>
+    </p:extLst>
+  </p:cSld>
+  <p:clrMapOvr>
+    <a:masterClrMapping/>
+  </p:clrMapOvr>
+</p:sld>
+</file>
+
 <file path=ppt/slides/slide35.xml><?xml version="1.0" encoding="utf-8"?>
 <p:sld xmlns:a="http://schemas.openxmlformats.org/drawingml/2006/main" xmlns:r="http://schemas.openxmlformats.org/officeDocument/2006/relationships" xmlns:p="http://schemas.openxmlformats.org/presentationml/2006/main">
   <p:cSld>
@@ -12176,275 +12869,6 @@
           <p:cNvPr id="2" name="Title 1">
             <a:extLst>
               <a:ext uri="{FF2B5EF4-FFF2-40B4-BE49-F238E27FC236}">
-                <a16:creationId xmlns:a16="http://schemas.microsoft.com/office/drawing/2014/main" id="{A82DBE75-89D1-5441-8399-5D21C8F24232}"/>
-              </a:ext>
-            </a:extLst>
-          </p:cNvPr>
-          <p:cNvSpPr>
-            <a:spLocks noGrp="1"/>
-          </p:cNvSpPr>
-          <p:nvPr>
-            <p:ph type="title"/>
-          </p:nvPr>
-        </p:nvSpPr>
-        <p:spPr/>
-        <p:txBody>
-          <a:bodyPr/>
-          <a:lstStyle/>
-          <a:p>
-            <a:r>
-              <a:rPr lang="en-US" dirty="0"/>
-              <a:t>Hosting the shiny app</a:t>
-            </a:r>
-          </a:p>
-        </p:txBody>
-      </p:sp>
-      <p:sp>
-        <p:nvSpPr>
-          <p:cNvPr id="3" name="Content Placeholder 2">
-            <a:extLst>
-              <a:ext uri="{FF2B5EF4-FFF2-40B4-BE49-F238E27FC236}">
-                <a16:creationId xmlns:a16="http://schemas.microsoft.com/office/drawing/2014/main" id="{0317B98D-799B-C444-8B06-B3C99954D7A8}"/>
-              </a:ext>
-            </a:extLst>
-          </p:cNvPr>
-          <p:cNvSpPr>
-            <a:spLocks noGrp="1"/>
-          </p:cNvSpPr>
-          <p:nvPr>
-            <p:ph idx="1"/>
-          </p:nvPr>
-        </p:nvSpPr>
-        <p:spPr/>
-        <p:txBody>
-          <a:bodyPr/>
-          <a:lstStyle/>
-          <a:p>
-            <a:r>
-              <a:rPr lang="en-US" sz="2800" dirty="0" err="1"/>
-              <a:t>timetrackR</a:t>
-            </a:r>
-            <a:r>
-              <a:rPr lang="en-US" sz="2800" dirty="0"/>
-              <a:t> is currently hosted on </a:t>
-            </a:r>
-            <a:r>
-              <a:rPr lang="en-US" sz="2800" dirty="0" err="1"/>
-              <a:t>shinyapps.io</a:t>
-            </a:r>
-            <a:endParaRPr lang="en-US" sz="2800" dirty="0"/>
-          </a:p>
-          <a:p>
-            <a:r>
-              <a:rPr lang="en-US" sz="2800" dirty="0"/>
-              <a:t>MSK has access to hosting shiny apps on </a:t>
-            </a:r>
-            <a:r>
-              <a:rPr lang="en-US" sz="2800" dirty="0" err="1"/>
-              <a:t>Rconnect</a:t>
-            </a:r>
-            <a:endParaRPr lang="en-US" sz="2800" dirty="0"/>
-          </a:p>
-          <a:p>
-            <a:pPr lvl="1"/>
-            <a:r>
-              <a:rPr lang="en-US" sz="2400" dirty="0"/>
-              <a:t>Contact Juan Carlos for additional information about how to get set up</a:t>
-            </a:r>
-          </a:p>
-        </p:txBody>
-      </p:sp>
-      <p:sp>
-        <p:nvSpPr>
-          <p:cNvPr id="4" name="Slide Number Placeholder 3">
-            <a:extLst>
-              <a:ext uri="{FF2B5EF4-FFF2-40B4-BE49-F238E27FC236}">
-                <a16:creationId xmlns:a16="http://schemas.microsoft.com/office/drawing/2014/main" id="{7FEF7A6A-AC27-9141-B960-F248219C7E86}"/>
-              </a:ext>
-            </a:extLst>
-          </p:cNvPr>
-          <p:cNvSpPr>
-            <a:spLocks noGrp="1"/>
-          </p:cNvSpPr>
-          <p:nvPr>
-            <p:ph type="sldNum" sz="quarter" idx="4"/>
-          </p:nvPr>
-        </p:nvSpPr>
-        <p:spPr/>
-        <p:txBody>
-          <a:bodyPr/>
-          <a:lstStyle/>
-          <a:p>
-            <a:fld id="{1C3486A8-E8FB-4965-B61C-9B9FA7DC7BEE}" type="slidenum">
-              <a:rPr lang="en-US" smtClean="0"/>
-              <a:pPr/>
-              <a:t>35</a:t>
-            </a:fld>
-            <a:endParaRPr lang="en-US"/>
-          </a:p>
-        </p:txBody>
-      </p:sp>
-    </p:spTree>
-    <p:extLst>
-      <p:ext uri="{BB962C8B-B14F-4D97-AF65-F5344CB8AC3E}">
-        <p14:creationId xmlns:p14="http://schemas.microsoft.com/office/powerpoint/2010/main" val="3747534480"/>
-      </p:ext>
-    </p:extLst>
-  </p:cSld>
-  <p:clrMapOvr>
-    <a:masterClrMapping/>
-  </p:clrMapOvr>
-</p:sld>
-</file>
-
-<file path=ppt/slides/slide36.xml><?xml version="1.0" encoding="utf-8"?>
-<p:sld xmlns:a="http://schemas.openxmlformats.org/drawingml/2006/main" xmlns:r="http://schemas.openxmlformats.org/officeDocument/2006/relationships" xmlns:p="http://schemas.openxmlformats.org/presentationml/2006/main">
-  <p:cSld>
-    <p:spTree>
-      <p:nvGrpSpPr>
-        <p:cNvPr id="1" name=""/>
-        <p:cNvGrpSpPr/>
-        <p:nvPr/>
-      </p:nvGrpSpPr>
-      <p:grpSpPr>
-        <a:xfrm>
-          <a:off x="0" y="0"/>
-          <a:ext cx="0" cy="0"/>
-          <a:chOff x="0" y="0"/>
-          <a:chExt cx="0" cy="0"/>
-        </a:xfrm>
-      </p:grpSpPr>
-      <p:sp>
-        <p:nvSpPr>
-          <p:cNvPr id="2" name="Title 1">
-            <a:extLst>
-              <a:ext uri="{FF2B5EF4-FFF2-40B4-BE49-F238E27FC236}">
-                <a16:creationId xmlns:a16="http://schemas.microsoft.com/office/drawing/2014/main" id="{633F03C8-ABD3-4A00-AD80-087F21332873}"/>
-              </a:ext>
-            </a:extLst>
-          </p:cNvPr>
-          <p:cNvSpPr>
-            <a:spLocks noGrp="1"/>
-          </p:cNvSpPr>
-          <p:nvPr>
-            <p:ph type="title"/>
-          </p:nvPr>
-        </p:nvSpPr>
-        <p:spPr/>
-        <p:txBody>
-          <a:bodyPr/>
-          <a:lstStyle/>
-          <a:p>
-            <a:r>
-              <a:rPr lang="en-US" dirty="0"/>
-              <a:t>Caveats</a:t>
-            </a:r>
-          </a:p>
-        </p:txBody>
-      </p:sp>
-      <p:sp>
-        <p:nvSpPr>
-          <p:cNvPr id="3" name="Content Placeholder 2">
-            <a:extLst>
-              <a:ext uri="{FF2B5EF4-FFF2-40B4-BE49-F238E27FC236}">
-                <a16:creationId xmlns:a16="http://schemas.microsoft.com/office/drawing/2014/main" id="{D263E9DF-7C0F-4369-8FD3-EEA6C90D66F0}"/>
-              </a:ext>
-            </a:extLst>
-          </p:cNvPr>
-          <p:cNvSpPr>
-            <a:spLocks noGrp="1"/>
-          </p:cNvSpPr>
-          <p:nvPr>
-            <p:ph idx="1"/>
-          </p:nvPr>
-        </p:nvSpPr>
-        <p:spPr/>
-        <p:txBody>
-          <a:bodyPr/>
-          <a:lstStyle/>
-          <a:p>
-            <a:r>
-              <a:rPr lang="en-US" sz="2800" dirty="0"/>
-              <a:t>Be careful about your denominators: Analysis is based on </a:t>
-            </a:r>
-            <a:r>
-              <a:rPr lang="en-US" sz="2800" i="1" dirty="0"/>
-              <a:t>what you recorded</a:t>
-            </a:r>
-          </a:p>
-          <a:p>
-            <a:r>
-              <a:rPr lang="en-US" sz="2800" dirty="0"/>
-              <a:t>Entirely retrospective: it’s a summary of what you’ve done, doesn’t include projected time allocations</a:t>
-            </a:r>
-          </a:p>
-        </p:txBody>
-      </p:sp>
-      <p:sp>
-        <p:nvSpPr>
-          <p:cNvPr id="5" name="Slide Number Placeholder 4">
-            <a:extLst>
-              <a:ext uri="{FF2B5EF4-FFF2-40B4-BE49-F238E27FC236}">
-                <a16:creationId xmlns:a16="http://schemas.microsoft.com/office/drawing/2014/main" id="{5A453F05-4D37-4551-A440-48E8ED1FE85E}"/>
-              </a:ext>
-            </a:extLst>
-          </p:cNvPr>
-          <p:cNvSpPr>
-            <a:spLocks noGrp="1"/>
-          </p:cNvSpPr>
-          <p:nvPr>
-            <p:ph type="sldNum" sz="quarter" idx="4"/>
-          </p:nvPr>
-        </p:nvSpPr>
-        <p:spPr/>
-        <p:txBody>
-          <a:bodyPr/>
-          <a:lstStyle/>
-          <a:p>
-            <a:fld id="{1C3486A8-E8FB-4965-B61C-9B9FA7DC7BEE}" type="slidenum">
-              <a:rPr lang="en-US" smtClean="0"/>
-              <a:pPr/>
-              <a:t>36</a:t>
-            </a:fld>
-            <a:endParaRPr lang="en-US"/>
-          </a:p>
-        </p:txBody>
-      </p:sp>
-    </p:spTree>
-    <p:extLst>
-      <p:ext uri="{BB962C8B-B14F-4D97-AF65-F5344CB8AC3E}">
-        <p14:creationId xmlns:p14="http://schemas.microsoft.com/office/powerpoint/2010/main" val="2875116697"/>
-      </p:ext>
-    </p:extLst>
-  </p:cSld>
-  <p:clrMapOvr>
-    <a:masterClrMapping/>
-  </p:clrMapOvr>
-</p:sld>
-</file>
-
-<file path=ppt/slides/slide37.xml><?xml version="1.0" encoding="utf-8"?>
-<p:sld xmlns:a="http://schemas.openxmlformats.org/drawingml/2006/main" xmlns:r="http://schemas.openxmlformats.org/officeDocument/2006/relationships" xmlns:p="http://schemas.openxmlformats.org/presentationml/2006/main">
-  <p:cSld>
-    <p:spTree>
-      <p:nvGrpSpPr>
-        <p:cNvPr id="1" name=""/>
-        <p:cNvGrpSpPr/>
-        <p:nvPr/>
-      </p:nvGrpSpPr>
-      <p:grpSpPr>
-        <a:xfrm>
-          <a:off x="0" y="0"/>
-          <a:ext cx="0" cy="0"/>
-          <a:chOff x="0" y="0"/>
-          <a:chExt cx="0" cy="0"/>
-        </a:xfrm>
-      </p:grpSpPr>
-      <p:sp>
-        <p:nvSpPr>
-          <p:cNvPr id="2" name="Title 1">
-            <a:extLst>
-              <a:ext uri="{FF2B5EF4-FFF2-40B4-BE49-F238E27FC236}">
                 <a16:creationId xmlns:a16="http://schemas.microsoft.com/office/drawing/2014/main" id="{8B4B5790-0EA7-4012-93A7-22425D41E1E3}"/>
               </a:ext>
             </a:extLst>
@@ -12504,13 +12928,13 @@
           <a:p>
             <a:r>
               <a:rPr lang="en-US" sz="2800" dirty="0"/>
-              <a:t>Integrate with Toggl’s API?</a:t>
+              <a:t>Explore integrating with Toggl’s API</a:t>
             </a:r>
           </a:p>
           <a:p>
             <a:r>
               <a:rPr lang="en-US" sz="2800" dirty="0"/>
-              <a:t>Integrate with additional time tracking software other than Toggl?</a:t>
+              <a:t>Explore integrating with additional time tracking software other than Toggl</a:t>
             </a:r>
           </a:p>
         </p:txBody>
@@ -12539,7 +12963,7 @@
             <a:fld id="{1C3486A8-E8FB-4965-B61C-9B9FA7DC7BEE}" type="slidenum">
               <a:rPr lang="en-US" smtClean="0"/>
               <a:pPr/>
-              <a:t>37</a:t>
+              <a:t>35</a:t>
             </a:fld>
             <a:endParaRPr lang="en-US"/>
           </a:p>
@@ -12558,7 +12982,7 @@
 </p:sld>
 </file>
 
-<file path=ppt/slides/slide38.xml><?xml version="1.0" encoding="utf-8"?>
+<file path=ppt/slides/slide36.xml><?xml version="1.0" encoding="utf-8"?>
 <p:sld xmlns:a="http://schemas.openxmlformats.org/drawingml/2006/main" xmlns:r="http://schemas.openxmlformats.org/officeDocument/2006/relationships" xmlns:p="http://schemas.openxmlformats.org/presentationml/2006/main">
   <p:cSld>
     <p:spTree>
@@ -12716,7 +13140,7 @@
             <a:fld id="{1C3486A8-E8FB-4965-B61C-9B9FA7DC7BEE}" type="slidenum">
               <a:rPr lang="en-US" smtClean="0"/>
               <a:pPr/>
-              <a:t>38</a:t>
+              <a:t>36</a:t>
             </a:fld>
             <a:endParaRPr lang="en-US"/>
           </a:p>
@@ -12735,7 +13159,7 @@
 </p:sld>
 </file>
 
-<file path=ppt/slides/slide39.xml><?xml version="1.0" encoding="utf-8"?>
+<file path=ppt/slides/slide37.xml><?xml version="1.0" encoding="utf-8"?>
 <p:sld xmlns:a="http://schemas.openxmlformats.org/drawingml/2006/main" xmlns:r="http://schemas.openxmlformats.org/officeDocument/2006/relationships" xmlns:p="http://schemas.openxmlformats.org/presentationml/2006/main">
   <p:cSld>
     <p:spTree>
@@ -12762,8 +13186,8 @@
         </p:nvSpPr>
         <p:spPr bwMode="auto">
           <a:xfrm>
-            <a:off x="774140" y="1182689"/>
-            <a:ext cx="7680325" cy="807519"/>
+            <a:off x="3087139" y="1704554"/>
+            <a:ext cx="5661243" cy="807519"/>
           </a:xfrm>
           <a:prstGeom prst="rect">
             <a:avLst/>
@@ -13058,7 +13482,7 @@
         </p:nvSpPr>
         <p:spPr>
           <a:xfrm>
-            <a:off x="2793222" y="2414099"/>
+            <a:off x="3087139" y="2512073"/>
             <a:ext cx="4489306" cy="461665"/>
           </a:xfrm>
           <a:prstGeom prst="rect">
@@ -13109,8 +13533,8 @@
         </p:blipFill>
         <p:spPr>
           <a:xfrm>
-            <a:off x="1931159" y="2225496"/>
-            <a:ext cx="862063" cy="998528"/>
+            <a:off x="650253" y="1172998"/>
+            <a:ext cx="2142969" cy="2482202"/>
           </a:xfrm>
           <a:prstGeom prst="rect">
             <a:avLst/>
@@ -13898,7 +14322,7 @@
           <p:nvPr/>
         </p:nvPicPr>
         <p:blipFill>
-          <a:blip r:embed="rId2"/>
+          <a:blip r:embed="rId3"/>
           <a:stretch>
             <a:fillRect/>
           </a:stretch>
@@ -13988,7 +14412,7 @@
           <p:nvPr/>
         </p:nvPicPr>
         <p:blipFill>
-          <a:blip r:embed="rId2"/>
+          <a:blip r:embed="rId3"/>
           <a:stretch>
             <a:fillRect/>
           </a:stretch>
@@ -14018,7 +14442,7 @@
           <p:nvPr/>
         </p:nvPicPr>
         <p:blipFill>
-          <a:blip r:embed="rId3"/>
+          <a:blip r:embed="rId4"/>
           <a:stretch>
             <a:fillRect/>
           </a:stretch>
@@ -14048,7 +14472,7 @@
           <p:nvPr/>
         </p:nvPicPr>
         <p:blipFill>
-          <a:blip r:embed="rId4"/>
+          <a:blip r:embed="rId5"/>
           <a:stretch>
             <a:fillRect/>
           </a:stretch>
@@ -15033,6 +15457,26 @@
 </file>
 
 <file path=customXml/item1.xml><?xml version="1.0" encoding="utf-8"?>
+<p:properties xmlns:p="http://schemas.microsoft.com/office/2006/metadata/properties" xmlns:xsi="http://www.w3.org/2001/XMLSchema-instance" xmlns:pc="http://schemas.microsoft.com/office/infopath/2007/PartnerControls">
+  <documentManagement>
+    <ImageCreateDate xmlns="E64CF27C-2ECC-48E8-947E-CA63274FB2E8" xsi:nil="true"/>
+    <PublishingExpirationDate xmlns="http://schemas.microsoft.com/sharepoint/v3" xsi:nil="true"/>
+    <PublishingStartDate xmlns="http://schemas.microsoft.com/sharepoint/v3" xsi:nil="true"/>
+    <wic_System_Copyright xmlns="http://schemas.microsoft.com/sharepoint/v3/fields" xsi:nil="true"/>
+  </documentManagement>
+</p:properties>
+</file>
+
+<file path=customXml/item2.xml><?xml version="1.0" encoding="utf-8"?>
+<?mso-contentType ?>
+<FormTemplates xmlns="http://schemas.microsoft.com/sharepoint/v3/contenttype/forms">
+  <Display>DocumentLibraryForm</Display>
+  <Edit>DocumentLibraryForm</Edit>
+  <New>DocumentLibraryForm</New>
+</FormTemplates>
+</file>
+
+<file path=customXml/item3.xml><?xml version="1.0" encoding="utf-8"?>
 <ct:contentTypeSchema xmlns:ct="http://schemas.microsoft.com/office/2006/metadata/contentType" xmlns:ma="http://schemas.microsoft.com/office/2006/metadata/properties/metaAttributes" ct:_="" ma:_="" ma:contentTypeName="Image" ma:contentTypeID="0x0101009148F5A04DDD49CBA7127AADA5FB792B00AADE34325A8B49CDA8BB4DB53328F214008DA1A4150FB2B848A3EB7B452BFA7AC5" ma:contentTypeVersion="1" ma:contentTypeDescription="Upload an image." ma:contentTypeScope="" ma:versionID="c5dd4a19140d82efd42bf2e2156fee3e">
   <xsd:schema xmlns:xsd="http://www.w3.org/2001/XMLSchema" xmlns:xs="http://www.w3.org/2001/XMLSchema" xmlns:p="http://schemas.microsoft.com/office/2006/metadata/properties" xmlns:ns1="http://schemas.microsoft.com/sharepoint/v3" xmlns:ns2="E64CF27C-2ECC-48E8-947E-CA63274FB2E8" xmlns:ns3="http://schemas.microsoft.com/sharepoint/v3/fields" targetNamespace="http://schemas.microsoft.com/office/2006/metadata/properties" ma:root="true" ma:fieldsID="8669bc30feb5185623fa09da941496e2" ns1:_="" ns2:_="" ns3:_="">
     <xsd:import namespace="http://schemas.microsoft.com/sharepoint/v3"/>
@@ -15234,27 +15678,33 @@
 </ct:contentTypeSchema>
 </file>
 
-<file path=customXml/item2.xml><?xml version="1.0" encoding="utf-8"?>
-<?mso-contentType ?>
-<FormTemplates xmlns="http://schemas.microsoft.com/sharepoint/v3/contenttype/forms">
-  <Display>DocumentLibraryForm</Display>
-  <Edit>DocumentLibraryForm</Edit>
-  <New>DocumentLibraryForm</New>
-</FormTemplates>
+<file path=customXml/itemProps1.xml><?xml version="1.0" encoding="utf-8"?>
+<ds:datastoreItem xmlns:ds="http://schemas.openxmlformats.org/officeDocument/2006/customXml" ds:itemID="{2B30647F-A921-45DD-9E91-010F7EF4FB48}">
+  <ds:schemaRefs>
+    <ds:schemaRef ds:uri="http://schemas.microsoft.com/office/infopath/2007/PartnerControls"/>
+    <ds:schemaRef ds:uri="http://purl.org/dc/elements/1.1/"/>
+    <ds:schemaRef ds:uri="http://schemas.microsoft.com/office/2006/metadata/properties"/>
+    <ds:schemaRef ds:uri="E64CF27C-2ECC-48E8-947E-CA63274FB2E8"/>
+    <ds:schemaRef ds:uri="http://schemas.microsoft.com/sharepoint/v3"/>
+    <ds:schemaRef ds:uri="http://purl.org/dc/terms/"/>
+    <ds:schemaRef ds:uri="http://schemas.openxmlformats.org/package/2006/metadata/core-properties"/>
+    <ds:schemaRef ds:uri="http://schemas.microsoft.com/office/2006/documentManagement/types"/>
+    <ds:schemaRef ds:uri="http://schemas.microsoft.com/sharepoint/v3/fields"/>
+    <ds:schemaRef ds:uri="http://www.w3.org/XML/1998/namespace"/>
+    <ds:schemaRef ds:uri="http://purl.org/dc/dcmitype/"/>
+  </ds:schemaRefs>
+</ds:datastoreItem>
 </file>
 
-<file path=customXml/item3.xml><?xml version="1.0" encoding="utf-8"?>
-<p:properties xmlns:p="http://schemas.microsoft.com/office/2006/metadata/properties" xmlns:xsi="http://www.w3.org/2001/XMLSchema-instance" xmlns:pc="http://schemas.microsoft.com/office/infopath/2007/PartnerControls">
-  <documentManagement>
-    <ImageCreateDate xmlns="E64CF27C-2ECC-48E8-947E-CA63274FB2E8" xsi:nil="true"/>
-    <PublishingExpirationDate xmlns="http://schemas.microsoft.com/sharepoint/v3" xsi:nil="true"/>
-    <PublishingStartDate xmlns="http://schemas.microsoft.com/sharepoint/v3" xsi:nil="true"/>
-    <wic_System_Copyright xmlns="http://schemas.microsoft.com/sharepoint/v3/fields" xsi:nil="true"/>
-  </documentManagement>
-</p:properties>
+<file path=customXml/itemProps2.xml><?xml version="1.0" encoding="utf-8"?>
+<ds:datastoreItem xmlns:ds="http://schemas.openxmlformats.org/officeDocument/2006/customXml" ds:itemID="{B01F69EB-AD96-4AD6-8A18-0C8728F5F031}">
+  <ds:schemaRefs>
+    <ds:schemaRef ds:uri="http://schemas.microsoft.com/sharepoint/v3/contenttype/forms"/>
+  </ds:schemaRefs>
+</ds:datastoreItem>
 </file>
 
-<file path=customXml/itemProps1.xml><?xml version="1.0" encoding="utf-8"?>
+<file path=customXml/itemProps3.xml><?xml version="1.0" encoding="utf-8"?>
 <ds:datastoreItem xmlns:ds="http://schemas.openxmlformats.org/officeDocument/2006/customXml" ds:itemID="{E57EBD8B-EA50-4231-9F03-F9188E4066E3}">
   <ds:schemaRefs>
     <ds:schemaRef ds:uri="http://schemas.microsoft.com/office/2006/metadata/contentType"/>
@@ -15272,30 +15722,4 @@
     <ds:schemaRef ds:uri="http://schemas.microsoft.com/internal/obd"/>
   </ds:schemaRefs>
 </ds:datastoreItem>
-</file>
-
-<file path=customXml/itemProps2.xml><?xml version="1.0" encoding="utf-8"?>
-<ds:datastoreItem xmlns:ds="http://schemas.openxmlformats.org/officeDocument/2006/customXml" ds:itemID="{B01F69EB-AD96-4AD6-8A18-0C8728F5F031}">
-  <ds:schemaRefs>
-    <ds:schemaRef ds:uri="http://schemas.microsoft.com/sharepoint/v3/contenttype/forms"/>
-  </ds:schemaRefs>
-</ds:datastoreItem>
-</file>
-
-<file path=customXml/itemProps3.xml><?xml version="1.0" encoding="utf-8"?>
-<ds:datastoreItem xmlns:ds="http://schemas.openxmlformats.org/officeDocument/2006/customXml" ds:itemID="{2B30647F-A921-45DD-9E91-010F7EF4FB48}">
-  <ds:schemaRefs>
-    <ds:schemaRef ds:uri="http://schemas.microsoft.com/office/infopath/2007/PartnerControls"/>
-    <ds:schemaRef ds:uri="http://purl.org/dc/elements/1.1/"/>
-    <ds:schemaRef ds:uri="http://schemas.microsoft.com/office/2006/metadata/properties"/>
-    <ds:schemaRef ds:uri="E64CF27C-2ECC-48E8-947E-CA63274FB2E8"/>
-    <ds:schemaRef ds:uri="http://schemas.microsoft.com/sharepoint/v3"/>
-    <ds:schemaRef ds:uri="http://purl.org/dc/terms/"/>
-    <ds:schemaRef ds:uri="http://schemas.openxmlformats.org/package/2006/metadata/core-properties"/>
-    <ds:schemaRef ds:uri="http://schemas.microsoft.com/office/2006/documentManagement/types"/>
-    <ds:schemaRef ds:uri="http://schemas.microsoft.com/sharepoint/v3/fields"/>
-    <ds:schemaRef ds:uri="http://www.w3.org/XML/1998/namespace"/>
-    <ds:schemaRef ds:uri="http://purl.org/dc/dcmitype/"/>
-  </ds:schemaRefs>
-</ds:datastoreItem>
 </file>
</xml_diff>